<commit_message>
draft provider use case
</commit_message>
<xml_diff>
--- a/meeting-notes/diagrams.pptx
+++ b/meeting-notes/diagrams.pptx
@@ -5,7 +5,7 @@
     <p:sldMasterId id="2147483648" r:id="rId1"/>
   </p:sldMasterIdLst>
   <p:notesMasterIdLst>
-    <p:notesMasterId r:id="rId36"/>
+    <p:notesMasterId r:id="rId38"/>
   </p:notesMasterIdLst>
   <p:sldIdLst>
     <p:sldId id="256" r:id="rId2"/>
@@ -42,6 +42,8 @@
     <p:sldId id="292" r:id="rId33"/>
     <p:sldId id="293" r:id="rId34"/>
     <p:sldId id="294" r:id="rId35"/>
+    <p:sldId id="296" r:id="rId36"/>
+    <p:sldId id="297" r:id="rId37"/>
   </p:sldIdLst>
   <p:sldSz cx="12192000" cy="6858000"/>
   <p:notesSz cx="6858000" cy="9144000"/>
@@ -17935,6 +17937,1113 @@
       </p:par>
     </p:tnLst>
   </p:timing>
+</p:sld>
+</file>
+
+<file path=ppt/slides/slide35.xml><?xml version="1.0" encoding="utf-8"?>
+<p:sld xmlns:a="http://schemas.openxmlformats.org/drawingml/2006/main" xmlns:r="http://schemas.openxmlformats.org/officeDocument/2006/relationships" xmlns:p="http://schemas.openxmlformats.org/presentationml/2006/main">
+  <p:cSld>
+    <p:spTree>
+      <p:nvGrpSpPr>
+        <p:cNvPr id="1" name=""/>
+        <p:cNvGrpSpPr/>
+        <p:nvPr/>
+      </p:nvGrpSpPr>
+      <p:grpSpPr>
+        <a:xfrm>
+          <a:off x="0" y="0"/>
+          <a:ext cx="0" cy="0"/>
+          <a:chOff x="0" y="0"/>
+          <a:chExt cx="0" cy="0"/>
+        </a:xfrm>
+      </p:grpSpPr>
+      <p:sp>
+        <p:nvSpPr>
+          <p:cNvPr id="3" name="Rounded Rectangle 2"/>
+          <p:cNvSpPr/>
+          <p:nvPr/>
+        </p:nvSpPr>
+        <p:spPr>
+          <a:xfrm>
+            <a:off x="3566162" y="2084516"/>
+            <a:ext cx="1965170" cy="1163412"/>
+          </a:xfrm>
+          <a:prstGeom prst="roundRect">
+            <a:avLst/>
+          </a:prstGeom>
+        </p:spPr>
+        <p:style>
+          <a:lnRef idx="2">
+            <a:schemeClr val="accent1">
+              <a:shade val="50000"/>
+            </a:schemeClr>
+          </a:lnRef>
+          <a:fillRef idx="1">
+            <a:schemeClr val="accent1"/>
+          </a:fillRef>
+          <a:effectRef idx="0">
+            <a:schemeClr val="accent1"/>
+          </a:effectRef>
+          <a:fontRef idx="minor">
+            <a:schemeClr val="lt1"/>
+          </a:fontRef>
+        </p:style>
+        <p:txBody>
+          <a:bodyPr rtlCol="0" anchor="ctr"/>
+          <a:lstStyle/>
+          <a:p>
+            <a:pPr marL="342900" indent="-342900">
+              <a:buFont typeface="+mj-lt"/>
+              <a:buAutoNum type="arabicPeriod"/>
+            </a:pPr>
+            <a:r>
+              <a:rPr lang="en-US" dirty="0" smtClean="0"/>
+              <a:t>Find patient in external system</a:t>
+            </a:r>
+            <a:endParaRPr lang="en-US" dirty="0"/>
+          </a:p>
+        </p:txBody>
+      </p:sp>
+      <p:cxnSp>
+        <p:nvCxnSpPr>
+          <p:cNvPr id="7" name="Straight Arrow Connector 6"/>
+          <p:cNvCxnSpPr>
+            <a:stCxn id="3" idx="3"/>
+            <a:endCxn id="10" idx="1"/>
+          </p:cNvCxnSpPr>
+          <p:nvPr/>
+        </p:nvCxnSpPr>
+        <p:spPr>
+          <a:xfrm>
+            <a:off x="5531332" y="2666222"/>
+            <a:ext cx="1473877" cy="0"/>
+          </a:xfrm>
+          <a:prstGeom prst="straightConnector1">
+            <a:avLst/>
+          </a:prstGeom>
+          <a:ln w="38100">
+            <a:solidFill>
+              <a:schemeClr val="tx1"/>
+            </a:solidFill>
+            <a:tailEnd type="triangle"/>
+          </a:ln>
+        </p:spPr>
+        <p:style>
+          <a:lnRef idx="1">
+            <a:schemeClr val="accent1"/>
+          </a:lnRef>
+          <a:fillRef idx="0">
+            <a:schemeClr val="accent1"/>
+          </a:fillRef>
+          <a:effectRef idx="0">
+            <a:schemeClr val="accent1"/>
+          </a:effectRef>
+          <a:fontRef idx="minor">
+            <a:schemeClr val="tx1"/>
+          </a:fontRef>
+        </p:style>
+      </p:cxnSp>
+      <p:sp>
+        <p:nvSpPr>
+          <p:cNvPr id="8" name="Rounded Rectangle 7"/>
+          <p:cNvSpPr/>
+          <p:nvPr/>
+        </p:nvSpPr>
+        <p:spPr>
+          <a:xfrm>
+            <a:off x="3556758" y="3918123"/>
+            <a:ext cx="1965170" cy="1163412"/>
+          </a:xfrm>
+          <a:prstGeom prst="roundRect">
+            <a:avLst/>
+          </a:prstGeom>
+        </p:spPr>
+        <p:style>
+          <a:lnRef idx="2">
+            <a:schemeClr val="accent1">
+              <a:shade val="50000"/>
+            </a:schemeClr>
+          </a:lnRef>
+          <a:fillRef idx="1">
+            <a:schemeClr val="accent1"/>
+          </a:fillRef>
+          <a:effectRef idx="0">
+            <a:schemeClr val="accent1"/>
+          </a:effectRef>
+          <a:fontRef idx="minor">
+            <a:schemeClr val="lt1"/>
+          </a:fontRef>
+        </p:style>
+        <p:txBody>
+          <a:bodyPr rtlCol="0" anchor="ctr"/>
+          <a:lstStyle/>
+          <a:p>
+            <a:pPr marL="342900" indent="-342900">
+              <a:buFont typeface="+mj-lt"/>
+              <a:buAutoNum type="arabicPeriod" startAt="4"/>
+            </a:pPr>
+            <a:r>
+              <a:rPr lang="en-US" dirty="0" smtClean="0"/>
+              <a:t>Book appointment</a:t>
+            </a:r>
+            <a:endParaRPr lang="en-US" dirty="0"/>
+          </a:p>
+        </p:txBody>
+      </p:sp>
+      <p:sp>
+        <p:nvSpPr>
+          <p:cNvPr id="9" name="Rounded Rectangle 8"/>
+          <p:cNvSpPr/>
+          <p:nvPr/>
+        </p:nvSpPr>
+        <p:spPr>
+          <a:xfrm>
+            <a:off x="7005209" y="3918123"/>
+            <a:ext cx="1965170" cy="1163412"/>
+          </a:xfrm>
+          <a:prstGeom prst="roundRect">
+            <a:avLst/>
+          </a:prstGeom>
+        </p:spPr>
+        <p:style>
+          <a:lnRef idx="2">
+            <a:schemeClr val="accent1">
+              <a:shade val="50000"/>
+            </a:schemeClr>
+          </a:lnRef>
+          <a:fillRef idx="1">
+            <a:schemeClr val="accent1"/>
+          </a:fillRef>
+          <a:effectRef idx="0">
+            <a:schemeClr val="accent1"/>
+          </a:effectRef>
+          <a:fontRef idx="minor">
+            <a:schemeClr val="lt1"/>
+          </a:fontRef>
+        </p:style>
+        <p:txBody>
+          <a:bodyPr rtlCol="0" anchor="ctr"/>
+          <a:lstStyle/>
+          <a:p>
+            <a:pPr marL="342900" indent="-342900">
+              <a:buFont typeface="+mj-lt"/>
+              <a:buAutoNum type="arabicPeriod" startAt="3"/>
+            </a:pPr>
+            <a:r>
+              <a:rPr lang="en-US" dirty="0" smtClean="0"/>
+              <a:t>Hold appointment</a:t>
+            </a:r>
+            <a:endParaRPr lang="en-US" dirty="0"/>
+          </a:p>
+        </p:txBody>
+      </p:sp>
+      <p:sp>
+        <p:nvSpPr>
+          <p:cNvPr id="10" name="Rounded Rectangle 9"/>
+          <p:cNvSpPr/>
+          <p:nvPr/>
+        </p:nvSpPr>
+        <p:spPr>
+          <a:xfrm>
+            <a:off x="7005209" y="2084516"/>
+            <a:ext cx="1965170" cy="1163412"/>
+          </a:xfrm>
+          <a:prstGeom prst="roundRect">
+            <a:avLst/>
+          </a:prstGeom>
+        </p:spPr>
+        <p:style>
+          <a:lnRef idx="2">
+            <a:schemeClr val="accent1">
+              <a:shade val="50000"/>
+            </a:schemeClr>
+          </a:lnRef>
+          <a:fillRef idx="1">
+            <a:schemeClr val="accent1"/>
+          </a:fillRef>
+          <a:effectRef idx="0">
+            <a:schemeClr val="accent1"/>
+          </a:effectRef>
+          <a:fontRef idx="minor">
+            <a:schemeClr val="lt1"/>
+          </a:fontRef>
+        </p:style>
+        <p:txBody>
+          <a:bodyPr rtlCol="0" anchor="ctr"/>
+          <a:lstStyle/>
+          <a:p>
+            <a:pPr marL="342900" indent="-342900">
+              <a:buFont typeface="+mj-lt"/>
+              <a:buAutoNum type="arabicPeriod" startAt="2"/>
+            </a:pPr>
+            <a:r>
+              <a:rPr lang="en-US" dirty="0" smtClean="0"/>
+              <a:t>Appointment availability search</a:t>
+            </a:r>
+            <a:endParaRPr lang="en-US" dirty="0"/>
+          </a:p>
+        </p:txBody>
+      </p:sp>
+      <p:cxnSp>
+        <p:nvCxnSpPr>
+          <p:cNvPr id="12" name="Straight Arrow Connector 11"/>
+          <p:cNvCxnSpPr>
+            <a:stCxn id="8" idx="3"/>
+            <a:endCxn id="9" idx="1"/>
+          </p:cNvCxnSpPr>
+          <p:nvPr/>
+        </p:nvCxnSpPr>
+        <p:spPr>
+          <a:xfrm>
+            <a:off x="5521928" y="4499829"/>
+            <a:ext cx="1483281" cy="0"/>
+          </a:xfrm>
+          <a:prstGeom prst="straightConnector1">
+            <a:avLst/>
+          </a:prstGeom>
+          <a:ln w="38100">
+            <a:solidFill>
+              <a:schemeClr val="tx1"/>
+            </a:solidFill>
+            <a:headEnd type="triangle"/>
+            <a:tailEnd type="none"/>
+          </a:ln>
+        </p:spPr>
+        <p:style>
+          <a:lnRef idx="1">
+            <a:schemeClr val="accent1"/>
+          </a:lnRef>
+          <a:fillRef idx="0">
+            <a:schemeClr val="accent1"/>
+          </a:fillRef>
+          <a:effectRef idx="0">
+            <a:schemeClr val="accent1"/>
+          </a:effectRef>
+          <a:fontRef idx="minor">
+            <a:schemeClr val="tx1"/>
+          </a:fontRef>
+        </p:style>
+      </p:cxnSp>
+      <p:cxnSp>
+        <p:nvCxnSpPr>
+          <p:cNvPr id="13" name="Straight Arrow Connector 12"/>
+          <p:cNvCxnSpPr>
+            <a:stCxn id="10" idx="2"/>
+            <a:endCxn id="9" idx="0"/>
+          </p:cNvCxnSpPr>
+          <p:nvPr/>
+        </p:nvCxnSpPr>
+        <p:spPr>
+          <a:xfrm>
+            <a:off x="7987794" y="3247928"/>
+            <a:ext cx="0" cy="670195"/>
+          </a:xfrm>
+          <a:prstGeom prst="straightConnector1">
+            <a:avLst/>
+          </a:prstGeom>
+          <a:ln w="38100">
+            <a:solidFill>
+              <a:schemeClr val="tx1"/>
+            </a:solidFill>
+            <a:tailEnd type="triangle"/>
+          </a:ln>
+        </p:spPr>
+        <p:style>
+          <a:lnRef idx="1">
+            <a:schemeClr val="accent1"/>
+          </a:lnRef>
+          <a:fillRef idx="0">
+            <a:schemeClr val="accent1"/>
+          </a:fillRef>
+          <a:effectRef idx="0">
+            <a:schemeClr val="accent1"/>
+          </a:effectRef>
+          <a:fontRef idx="minor">
+            <a:schemeClr val="tx1"/>
+          </a:fontRef>
+        </p:style>
+      </p:cxnSp>
+      <p:cxnSp>
+        <p:nvCxnSpPr>
+          <p:cNvPr id="18" name="Straight Arrow Connector 17"/>
+          <p:cNvCxnSpPr>
+            <a:stCxn id="8" idx="2"/>
+          </p:cNvCxnSpPr>
+          <p:nvPr/>
+        </p:nvCxnSpPr>
+        <p:spPr>
+          <a:xfrm>
+            <a:off x="4539343" y="5081535"/>
+            <a:ext cx="9404" cy="1215093"/>
+          </a:xfrm>
+          <a:prstGeom prst="straightConnector1">
+            <a:avLst/>
+          </a:prstGeom>
+          <a:ln w="38100">
+            <a:solidFill>
+              <a:schemeClr val="tx1"/>
+            </a:solidFill>
+            <a:tailEnd type="triangle"/>
+          </a:ln>
+        </p:spPr>
+        <p:style>
+          <a:lnRef idx="1">
+            <a:schemeClr val="accent1"/>
+          </a:lnRef>
+          <a:fillRef idx="0">
+            <a:schemeClr val="accent1"/>
+          </a:fillRef>
+          <a:effectRef idx="0">
+            <a:schemeClr val="accent1"/>
+          </a:effectRef>
+          <a:fontRef idx="minor">
+            <a:schemeClr val="tx1"/>
+          </a:fontRef>
+        </p:style>
+      </p:cxnSp>
+      <p:cxnSp>
+        <p:nvCxnSpPr>
+          <p:cNvPr id="25" name="Straight Arrow Connector 24"/>
+          <p:cNvCxnSpPr>
+            <a:endCxn id="3" idx="0"/>
+          </p:cNvCxnSpPr>
+          <p:nvPr/>
+        </p:nvCxnSpPr>
+        <p:spPr>
+          <a:xfrm>
+            <a:off x="4539343" y="902825"/>
+            <a:ext cx="9404" cy="1181691"/>
+          </a:xfrm>
+          <a:prstGeom prst="straightConnector1">
+            <a:avLst/>
+          </a:prstGeom>
+          <a:ln w="38100">
+            <a:solidFill>
+              <a:schemeClr val="tx1"/>
+            </a:solidFill>
+            <a:tailEnd type="triangle"/>
+          </a:ln>
+        </p:spPr>
+        <p:style>
+          <a:lnRef idx="1">
+            <a:schemeClr val="accent1"/>
+          </a:lnRef>
+          <a:fillRef idx="0">
+            <a:schemeClr val="accent1"/>
+          </a:fillRef>
+          <a:effectRef idx="0">
+            <a:schemeClr val="accent1"/>
+          </a:effectRef>
+          <a:fontRef idx="minor">
+            <a:schemeClr val="tx1"/>
+          </a:fontRef>
+        </p:style>
+      </p:cxnSp>
+      <p:sp>
+        <p:nvSpPr>
+          <p:cNvPr id="50" name="TextBox 49"/>
+          <p:cNvSpPr txBox="1"/>
+          <p:nvPr/>
+        </p:nvSpPr>
+        <p:spPr>
+          <a:xfrm>
+            <a:off x="1307401" y="1345852"/>
+            <a:ext cx="1857375" cy="1200329"/>
+          </a:xfrm>
+          <a:prstGeom prst="rect">
+            <a:avLst/>
+          </a:prstGeom>
+          <a:noFill/>
+        </p:spPr>
+        <p:txBody>
+          <a:bodyPr wrap="square" rtlCol="0">
+            <a:spAutoFit/>
+          </a:bodyPr>
+          <a:lstStyle/>
+          <a:p>
+            <a:r>
+              <a:rPr lang="en-US" dirty="0"/>
+              <a:t>Scenario 1: </a:t>
+            </a:r>
+            <a:r>
+              <a:rPr lang="en-US" dirty="0" smtClean="0"/>
+              <a:t>Provider Scheduling </a:t>
+            </a:r>
+            <a:r>
+              <a:rPr lang="en-US" dirty="0"/>
+              <a:t>for </a:t>
+            </a:r>
+            <a:r>
+              <a:rPr lang="en-US" dirty="0" smtClean="0"/>
+              <a:t>existing </a:t>
+            </a:r>
+            <a:r>
+              <a:rPr lang="en-US" dirty="0"/>
+              <a:t>patient</a:t>
+            </a:r>
+          </a:p>
+        </p:txBody>
+      </p:sp>
+    </p:spTree>
+    <p:extLst>
+      <p:ext uri="{BB962C8B-B14F-4D97-AF65-F5344CB8AC3E}">
+        <p14:creationId xmlns:p14="http://schemas.microsoft.com/office/powerpoint/2010/main" val="452620769"/>
+      </p:ext>
+    </p:extLst>
+  </p:cSld>
+  <p:clrMapOvr>
+    <a:masterClrMapping/>
+  </p:clrMapOvr>
+</p:sld>
+</file>
+
+<file path=ppt/slides/slide36.xml><?xml version="1.0" encoding="utf-8"?>
+<p:sld xmlns:a="http://schemas.openxmlformats.org/drawingml/2006/main" xmlns:r="http://schemas.openxmlformats.org/officeDocument/2006/relationships" xmlns:p="http://schemas.openxmlformats.org/presentationml/2006/main">
+  <p:cSld>
+    <p:spTree>
+      <p:nvGrpSpPr>
+        <p:cNvPr id="1" name=""/>
+        <p:cNvGrpSpPr/>
+        <p:nvPr/>
+      </p:nvGrpSpPr>
+      <p:grpSpPr>
+        <a:xfrm>
+          <a:off x="0" y="0"/>
+          <a:ext cx="0" cy="0"/>
+          <a:chOff x="0" y="0"/>
+          <a:chExt cx="0" cy="0"/>
+        </a:xfrm>
+      </p:grpSpPr>
+      <p:sp>
+        <p:nvSpPr>
+          <p:cNvPr id="3" name="Rounded Rectangle 2"/>
+          <p:cNvSpPr/>
+          <p:nvPr/>
+        </p:nvSpPr>
+        <p:spPr>
+          <a:xfrm>
+            <a:off x="2825383" y="1181691"/>
+            <a:ext cx="1965170" cy="1163412"/>
+          </a:xfrm>
+          <a:prstGeom prst="roundRect">
+            <a:avLst/>
+          </a:prstGeom>
+        </p:spPr>
+        <p:style>
+          <a:lnRef idx="2">
+            <a:schemeClr val="accent1">
+              <a:shade val="50000"/>
+            </a:schemeClr>
+          </a:lnRef>
+          <a:fillRef idx="1">
+            <a:schemeClr val="accent1"/>
+          </a:fillRef>
+          <a:effectRef idx="0">
+            <a:schemeClr val="accent1"/>
+          </a:effectRef>
+          <a:fontRef idx="minor">
+            <a:schemeClr val="lt1"/>
+          </a:fontRef>
+        </p:style>
+        <p:txBody>
+          <a:bodyPr rtlCol="0" anchor="ctr"/>
+          <a:lstStyle/>
+          <a:p>
+            <a:pPr marL="342900" indent="-342900">
+              <a:buFont typeface="+mj-lt"/>
+              <a:buAutoNum type="arabicPeriod"/>
+            </a:pPr>
+            <a:r>
+              <a:rPr lang="en-US"/>
+              <a:t>Find patient in external system</a:t>
+            </a:r>
+            <a:endParaRPr lang="en-US" dirty="0"/>
+          </a:p>
+        </p:txBody>
+      </p:sp>
+      <p:cxnSp>
+        <p:nvCxnSpPr>
+          <p:cNvPr id="7" name="Straight Arrow Connector 6"/>
+          <p:cNvCxnSpPr>
+            <a:stCxn id="3" idx="3"/>
+            <a:endCxn id="10" idx="1"/>
+          </p:cNvCxnSpPr>
+          <p:nvPr/>
+        </p:nvCxnSpPr>
+        <p:spPr>
+          <a:xfrm>
+            <a:off x="4790553" y="1763397"/>
+            <a:ext cx="1473877" cy="0"/>
+          </a:xfrm>
+          <a:prstGeom prst="straightConnector1">
+            <a:avLst/>
+          </a:prstGeom>
+          <a:ln w="38100">
+            <a:solidFill>
+              <a:schemeClr val="tx1"/>
+            </a:solidFill>
+            <a:tailEnd type="triangle"/>
+          </a:ln>
+        </p:spPr>
+        <p:style>
+          <a:lnRef idx="1">
+            <a:schemeClr val="accent1"/>
+          </a:lnRef>
+          <a:fillRef idx="0">
+            <a:schemeClr val="accent1"/>
+          </a:fillRef>
+          <a:effectRef idx="0">
+            <a:schemeClr val="accent1"/>
+          </a:effectRef>
+          <a:fontRef idx="minor">
+            <a:schemeClr val="tx1"/>
+          </a:fontRef>
+        </p:style>
+      </p:cxnSp>
+      <p:sp>
+        <p:nvSpPr>
+          <p:cNvPr id="8" name="Rounded Rectangle 7"/>
+          <p:cNvSpPr/>
+          <p:nvPr/>
+        </p:nvSpPr>
+        <p:spPr>
+          <a:xfrm>
+            <a:off x="2815979" y="3015298"/>
+            <a:ext cx="1965170" cy="1163412"/>
+          </a:xfrm>
+          <a:prstGeom prst="roundRect">
+            <a:avLst/>
+          </a:prstGeom>
+        </p:spPr>
+        <p:style>
+          <a:lnRef idx="2">
+            <a:schemeClr val="accent1">
+              <a:shade val="50000"/>
+            </a:schemeClr>
+          </a:lnRef>
+          <a:fillRef idx="1">
+            <a:schemeClr val="accent1"/>
+          </a:fillRef>
+          <a:effectRef idx="0">
+            <a:schemeClr val="accent1"/>
+          </a:effectRef>
+          <a:fontRef idx="minor">
+            <a:schemeClr val="lt1"/>
+          </a:fontRef>
+        </p:style>
+        <p:txBody>
+          <a:bodyPr rtlCol="0" anchor="ctr"/>
+          <a:lstStyle/>
+          <a:p>
+            <a:pPr marL="342900" indent="-342900">
+              <a:buFont typeface="+mj-lt"/>
+              <a:buAutoNum type="arabicPeriod" startAt="4"/>
+            </a:pPr>
+            <a:r>
+              <a:rPr lang="en-US" dirty="0"/>
+              <a:t>Hold appointment</a:t>
+            </a:r>
+            <a:endParaRPr lang="en-US" dirty="0"/>
+          </a:p>
+        </p:txBody>
+      </p:sp>
+      <p:sp>
+        <p:nvSpPr>
+          <p:cNvPr id="9" name="Rounded Rectangle 8"/>
+          <p:cNvSpPr/>
+          <p:nvPr/>
+        </p:nvSpPr>
+        <p:spPr>
+          <a:xfrm>
+            <a:off x="6264430" y="3015298"/>
+            <a:ext cx="1965170" cy="1163412"/>
+          </a:xfrm>
+          <a:prstGeom prst="roundRect">
+            <a:avLst/>
+          </a:prstGeom>
+        </p:spPr>
+        <p:style>
+          <a:lnRef idx="2">
+            <a:schemeClr val="accent1">
+              <a:shade val="50000"/>
+            </a:schemeClr>
+          </a:lnRef>
+          <a:fillRef idx="1">
+            <a:schemeClr val="accent1"/>
+          </a:fillRef>
+          <a:effectRef idx="0">
+            <a:schemeClr val="accent1"/>
+          </a:effectRef>
+          <a:fontRef idx="minor">
+            <a:schemeClr val="lt1"/>
+          </a:fontRef>
+        </p:style>
+        <p:txBody>
+          <a:bodyPr rtlCol="0" anchor="ctr"/>
+          <a:lstStyle/>
+          <a:p>
+            <a:pPr marL="342900" indent="-342900">
+              <a:buFont typeface="+mj-lt"/>
+              <a:buAutoNum type="arabicPeriod" startAt="3"/>
+            </a:pPr>
+            <a:r>
+              <a:rPr lang="en-US" dirty="0"/>
+              <a:t>Appointment availability search</a:t>
+            </a:r>
+            <a:endParaRPr lang="en-US" dirty="0"/>
+          </a:p>
+        </p:txBody>
+      </p:sp>
+      <p:sp>
+        <p:nvSpPr>
+          <p:cNvPr id="10" name="Rounded Rectangle 9"/>
+          <p:cNvSpPr/>
+          <p:nvPr/>
+        </p:nvSpPr>
+        <p:spPr>
+          <a:xfrm>
+            <a:off x="6264430" y="1181691"/>
+            <a:ext cx="1965170" cy="1163412"/>
+          </a:xfrm>
+          <a:prstGeom prst="roundRect">
+            <a:avLst/>
+          </a:prstGeom>
+        </p:spPr>
+        <p:style>
+          <a:lnRef idx="2">
+            <a:schemeClr val="accent1">
+              <a:shade val="50000"/>
+            </a:schemeClr>
+          </a:lnRef>
+          <a:fillRef idx="1">
+            <a:schemeClr val="accent1"/>
+          </a:fillRef>
+          <a:effectRef idx="0">
+            <a:schemeClr val="accent1"/>
+          </a:effectRef>
+          <a:fontRef idx="minor">
+            <a:schemeClr val="lt1"/>
+          </a:fontRef>
+        </p:style>
+        <p:txBody>
+          <a:bodyPr rtlCol="0" anchor="ctr"/>
+          <a:lstStyle/>
+          <a:p>
+            <a:pPr marL="342900" indent="-342900">
+              <a:buFont typeface="+mj-lt"/>
+              <a:buAutoNum type="arabicPeriod" startAt="2"/>
+            </a:pPr>
+            <a:r>
+              <a:rPr lang="en-US" dirty="0"/>
+              <a:t>Patient registration option </a:t>
+            </a:r>
+            <a:r>
+              <a:rPr lang="en-US" dirty="0" smtClean="0"/>
+              <a:t>A</a:t>
+            </a:r>
+            <a:endParaRPr lang="en-US" dirty="0"/>
+          </a:p>
+        </p:txBody>
+      </p:sp>
+      <p:sp>
+        <p:nvSpPr>
+          <p:cNvPr id="11" name="Rounded Rectangle 10"/>
+          <p:cNvSpPr/>
+          <p:nvPr/>
+        </p:nvSpPr>
+        <p:spPr>
+          <a:xfrm>
+            <a:off x="2815979" y="4897321"/>
+            <a:ext cx="1965170" cy="1163412"/>
+          </a:xfrm>
+          <a:prstGeom prst="roundRect">
+            <a:avLst/>
+          </a:prstGeom>
+        </p:spPr>
+        <p:style>
+          <a:lnRef idx="2">
+            <a:schemeClr val="accent1">
+              <a:shade val="50000"/>
+            </a:schemeClr>
+          </a:lnRef>
+          <a:fillRef idx="1">
+            <a:schemeClr val="accent1"/>
+          </a:fillRef>
+          <a:effectRef idx="0">
+            <a:schemeClr val="accent1"/>
+          </a:effectRef>
+          <a:fontRef idx="minor">
+            <a:schemeClr val="lt1"/>
+          </a:fontRef>
+        </p:style>
+        <p:txBody>
+          <a:bodyPr rtlCol="0" anchor="ctr"/>
+          <a:lstStyle/>
+          <a:p>
+            <a:pPr marL="342900" indent="-342900">
+              <a:buFont typeface="+mj-lt"/>
+              <a:buAutoNum type="arabicPeriod" startAt="5"/>
+            </a:pPr>
+            <a:r>
+              <a:rPr lang="en-US" dirty="0"/>
+              <a:t>Patient registration option A</a:t>
+            </a:r>
+            <a:endParaRPr lang="en-US" dirty="0"/>
+          </a:p>
+        </p:txBody>
+      </p:sp>
+      <p:cxnSp>
+        <p:nvCxnSpPr>
+          <p:cNvPr id="12" name="Straight Arrow Connector 11"/>
+          <p:cNvCxnSpPr>
+            <a:stCxn id="8" idx="3"/>
+            <a:endCxn id="9" idx="1"/>
+          </p:cNvCxnSpPr>
+          <p:nvPr/>
+        </p:nvCxnSpPr>
+        <p:spPr>
+          <a:xfrm>
+            <a:off x="4781149" y="3597004"/>
+            <a:ext cx="1483281" cy="0"/>
+          </a:xfrm>
+          <a:prstGeom prst="straightConnector1">
+            <a:avLst/>
+          </a:prstGeom>
+          <a:ln w="38100">
+            <a:solidFill>
+              <a:schemeClr val="tx1"/>
+            </a:solidFill>
+            <a:headEnd type="triangle"/>
+            <a:tailEnd type="none"/>
+          </a:ln>
+        </p:spPr>
+        <p:style>
+          <a:lnRef idx="1">
+            <a:schemeClr val="accent1"/>
+          </a:lnRef>
+          <a:fillRef idx="0">
+            <a:schemeClr val="accent1"/>
+          </a:fillRef>
+          <a:effectRef idx="0">
+            <a:schemeClr val="accent1"/>
+          </a:effectRef>
+          <a:fontRef idx="minor">
+            <a:schemeClr val="tx1"/>
+          </a:fontRef>
+        </p:style>
+      </p:cxnSp>
+      <p:cxnSp>
+        <p:nvCxnSpPr>
+          <p:cNvPr id="13" name="Straight Arrow Connector 12"/>
+          <p:cNvCxnSpPr>
+            <a:stCxn id="10" idx="2"/>
+            <a:endCxn id="9" idx="0"/>
+          </p:cNvCxnSpPr>
+          <p:nvPr/>
+        </p:nvCxnSpPr>
+        <p:spPr>
+          <a:xfrm>
+            <a:off x="7247015" y="2345103"/>
+            <a:ext cx="0" cy="670195"/>
+          </a:xfrm>
+          <a:prstGeom prst="straightConnector1">
+            <a:avLst/>
+          </a:prstGeom>
+          <a:ln w="38100">
+            <a:solidFill>
+              <a:schemeClr val="tx1"/>
+            </a:solidFill>
+            <a:tailEnd type="triangle"/>
+          </a:ln>
+        </p:spPr>
+        <p:style>
+          <a:lnRef idx="1">
+            <a:schemeClr val="accent1"/>
+          </a:lnRef>
+          <a:fillRef idx="0">
+            <a:schemeClr val="accent1"/>
+          </a:fillRef>
+          <a:effectRef idx="0">
+            <a:schemeClr val="accent1"/>
+          </a:effectRef>
+          <a:fontRef idx="minor">
+            <a:schemeClr val="tx1"/>
+          </a:fontRef>
+        </p:style>
+      </p:cxnSp>
+      <p:cxnSp>
+        <p:nvCxnSpPr>
+          <p:cNvPr id="18" name="Straight Arrow Connector 17"/>
+          <p:cNvCxnSpPr>
+            <a:stCxn id="8" idx="2"/>
+            <a:endCxn id="11" idx="0"/>
+          </p:cNvCxnSpPr>
+          <p:nvPr/>
+        </p:nvCxnSpPr>
+        <p:spPr>
+          <a:xfrm>
+            <a:off x="3798564" y="4178710"/>
+            <a:ext cx="0" cy="718611"/>
+          </a:xfrm>
+          <a:prstGeom prst="straightConnector1">
+            <a:avLst/>
+          </a:prstGeom>
+          <a:ln w="38100">
+            <a:solidFill>
+              <a:schemeClr val="tx1"/>
+            </a:solidFill>
+            <a:tailEnd type="triangle"/>
+          </a:ln>
+        </p:spPr>
+        <p:style>
+          <a:lnRef idx="1">
+            <a:schemeClr val="accent1"/>
+          </a:lnRef>
+          <a:fillRef idx="0">
+            <a:schemeClr val="accent1"/>
+          </a:fillRef>
+          <a:effectRef idx="0">
+            <a:schemeClr val="accent1"/>
+          </a:effectRef>
+          <a:fontRef idx="minor">
+            <a:schemeClr val="tx1"/>
+          </a:fontRef>
+        </p:style>
+      </p:cxnSp>
+      <p:cxnSp>
+        <p:nvCxnSpPr>
+          <p:cNvPr id="25" name="Straight Arrow Connector 24"/>
+          <p:cNvCxnSpPr>
+            <a:endCxn id="3" idx="0"/>
+          </p:cNvCxnSpPr>
+          <p:nvPr/>
+        </p:nvCxnSpPr>
+        <p:spPr>
+          <a:xfrm>
+            <a:off x="3807968" y="550606"/>
+            <a:ext cx="0" cy="631085"/>
+          </a:xfrm>
+          <a:prstGeom prst="straightConnector1">
+            <a:avLst/>
+          </a:prstGeom>
+          <a:ln w="38100">
+            <a:solidFill>
+              <a:schemeClr val="tx1"/>
+            </a:solidFill>
+            <a:tailEnd type="triangle"/>
+          </a:ln>
+        </p:spPr>
+        <p:style>
+          <a:lnRef idx="1">
+            <a:schemeClr val="accent1"/>
+          </a:lnRef>
+          <a:fillRef idx="0">
+            <a:schemeClr val="accent1"/>
+          </a:fillRef>
+          <a:effectRef idx="0">
+            <a:schemeClr val="accent1"/>
+          </a:effectRef>
+          <a:fontRef idx="minor">
+            <a:schemeClr val="tx1"/>
+          </a:fontRef>
+        </p:style>
+      </p:cxnSp>
+      <p:sp>
+        <p:nvSpPr>
+          <p:cNvPr id="14" name="TextBox 13"/>
+          <p:cNvSpPr txBox="1"/>
+          <p:nvPr/>
+        </p:nvSpPr>
+        <p:spPr>
+          <a:xfrm>
+            <a:off x="771558" y="1312398"/>
+            <a:ext cx="1857375" cy="1200329"/>
+          </a:xfrm>
+          <a:prstGeom prst="rect">
+            <a:avLst/>
+          </a:prstGeom>
+          <a:noFill/>
+        </p:spPr>
+        <p:txBody>
+          <a:bodyPr wrap="square" rtlCol="0">
+            <a:spAutoFit/>
+          </a:bodyPr>
+          <a:lstStyle/>
+          <a:p>
+            <a:r>
+              <a:rPr lang="en-US" dirty="0"/>
+              <a:t>Scenario </a:t>
+            </a:r>
+            <a:r>
+              <a:rPr lang="en-US" dirty="0" smtClean="0"/>
+              <a:t>2: Provider scheduling for new patient</a:t>
+            </a:r>
+            <a:endParaRPr lang="en-US" dirty="0"/>
+          </a:p>
+        </p:txBody>
+      </p:sp>
+      <p:sp>
+        <p:nvSpPr>
+          <p:cNvPr id="2" name="TextBox 1"/>
+          <p:cNvSpPr txBox="1"/>
+          <p:nvPr/>
+        </p:nvSpPr>
+        <p:spPr>
+          <a:xfrm>
+            <a:off x="5093467" y="896156"/>
+            <a:ext cx="858644" cy="923330"/>
+          </a:xfrm>
+          <a:prstGeom prst="rect">
+            <a:avLst/>
+          </a:prstGeom>
+          <a:noFill/>
+        </p:spPr>
+        <p:txBody>
+          <a:bodyPr wrap="square" rtlCol="0">
+            <a:spAutoFit/>
+          </a:bodyPr>
+          <a:lstStyle/>
+          <a:p>
+            <a:r>
+              <a:rPr lang="en-US" smtClean="0"/>
+              <a:t>No patient found</a:t>
+            </a:r>
+            <a:endParaRPr lang="en-US"/>
+          </a:p>
+        </p:txBody>
+      </p:sp>
+      <p:sp>
+        <p:nvSpPr>
+          <p:cNvPr id="15" name="Rounded Rectangle 14"/>
+          <p:cNvSpPr/>
+          <p:nvPr/>
+        </p:nvSpPr>
+        <p:spPr>
+          <a:xfrm>
+            <a:off x="6264430" y="4897321"/>
+            <a:ext cx="1965170" cy="1163412"/>
+          </a:xfrm>
+          <a:prstGeom prst="roundRect">
+            <a:avLst/>
+          </a:prstGeom>
+        </p:spPr>
+        <p:style>
+          <a:lnRef idx="2">
+            <a:schemeClr val="accent1">
+              <a:shade val="50000"/>
+            </a:schemeClr>
+          </a:lnRef>
+          <a:fillRef idx="1">
+            <a:schemeClr val="accent1"/>
+          </a:fillRef>
+          <a:effectRef idx="0">
+            <a:schemeClr val="accent1"/>
+          </a:effectRef>
+          <a:fontRef idx="minor">
+            <a:schemeClr val="lt1"/>
+          </a:fontRef>
+        </p:style>
+        <p:txBody>
+          <a:bodyPr rtlCol="0" anchor="ctr"/>
+          <a:lstStyle/>
+          <a:p>
+            <a:pPr marL="342900" indent="-342900">
+              <a:buFont typeface="+mj-lt"/>
+              <a:buAutoNum type="arabicPeriod" startAt="5"/>
+            </a:pPr>
+            <a:r>
+              <a:rPr lang="en-US" dirty="0" smtClean="0"/>
+              <a:t>Book appointment</a:t>
+            </a:r>
+            <a:endParaRPr lang="en-US" dirty="0"/>
+          </a:p>
+        </p:txBody>
+      </p:sp>
+      <p:cxnSp>
+        <p:nvCxnSpPr>
+          <p:cNvPr id="16" name="Straight Arrow Connector 15"/>
+          <p:cNvCxnSpPr/>
+          <p:nvPr/>
+        </p:nvCxnSpPr>
+        <p:spPr>
+          <a:xfrm>
+            <a:off x="7247015" y="6060733"/>
+            <a:ext cx="0" cy="644867"/>
+          </a:xfrm>
+          <a:prstGeom prst="straightConnector1">
+            <a:avLst/>
+          </a:prstGeom>
+          <a:ln w="38100">
+            <a:solidFill>
+              <a:schemeClr val="tx1"/>
+            </a:solidFill>
+            <a:tailEnd type="triangle"/>
+          </a:ln>
+        </p:spPr>
+        <p:style>
+          <a:lnRef idx="1">
+            <a:schemeClr val="accent1"/>
+          </a:lnRef>
+          <a:fillRef idx="0">
+            <a:schemeClr val="accent1"/>
+          </a:fillRef>
+          <a:effectRef idx="0">
+            <a:schemeClr val="accent1"/>
+          </a:effectRef>
+          <a:fontRef idx="minor">
+            <a:schemeClr val="tx1"/>
+          </a:fontRef>
+        </p:style>
+      </p:cxnSp>
+      <p:cxnSp>
+        <p:nvCxnSpPr>
+          <p:cNvPr id="17" name="Straight Arrow Connector 16"/>
+          <p:cNvCxnSpPr>
+            <a:stCxn id="11" idx="3"/>
+            <a:endCxn id="15" idx="1"/>
+          </p:cNvCxnSpPr>
+          <p:nvPr/>
+        </p:nvCxnSpPr>
+        <p:spPr>
+          <a:xfrm>
+            <a:off x="4781149" y="5479027"/>
+            <a:ext cx="1483281" cy="0"/>
+          </a:xfrm>
+          <a:prstGeom prst="straightConnector1">
+            <a:avLst/>
+          </a:prstGeom>
+          <a:ln w="38100">
+            <a:solidFill>
+              <a:schemeClr val="tx1"/>
+            </a:solidFill>
+            <a:tailEnd type="triangle"/>
+          </a:ln>
+        </p:spPr>
+        <p:style>
+          <a:lnRef idx="1">
+            <a:schemeClr val="accent1"/>
+          </a:lnRef>
+          <a:fillRef idx="0">
+            <a:schemeClr val="accent1"/>
+          </a:fillRef>
+          <a:effectRef idx="0">
+            <a:schemeClr val="accent1"/>
+          </a:effectRef>
+          <a:fontRef idx="minor">
+            <a:schemeClr val="tx1"/>
+          </a:fontRef>
+        </p:style>
+      </p:cxnSp>
+    </p:spTree>
+    <p:extLst>
+      <p:ext uri="{BB962C8B-B14F-4D97-AF65-F5344CB8AC3E}">
+        <p14:creationId xmlns:p14="http://schemas.microsoft.com/office/powerpoint/2010/main" val="1582717620"/>
+      </p:ext>
+    </p:extLst>
+  </p:cSld>
+  <p:clrMapOvr>
+    <a:masterClrMapping/>
+  </p:clrMapOvr>
 </p:sld>
 </file>
 

</xml_diff>

<commit_message>
drafts to patient use case
</commit_message>
<xml_diff>
--- a/meeting-notes/diagrams.pptx
+++ b/meeting-notes/diagrams.pptx
@@ -245,7 +245,7 @@
             <a:fld id="{7BDA92F8-9482-1145-B1E4-CE31E168D77D}" type="datetimeFigureOut">
               <a:rPr lang="en-US" smtClean="0"/>
               <a:pPr/>
-              <a:t>1/3/18</a:t>
+              <a:t>1/10/18</a:t>
             </a:fld>
             <a:endParaRPr lang="en-US"/>
           </a:p>
@@ -1326,7 +1326,7 @@
             <a:fld id="{150AD5B7-C160-7A4E-8FA5-E71465AAF732}" type="datetimeFigureOut">
               <a:rPr lang="en-US" smtClean="0"/>
               <a:pPr/>
-              <a:t>1/3/18</a:t>
+              <a:t>1/10/18</a:t>
             </a:fld>
             <a:endParaRPr lang="en-US"/>
           </a:p>
@@ -1498,7 +1498,7 @@
             <a:fld id="{150AD5B7-C160-7A4E-8FA5-E71465AAF732}" type="datetimeFigureOut">
               <a:rPr lang="en-US" smtClean="0"/>
               <a:pPr/>
-              <a:t>1/3/18</a:t>
+              <a:t>1/10/18</a:t>
             </a:fld>
             <a:endParaRPr lang="en-US"/>
           </a:p>
@@ -1680,7 +1680,7 @@
             <a:fld id="{150AD5B7-C160-7A4E-8FA5-E71465AAF732}" type="datetimeFigureOut">
               <a:rPr lang="en-US" smtClean="0"/>
               <a:pPr/>
-              <a:t>1/3/18</a:t>
+              <a:t>1/10/18</a:t>
             </a:fld>
             <a:endParaRPr lang="en-US"/>
           </a:p>
@@ -1852,7 +1852,7 @@
             <a:fld id="{150AD5B7-C160-7A4E-8FA5-E71465AAF732}" type="datetimeFigureOut">
               <a:rPr lang="en-US" smtClean="0"/>
               <a:pPr/>
-              <a:t>1/3/18</a:t>
+              <a:t>1/10/18</a:t>
             </a:fld>
             <a:endParaRPr lang="en-US"/>
           </a:p>
@@ -2100,7 +2100,7 @@
             <a:fld id="{150AD5B7-C160-7A4E-8FA5-E71465AAF732}" type="datetimeFigureOut">
               <a:rPr lang="en-US" smtClean="0"/>
               <a:pPr/>
-              <a:t>1/3/18</a:t>
+              <a:t>1/10/18</a:t>
             </a:fld>
             <a:endParaRPr lang="en-US"/>
           </a:p>
@@ -2334,7 +2334,7 @@
             <a:fld id="{150AD5B7-C160-7A4E-8FA5-E71465AAF732}" type="datetimeFigureOut">
               <a:rPr lang="en-US" smtClean="0"/>
               <a:pPr/>
-              <a:t>1/3/18</a:t>
+              <a:t>1/10/18</a:t>
             </a:fld>
             <a:endParaRPr lang="en-US"/>
           </a:p>
@@ -2703,7 +2703,7 @@
             <a:fld id="{150AD5B7-C160-7A4E-8FA5-E71465AAF732}" type="datetimeFigureOut">
               <a:rPr lang="en-US" smtClean="0"/>
               <a:pPr/>
-              <a:t>1/3/18</a:t>
+              <a:t>1/10/18</a:t>
             </a:fld>
             <a:endParaRPr lang="en-US"/>
           </a:p>
@@ -2823,7 +2823,7 @@
             <a:fld id="{150AD5B7-C160-7A4E-8FA5-E71465AAF732}" type="datetimeFigureOut">
               <a:rPr lang="en-US" smtClean="0"/>
               <a:pPr/>
-              <a:t>1/3/18</a:t>
+              <a:t>1/10/18</a:t>
             </a:fld>
             <a:endParaRPr lang="en-US"/>
           </a:p>
@@ -2920,7 +2920,7 @@
             <a:fld id="{150AD5B7-C160-7A4E-8FA5-E71465AAF732}" type="datetimeFigureOut">
               <a:rPr lang="en-US" smtClean="0"/>
               <a:pPr/>
-              <a:t>1/3/18</a:t>
+              <a:t>1/10/18</a:t>
             </a:fld>
             <a:endParaRPr lang="en-US"/>
           </a:p>
@@ -3199,7 +3199,7 @@
             <a:fld id="{150AD5B7-C160-7A4E-8FA5-E71465AAF732}" type="datetimeFigureOut">
               <a:rPr lang="en-US" smtClean="0"/>
               <a:pPr/>
-              <a:t>1/3/18</a:t>
+              <a:t>1/10/18</a:t>
             </a:fld>
             <a:endParaRPr lang="en-US"/>
           </a:p>
@@ -3454,7 +3454,7 @@
             <a:fld id="{150AD5B7-C160-7A4E-8FA5-E71465AAF732}" type="datetimeFigureOut">
               <a:rPr lang="en-US" smtClean="0"/>
               <a:pPr/>
-              <a:t>1/3/18</a:t>
+              <a:t>1/10/18</a:t>
             </a:fld>
             <a:endParaRPr lang="en-US"/>
           </a:p>
@@ -3669,7 +3669,7 @@
             <a:fld id="{150AD5B7-C160-7A4E-8FA5-E71465AAF732}" type="datetimeFigureOut">
               <a:rPr lang="en-US" smtClean="0"/>
               <a:pPr/>
-              <a:t>1/3/18</a:t>
+              <a:t>1/10/18</a:t>
             </a:fld>
             <a:endParaRPr lang="en-US"/>
           </a:p>
@@ -7262,7 +7262,15 @@
               </a:r>
               <a:r>
                 <a:rPr lang="en-US" dirty="0" smtClean="0"/>
-                <a:t> Slots* for Service(s) updated since last fetch</a:t>
+                <a:t> Slots</a:t>
+              </a:r>
+              <a:r>
+                <a:rPr lang="en-US" dirty="0" smtClean="0"/>
+                <a:t>* updated </a:t>
+              </a:r>
+              <a:r>
+                <a:rPr lang="en-US" dirty="0" smtClean="0"/>
+                <a:t>since last fetch</a:t>
               </a:r>
               <a:endParaRPr lang="en-US" dirty="0"/>
             </a:p>
@@ -7394,7 +7402,7 @@
         <p:spPr>
           <a:xfrm>
             <a:off x="3281082" y="731520"/>
-            <a:ext cx="4292302" cy="646331"/>
+            <a:ext cx="4292302" cy="369332"/>
           </a:xfrm>
           <a:prstGeom prst="rect">
             <a:avLst/>
@@ -7409,7 +7417,11 @@
           <a:p>
             <a:r>
               <a:rPr lang="en-US" dirty="0" smtClean="0"/>
-              <a:t>Pre-fetch Work Flow Option B </a:t>
+              <a:t>Pre-fetch Work </a:t>
+            </a:r>
+            <a:r>
+              <a:rPr lang="en-US" dirty="0" smtClean="0"/>
+              <a:t>Flow </a:t>
             </a:r>
             <a:r>
               <a:rPr lang="mr-IN" dirty="0" smtClean="0"/>
@@ -7417,7 +7429,11 @@
             </a:r>
             <a:r>
               <a:rPr lang="en-US" dirty="0" smtClean="0"/>
-              <a:t> Poll for updated slots</a:t>
+              <a:t> </a:t>
+            </a:r>
+            <a:r>
+              <a:rPr lang="en-US" dirty="0" smtClean="0"/>
+              <a:t>Poll for updated slots</a:t>
             </a:r>
             <a:endParaRPr lang="en-US" dirty="0"/>
           </a:p>
@@ -7432,7 +7448,7 @@
         <p:spPr>
           <a:xfrm>
             <a:off x="5125709" y="5120640"/>
-            <a:ext cx="3351317" cy="1477328"/>
+            <a:ext cx="3351317" cy="646331"/>
           </a:xfrm>
           <a:prstGeom prst="rect">
             <a:avLst/>
@@ -7445,37 +7461,30 @@
           </a:bodyPr>
           <a:lstStyle/>
           <a:p>
-            <a:pPr marL="285750" indent="-285750">
-              <a:buFont typeface="Arial" charset="0"/>
-              <a:buChar char="•"/>
-            </a:pPr>
             <a:r>
               <a:rPr lang="en-US" dirty="0" smtClean="0"/>
-              <a:t>*Include Schedule, Practitioner, Location</a:t>
-            </a:r>
-          </a:p>
-          <a:p>
-            <a:pPr marL="285750" indent="-285750">
-              <a:buFont typeface="Arial" charset="0"/>
-              <a:buChar char="•"/>
-            </a:pPr>
+              <a:t>* Interaction</a:t>
+            </a:r>
+            <a:r>
+              <a:rPr lang="en-US" dirty="0"/>
+              <a:t> </a:t>
+            </a:r>
+            <a:r>
+              <a:rPr lang="en-US" i="1" dirty="0"/>
+              <a:t>does not</a:t>
+            </a:r>
+            <a:r>
+              <a:rPr lang="en-US" dirty="0"/>
+              <a:t> </a:t>
+            </a:r>
             <a:r>
               <a:rPr lang="en-US" dirty="0" smtClean="0"/>
-              <a:t>Use the _history interaction as described </a:t>
-            </a:r>
-            <a:r>
-              <a:rPr lang="en-US" dirty="0" smtClean="0">
-                <a:hlinkClick r:id="rId3"/>
-              </a:rPr>
-              <a:t>here</a:t>
-            </a:r>
-            <a:endParaRPr lang="en-US" dirty="0" smtClean="0"/>
-          </a:p>
-          <a:p>
-            <a:pPr marL="285750" indent="-285750">
-              <a:buFont typeface="Arial" charset="0"/>
-              <a:buChar char="•"/>
-            </a:pPr>
+              <a:t>filter by </a:t>
+            </a:r>
+            <a:r>
+              <a:rPr lang="en-US" dirty="0"/>
+              <a:t>search parameters</a:t>
+            </a:r>
             <a:endParaRPr lang="en-US" dirty="0"/>
           </a:p>
         </p:txBody>
@@ -7489,7 +7498,7 @@
           <p:nvPr/>
         </p:nvPicPr>
         <p:blipFill>
-          <a:blip r:embed="rId4">
+          <a:blip r:embed="rId3">
             <a:extLst>
               <a:ext uri="{28A0092B-C50C-407E-A947-70E740481C1C}">
                 <a14:useLocalDpi xmlns:a14="http://schemas.microsoft.com/office/drawing/2010/main" val="0"/>
@@ -19440,11 +19449,7 @@
             </a:r>
             <a:r>
               <a:rPr lang="en-US" dirty="0" smtClean="0"/>
-              <a:t>registration/ coverage (option </a:t>
-            </a:r>
-            <a:r>
-              <a:rPr lang="en-US" dirty="0" smtClean="0"/>
-              <a:t>A)</a:t>
+              <a:t>registration/ coverage (option A)</a:t>
             </a:r>
             <a:endParaRPr lang="en-US" dirty="0"/>
           </a:p>
@@ -19587,7 +19592,6 @@
               <a:rPr lang="en-US" dirty="0"/>
               <a:t>Search for open appointments</a:t>
             </a:r>
-            <a:endParaRPr lang="en-US" dirty="0"/>
           </a:p>
         </p:txBody>
       </p:sp>
@@ -19810,11 +19814,7 @@
           <a:p>
             <a:r>
               <a:rPr lang="en-US" dirty="0"/>
-              <a:t>Scenario </a:t>
-            </a:r>
-            <a:r>
-              <a:rPr lang="en-US" dirty="0"/>
-              <a:t>3</a:t>
+              <a:t>Scenario 3</a:t>
             </a:r>
             <a:r>
               <a:rPr lang="en-US" dirty="0" smtClean="0"/>
@@ -19879,7 +19879,6 @@
               <a:rPr lang="en-US" dirty="0"/>
               <a:t>appointment (optional)</a:t>
             </a:r>
-            <a:endParaRPr lang="en-US" dirty="0"/>
           </a:p>
         </p:txBody>
       </p:sp>
@@ -19963,11 +19962,7 @@
             </a:pPr>
             <a:r>
               <a:rPr lang="en-US" dirty="0" smtClean="0"/>
-              <a:t>Patient registration/ coverage (option </a:t>
-            </a:r>
-            <a:r>
-              <a:rPr lang="en-US" dirty="0" smtClean="0"/>
-              <a:t>B)</a:t>
+              <a:t>Patient registration/ coverage (option B)</a:t>
             </a:r>
             <a:endParaRPr lang="en-US" dirty="0"/>
           </a:p>
@@ -20054,7 +20049,6 @@
               <a:rPr lang="en-US" dirty="0"/>
               <a:t>Patient coverage (option C)</a:t>
             </a:r>
-            <a:endParaRPr lang="en-US" dirty="0"/>
           </a:p>
         </p:txBody>
       </p:sp>
@@ -20101,7 +20095,6 @@
               <a:rPr lang="en-US" dirty="0"/>
               <a:t>Book appointment</a:t>
             </a:r>
-            <a:endParaRPr lang="en-US" dirty="0"/>
           </a:p>
         </p:txBody>
       </p:sp>

</xml_diff>

<commit_message>
drafted provider to provider workflow
</commit_message>
<xml_diff>
--- a/meeting-notes/diagrams.pptx
+++ b/meeting-notes/diagrams.pptx
@@ -5,7 +5,7 @@
     <p:sldMasterId id="2147483648" r:id="rId1"/>
   </p:sldMasterIdLst>
   <p:notesMasterIdLst>
-    <p:notesMasterId r:id="rId40"/>
+    <p:notesMasterId r:id="rId43"/>
   </p:notesMasterIdLst>
   <p:sldIdLst>
     <p:sldId id="256" r:id="rId2"/>
@@ -46,6 +46,9 @@
     <p:sldId id="298" r:id="rId37"/>
     <p:sldId id="299" r:id="rId38"/>
     <p:sldId id="300" r:id="rId39"/>
+    <p:sldId id="301" r:id="rId40"/>
+    <p:sldId id="302" r:id="rId41"/>
+    <p:sldId id="303" r:id="rId42"/>
   </p:sldIdLst>
   <p:sldSz cx="12192000" cy="6858000"/>
   <p:notesSz cx="6858000" cy="9144000"/>
@@ -4979,44 +4982,6 @@
           </a:p>
         </p:txBody>
       </p:sp>
-      <p:sp>
-        <p:nvSpPr>
-          <p:cNvPr id="26" name="TextBox 25"/>
-          <p:cNvSpPr txBox="1"/>
-          <p:nvPr/>
-        </p:nvSpPr>
-        <p:spPr>
-          <a:xfrm>
-            <a:off x="3281082" y="731520"/>
-            <a:ext cx="4292302" cy="646331"/>
-          </a:xfrm>
-          <a:prstGeom prst="rect">
-            <a:avLst/>
-          </a:prstGeom>
-          <a:noFill/>
-        </p:spPr>
-        <p:txBody>
-          <a:bodyPr wrap="square" rtlCol="0">
-            <a:spAutoFit/>
-          </a:bodyPr>
-          <a:lstStyle/>
-          <a:p>
-            <a:r>
-              <a:rPr lang="en-US" dirty="0" smtClean="0"/>
-              <a:t>Pre-fetch Work Flow </a:t>
-            </a:r>
-            <a:r>
-              <a:rPr lang="mr-IN" dirty="0" smtClean="0"/>
-              <a:t>–</a:t>
-            </a:r>
-            <a:r>
-              <a:rPr lang="en-US" dirty="0" smtClean="0"/>
-              <a:t> Option A Poll for open slots</a:t>
-            </a:r>
-            <a:endParaRPr lang="en-US" dirty="0"/>
-          </a:p>
-        </p:txBody>
-      </p:sp>
     </p:spTree>
     <p:extLst>
       <p:ext uri="{BB962C8B-B14F-4D97-AF65-F5344CB8AC3E}">
@@ -5583,44 +5548,6 @@
               <a:t> Application Server</a:t>
             </a:r>
             <a:endParaRPr lang="en-US" sz="2400" dirty="0"/>
-          </a:p>
-        </p:txBody>
-      </p:sp>
-      <p:sp>
-        <p:nvSpPr>
-          <p:cNvPr id="20" name="TextBox 19"/>
-          <p:cNvSpPr txBox="1"/>
-          <p:nvPr/>
-        </p:nvSpPr>
-        <p:spPr>
-          <a:xfrm>
-            <a:off x="3281082" y="731520"/>
-            <a:ext cx="4292302" cy="646331"/>
-          </a:xfrm>
-          <a:prstGeom prst="rect">
-            <a:avLst/>
-          </a:prstGeom>
-          <a:noFill/>
-        </p:spPr>
-        <p:txBody>
-          <a:bodyPr wrap="square" rtlCol="0">
-            <a:spAutoFit/>
-          </a:bodyPr>
-          <a:lstStyle/>
-          <a:p>
-            <a:r>
-              <a:rPr lang="en-US" dirty="0" smtClean="0"/>
-              <a:t>Pre-fetch Work Flow </a:t>
-            </a:r>
-            <a:r>
-              <a:rPr lang="mr-IN" dirty="0" smtClean="0"/>
-              <a:t>–</a:t>
-            </a:r>
-            <a:r>
-              <a:rPr lang="en-US" dirty="0" smtClean="0"/>
-              <a:t> Option A Poll for open slots</a:t>
-            </a:r>
-            <a:endParaRPr lang="en-US" dirty="0"/>
           </a:p>
         </p:txBody>
       </p:sp>
@@ -6665,44 +6592,6 @@
               <a:t> Application Server</a:t>
             </a:r>
             <a:endParaRPr lang="en-US" sz="2400" dirty="0"/>
-          </a:p>
-        </p:txBody>
-      </p:sp>
-      <p:sp>
-        <p:nvSpPr>
-          <p:cNvPr id="16" name="TextBox 15"/>
-          <p:cNvSpPr txBox="1"/>
-          <p:nvPr/>
-        </p:nvSpPr>
-        <p:spPr>
-          <a:xfrm>
-            <a:off x="3281082" y="731520"/>
-            <a:ext cx="4292302" cy="646331"/>
-          </a:xfrm>
-          <a:prstGeom prst="rect">
-            <a:avLst/>
-          </a:prstGeom>
-          <a:noFill/>
-        </p:spPr>
-        <p:txBody>
-          <a:bodyPr wrap="square" rtlCol="0">
-            <a:spAutoFit/>
-          </a:bodyPr>
-          <a:lstStyle/>
-          <a:p>
-            <a:r>
-              <a:rPr lang="en-US" dirty="0" smtClean="0"/>
-              <a:t>Pre-fetch Work Flow </a:t>
-            </a:r>
-            <a:r>
-              <a:rPr lang="mr-IN" dirty="0" smtClean="0"/>
-              <a:t>–</a:t>
-            </a:r>
-            <a:r>
-              <a:rPr lang="en-US" dirty="0" smtClean="0"/>
-              <a:t> Option A Poll for open slots</a:t>
-            </a:r>
-            <a:endParaRPr lang="en-US" dirty="0"/>
           </a:p>
         </p:txBody>
       </p:sp>
@@ -7396,52 +7285,6 @@
       </p:sp>
       <p:sp>
         <p:nvSpPr>
-          <p:cNvPr id="9" name="TextBox 8"/>
-          <p:cNvSpPr txBox="1"/>
-          <p:nvPr/>
-        </p:nvSpPr>
-        <p:spPr>
-          <a:xfrm>
-            <a:off x="3281082" y="731520"/>
-            <a:ext cx="4292302" cy="369332"/>
-          </a:xfrm>
-          <a:prstGeom prst="rect">
-            <a:avLst/>
-          </a:prstGeom>
-          <a:noFill/>
-        </p:spPr>
-        <p:txBody>
-          <a:bodyPr wrap="square" rtlCol="0">
-            <a:spAutoFit/>
-          </a:bodyPr>
-          <a:lstStyle/>
-          <a:p>
-            <a:r>
-              <a:rPr lang="en-US" dirty="0" smtClean="0"/>
-              <a:t>Pre-fetch Work </a:t>
-            </a:r>
-            <a:r>
-              <a:rPr lang="en-US" dirty="0" smtClean="0"/>
-              <a:t>Flow </a:t>
-            </a:r>
-            <a:r>
-              <a:rPr lang="mr-IN" dirty="0" smtClean="0"/>
-              <a:t>–</a:t>
-            </a:r>
-            <a:r>
-              <a:rPr lang="en-US" dirty="0" smtClean="0"/>
-              <a:t> </a:t>
-            </a:r>
-            <a:r>
-              <a:rPr lang="en-US" dirty="0" smtClean="0"/>
-              <a:t>Poll for updated slots</a:t>
-            </a:r>
-            <a:endParaRPr lang="en-US" dirty="0"/>
-          </a:p>
-        </p:txBody>
-      </p:sp>
-      <p:sp>
-        <p:nvSpPr>
           <p:cNvPr id="2" name="TextBox 1"/>
           <p:cNvSpPr txBox="1"/>
           <p:nvPr/>
@@ -7968,44 +7811,6 @@
       </p:pic>
       <p:sp>
         <p:nvSpPr>
-          <p:cNvPr id="20" name="TextBox 19"/>
-          <p:cNvSpPr txBox="1"/>
-          <p:nvPr/>
-        </p:nvSpPr>
-        <p:spPr>
-          <a:xfrm>
-            <a:off x="3281082" y="731520"/>
-            <a:ext cx="4292302" cy="646331"/>
-          </a:xfrm>
-          <a:prstGeom prst="rect">
-            <a:avLst/>
-          </a:prstGeom>
-          <a:noFill/>
-        </p:spPr>
-        <p:txBody>
-          <a:bodyPr wrap="square" rtlCol="0">
-            <a:spAutoFit/>
-          </a:bodyPr>
-          <a:lstStyle/>
-          <a:p>
-            <a:r>
-              <a:rPr lang="en-US" dirty="0" smtClean="0"/>
-              <a:t>Pre-fetch Work Flow Option C </a:t>
-            </a:r>
-            <a:r>
-              <a:rPr lang="mr-IN" dirty="0" smtClean="0"/>
-              <a:t>–</a:t>
-            </a:r>
-            <a:r>
-              <a:rPr lang="en-US" dirty="0" smtClean="0"/>
-              <a:t> Subscription for updated slots</a:t>
-            </a:r>
-            <a:endParaRPr lang="en-US" dirty="0"/>
-          </a:p>
-        </p:txBody>
-      </p:sp>
-      <p:sp>
-        <p:nvSpPr>
           <p:cNvPr id="2" name="Rectangle 1"/>
           <p:cNvSpPr/>
           <p:nvPr/>
@@ -10024,35 +9829,6 @@
           </a:prstGeom>
         </p:spPr>
       </p:pic>
-      <p:sp>
-        <p:nvSpPr>
-          <p:cNvPr id="2" name="Rectangle 1"/>
-          <p:cNvSpPr/>
-          <p:nvPr/>
-        </p:nvSpPr>
-        <p:spPr>
-          <a:xfrm>
-            <a:off x="3370962" y="947183"/>
-            <a:ext cx="4692567" cy="369332"/>
-          </a:xfrm>
-          <a:prstGeom prst="rect">
-            <a:avLst/>
-          </a:prstGeom>
-        </p:spPr>
-        <p:txBody>
-          <a:bodyPr wrap="none">
-            <a:spAutoFit/>
-          </a:bodyPr>
-          <a:lstStyle/>
-          <a:p>
-            <a:r>
-              <a:rPr lang="en-US" smtClean="0"/>
-              <a:t>Provider Scheduling Work Flow : Patient Match</a:t>
-            </a:r>
-            <a:endParaRPr lang="en-US" dirty="0"/>
-          </a:p>
-        </p:txBody>
-      </p:sp>
       <p:sp>
         <p:nvSpPr>
           <p:cNvPr id="39" name="Can 38"/>
@@ -10229,44 +10005,6 @@
             </a:fontRef>
           </p:style>
         </p:cxnSp>
-        <p:sp>
-          <p:nvSpPr>
-            <p:cNvPr id="57" name="TextBox 56"/>
-            <p:cNvSpPr txBox="1"/>
-            <p:nvPr/>
-          </p:nvSpPr>
-          <p:spPr>
-            <a:xfrm>
-              <a:off x="-755766" y="2260347"/>
-              <a:ext cx="1602903" cy="475630"/>
-            </a:xfrm>
-            <a:prstGeom prst="rect">
-              <a:avLst/>
-            </a:prstGeom>
-            <a:noFill/>
-            <a:ln w="25400">
-              <a:solidFill>
-                <a:schemeClr val="accent1">
-                  <a:shade val="50000"/>
-                </a:schemeClr>
-              </a:solidFill>
-            </a:ln>
-          </p:spPr>
-          <p:txBody>
-            <a:bodyPr wrap="square" rtlCol="0">
-              <a:spAutoFit/>
-            </a:bodyPr>
-            <a:lstStyle/>
-            <a:p>
-              <a:pPr algn="ctr"/>
-              <a:r>
-                <a:rPr lang="en-US" dirty="0" smtClean="0"/>
-                <a:t>A</a:t>
-              </a:r>
-              <a:endParaRPr lang="en-US" dirty="0"/>
-            </a:p>
-          </p:txBody>
-        </p:sp>
       </p:grpSp>
       <p:cxnSp>
         <p:nvCxnSpPr>
@@ -10304,43 +10042,6 @@
       </p:cxnSp>
       <p:sp>
         <p:nvSpPr>
-          <p:cNvPr id="59" name="TextBox 58"/>
-          <p:cNvSpPr txBox="1"/>
-          <p:nvPr/>
-        </p:nvSpPr>
-        <p:spPr>
-          <a:xfrm>
-            <a:off x="6483468" y="4003998"/>
-            <a:ext cx="431023" cy="369332"/>
-          </a:xfrm>
-          <a:prstGeom prst="rect">
-            <a:avLst/>
-          </a:prstGeom>
-          <a:noFill/>
-          <a:ln w="25400">
-            <a:solidFill>
-              <a:schemeClr val="accent1">
-                <a:shade val="50000"/>
-              </a:schemeClr>
-            </a:solidFill>
-          </a:ln>
-        </p:spPr>
-        <p:txBody>
-          <a:bodyPr wrap="square" rtlCol="0">
-            <a:spAutoFit/>
-          </a:bodyPr>
-          <a:lstStyle/>
-          <a:p>
-            <a:pPr algn="ctr"/>
-            <a:r>
-              <a:rPr lang="en-US" dirty="0"/>
-              <a:t>A</a:t>
-            </a:r>
-          </a:p>
-        </p:txBody>
-      </p:sp>
-      <p:sp>
-        <p:nvSpPr>
           <p:cNvPr id="60" name="TextBox 59"/>
           <p:cNvSpPr txBox="1"/>
           <p:nvPr/>
@@ -10396,11 +10097,15 @@
           <a:p>
             <a:r>
               <a:rPr lang="en-US" dirty="0" smtClean="0"/>
-              <a:t>(optional) End user updates patient demographics</a:t>
-            </a:r>
-            <a:r>
-              <a:rPr lang="en-US" dirty="0"/>
-              <a:t> </a:t>
+              <a:t>(optional) </a:t>
+            </a:r>
+            <a:r>
+              <a:rPr lang="en-US" dirty="0" smtClean="0"/>
+              <a:t>Patient supplies </a:t>
+            </a:r>
+            <a:r>
+              <a:rPr lang="en-US" smtClean="0"/>
+              <a:t>updated demographics </a:t>
             </a:r>
             <a:r>
               <a:rPr lang="en-US" dirty="0" smtClean="0"/>
@@ -10443,44 +10148,6 @@
           </a:fontRef>
         </p:style>
       </p:cxnSp>
-      <p:sp>
-        <p:nvSpPr>
-          <p:cNvPr id="63" name="TextBox 62"/>
-          <p:cNvSpPr txBox="1"/>
-          <p:nvPr/>
-        </p:nvSpPr>
-        <p:spPr>
-          <a:xfrm>
-            <a:off x="2168093" y="1810359"/>
-            <a:ext cx="333072" cy="369332"/>
-          </a:xfrm>
-          <a:prstGeom prst="rect">
-            <a:avLst/>
-          </a:prstGeom>
-          <a:noFill/>
-          <a:ln w="25400">
-            <a:solidFill>
-              <a:schemeClr val="accent1">
-                <a:shade val="50000"/>
-              </a:schemeClr>
-            </a:solidFill>
-          </a:ln>
-        </p:spPr>
-        <p:txBody>
-          <a:bodyPr wrap="square" rtlCol="0">
-            <a:spAutoFit/>
-          </a:bodyPr>
-          <a:lstStyle/>
-          <a:p>
-            <a:pPr algn="ctr"/>
-            <a:r>
-              <a:rPr lang="en-US" dirty="0" smtClean="0"/>
-              <a:t>A</a:t>
-            </a:r>
-            <a:endParaRPr lang="en-US" dirty="0"/>
-          </a:p>
-        </p:txBody>
-      </p:sp>
     </p:spTree>
     <p:extLst>
       <p:ext uri="{BB962C8B-B14F-4D97-AF65-F5344CB8AC3E}">
@@ -10542,39 +10209,6 @@
           </a:prstGeom>
         </p:spPr>
       </p:pic>
-      <p:sp>
-        <p:nvSpPr>
-          <p:cNvPr id="2" name="Rectangle 1"/>
-          <p:cNvSpPr/>
-          <p:nvPr/>
-        </p:nvSpPr>
-        <p:spPr>
-          <a:xfrm>
-            <a:off x="3370962" y="947183"/>
-            <a:ext cx="5589031" cy="369332"/>
-          </a:xfrm>
-          <a:prstGeom prst="rect">
-            <a:avLst/>
-          </a:prstGeom>
-        </p:spPr>
-        <p:txBody>
-          <a:bodyPr wrap="none">
-            <a:spAutoFit/>
-          </a:bodyPr>
-          <a:lstStyle/>
-          <a:p>
-            <a:r>
-              <a:rPr lang="en-US" dirty="0"/>
-              <a:t>Provider Scheduling Work Flow </a:t>
-            </a:r>
-            <a:r>
-              <a:rPr lang="en-US" dirty="0" smtClean="0"/>
-              <a:t>: New Patient Registration</a:t>
-            </a:r>
-            <a:endParaRPr lang="en-US" dirty="0"/>
-          </a:p>
-        </p:txBody>
-      </p:sp>
       <p:sp>
         <p:nvSpPr>
           <p:cNvPr id="39" name="Can 38"/>
@@ -10751,44 +10385,6 @@
             </a:fontRef>
           </p:style>
         </p:cxnSp>
-        <p:sp>
-          <p:nvSpPr>
-            <p:cNvPr id="57" name="TextBox 56"/>
-            <p:cNvSpPr txBox="1"/>
-            <p:nvPr/>
-          </p:nvSpPr>
-          <p:spPr>
-            <a:xfrm>
-              <a:off x="-755766" y="2260347"/>
-              <a:ext cx="1602903" cy="475630"/>
-            </a:xfrm>
-            <a:prstGeom prst="rect">
-              <a:avLst/>
-            </a:prstGeom>
-            <a:noFill/>
-            <a:ln w="25400">
-              <a:solidFill>
-                <a:schemeClr val="accent1">
-                  <a:shade val="50000"/>
-                </a:schemeClr>
-              </a:solidFill>
-            </a:ln>
-          </p:spPr>
-          <p:txBody>
-            <a:bodyPr wrap="square" rtlCol="0">
-              <a:spAutoFit/>
-            </a:bodyPr>
-            <a:lstStyle/>
-            <a:p>
-              <a:pPr algn="ctr"/>
-              <a:r>
-                <a:rPr lang="en-US" dirty="0" smtClean="0"/>
-                <a:t>A</a:t>
-              </a:r>
-              <a:endParaRPr lang="en-US" dirty="0"/>
-            </a:p>
-          </p:txBody>
-        </p:sp>
       </p:grpSp>
       <p:cxnSp>
         <p:nvCxnSpPr>
@@ -10826,43 +10422,6 @@
       </p:cxnSp>
       <p:sp>
         <p:nvSpPr>
-          <p:cNvPr id="59" name="TextBox 58"/>
-          <p:cNvSpPr txBox="1"/>
-          <p:nvPr/>
-        </p:nvSpPr>
-        <p:spPr>
-          <a:xfrm>
-            <a:off x="6483468" y="4003998"/>
-            <a:ext cx="431023" cy="369332"/>
-          </a:xfrm>
-          <a:prstGeom prst="rect">
-            <a:avLst/>
-          </a:prstGeom>
-          <a:noFill/>
-          <a:ln w="25400">
-            <a:solidFill>
-              <a:schemeClr val="accent1">
-                <a:shade val="50000"/>
-              </a:schemeClr>
-            </a:solidFill>
-          </a:ln>
-        </p:spPr>
-        <p:txBody>
-          <a:bodyPr wrap="square" rtlCol="0">
-            <a:spAutoFit/>
-          </a:bodyPr>
-          <a:lstStyle/>
-          <a:p>
-            <a:pPr algn="ctr"/>
-            <a:r>
-              <a:rPr lang="en-US" dirty="0"/>
-              <a:t>A</a:t>
-            </a:r>
-          </a:p>
-        </p:txBody>
-      </p:sp>
-      <p:sp>
-        <p:nvSpPr>
           <p:cNvPr id="60" name="TextBox 59"/>
           <p:cNvSpPr txBox="1"/>
           <p:nvPr/>
@@ -10903,7 +10462,7 @@
         <p:spPr>
           <a:xfrm>
             <a:off x="2119868" y="2199342"/>
-            <a:ext cx="1736532" cy="1477328"/>
+            <a:ext cx="1736532" cy="1200329"/>
           </a:xfrm>
           <a:prstGeom prst="rect">
             <a:avLst/>
@@ -10918,12 +10477,14 @@
           <a:p>
             <a:r>
               <a:rPr lang="en-US" dirty="0" smtClean="0"/>
-              <a:t>(optional) End user updates patient demographics</a:t>
-            </a:r>
-            <a:r>
-              <a:rPr lang="en-US" dirty="0"/>
-              <a:t> </a:t>
-            </a:r>
+              <a:t>(optional) </a:t>
+            </a:r>
+            <a:r>
+              <a:rPr lang="en-US" dirty="0" smtClean="0"/>
+              <a:t>Patient supplies demographic</a:t>
+            </a:r>
+          </a:p>
+          <a:p>
             <a:r>
               <a:rPr lang="en-US" dirty="0" smtClean="0"/>
               <a:t>information</a:t>
@@ -10965,44 +10526,6 @@
           </a:fontRef>
         </p:style>
       </p:cxnSp>
-      <p:sp>
-        <p:nvSpPr>
-          <p:cNvPr id="63" name="TextBox 62"/>
-          <p:cNvSpPr txBox="1"/>
-          <p:nvPr/>
-        </p:nvSpPr>
-        <p:spPr>
-          <a:xfrm>
-            <a:off x="2168093" y="1810359"/>
-            <a:ext cx="333072" cy="369332"/>
-          </a:xfrm>
-          <a:prstGeom prst="rect">
-            <a:avLst/>
-          </a:prstGeom>
-          <a:noFill/>
-          <a:ln w="25400">
-            <a:solidFill>
-              <a:schemeClr val="accent1">
-                <a:shade val="50000"/>
-              </a:schemeClr>
-            </a:solidFill>
-          </a:ln>
-        </p:spPr>
-        <p:txBody>
-          <a:bodyPr wrap="square" rtlCol="0">
-            <a:spAutoFit/>
-          </a:bodyPr>
-          <a:lstStyle/>
-          <a:p>
-            <a:pPr algn="ctr"/>
-            <a:r>
-              <a:rPr lang="en-US" dirty="0" smtClean="0"/>
-              <a:t>A</a:t>
-            </a:r>
-            <a:endParaRPr lang="en-US" dirty="0"/>
-          </a:p>
-        </p:txBody>
-      </p:sp>
     </p:spTree>
     <p:extLst>
       <p:ext uri="{BB962C8B-B14F-4D97-AF65-F5344CB8AC3E}">
@@ -11066,39 +10589,6 @@
       </p:pic>
       <p:sp>
         <p:nvSpPr>
-          <p:cNvPr id="2" name="Rectangle 1"/>
-          <p:cNvSpPr/>
-          <p:nvPr/>
-        </p:nvSpPr>
-        <p:spPr>
-          <a:xfrm>
-            <a:off x="3370962" y="947183"/>
-            <a:ext cx="5008359" cy="369332"/>
-          </a:xfrm>
-          <a:prstGeom prst="rect">
-            <a:avLst/>
-          </a:prstGeom>
-        </p:spPr>
-        <p:txBody>
-          <a:bodyPr wrap="none">
-            <a:spAutoFit/>
-          </a:bodyPr>
-          <a:lstStyle/>
-          <a:p>
-            <a:r>
-              <a:rPr lang="en-US" dirty="0"/>
-              <a:t>Provider Scheduling Work Flow </a:t>
-            </a:r>
-            <a:r>
-              <a:rPr lang="en-US" dirty="0" smtClean="0"/>
-              <a:t>: Update Coverage</a:t>
-            </a:r>
-            <a:endParaRPr lang="en-US" dirty="0"/>
-          </a:p>
-        </p:txBody>
-      </p:sp>
-      <p:sp>
-        <p:nvSpPr>
           <p:cNvPr id="39" name="Can 38"/>
           <p:cNvSpPr/>
           <p:nvPr/>
@@ -11200,7 +10690,7 @@
         </p:nvGrpSpPr>
         <p:grpSpPr>
           <a:xfrm>
-            <a:off x="6482947" y="2743201"/>
+            <a:off x="6468835" y="2730501"/>
             <a:ext cx="2713910" cy="756504"/>
             <a:chOff x="-1796260" y="2124752"/>
             <a:chExt cx="10092590" cy="1022801"/>
@@ -11273,44 +10763,6 @@
             </a:fontRef>
           </p:style>
         </p:cxnSp>
-        <p:sp>
-          <p:nvSpPr>
-            <p:cNvPr id="57" name="TextBox 56"/>
-            <p:cNvSpPr txBox="1"/>
-            <p:nvPr/>
-          </p:nvSpPr>
-          <p:spPr>
-            <a:xfrm>
-              <a:off x="-755766" y="2260347"/>
-              <a:ext cx="1602903" cy="475630"/>
-            </a:xfrm>
-            <a:prstGeom prst="rect">
-              <a:avLst/>
-            </a:prstGeom>
-            <a:noFill/>
-            <a:ln w="25400">
-              <a:solidFill>
-                <a:schemeClr val="accent1">
-                  <a:shade val="50000"/>
-                </a:schemeClr>
-              </a:solidFill>
-            </a:ln>
-          </p:spPr>
-          <p:txBody>
-            <a:bodyPr wrap="square" rtlCol="0">
-              <a:spAutoFit/>
-            </a:bodyPr>
-            <a:lstStyle/>
-            <a:p>
-              <a:pPr algn="ctr"/>
-              <a:r>
-                <a:rPr lang="en-US" dirty="0" smtClean="0"/>
-                <a:t>A</a:t>
-              </a:r>
-              <a:endParaRPr lang="en-US" dirty="0"/>
-            </a:p>
-          </p:txBody>
-        </p:sp>
       </p:grpSp>
       <p:cxnSp>
         <p:nvCxnSpPr>
@@ -11348,43 +10800,6 @@
       </p:cxnSp>
       <p:sp>
         <p:nvSpPr>
-          <p:cNvPr id="59" name="TextBox 58"/>
-          <p:cNvSpPr txBox="1"/>
-          <p:nvPr/>
-        </p:nvSpPr>
-        <p:spPr>
-          <a:xfrm>
-            <a:off x="6483468" y="4003998"/>
-            <a:ext cx="431023" cy="369332"/>
-          </a:xfrm>
-          <a:prstGeom prst="rect">
-            <a:avLst/>
-          </a:prstGeom>
-          <a:noFill/>
-          <a:ln w="25400">
-            <a:solidFill>
-              <a:schemeClr val="accent1">
-                <a:shade val="50000"/>
-              </a:schemeClr>
-            </a:solidFill>
-          </a:ln>
-        </p:spPr>
-        <p:txBody>
-          <a:bodyPr wrap="square" rtlCol="0">
-            <a:spAutoFit/>
-          </a:bodyPr>
-          <a:lstStyle/>
-          <a:p>
-            <a:pPr algn="ctr"/>
-            <a:r>
-              <a:rPr lang="en-US" dirty="0"/>
-              <a:t>A</a:t>
-            </a:r>
-          </a:p>
-        </p:txBody>
-      </p:sp>
-      <p:sp>
-        <p:nvSpPr>
           <p:cNvPr id="60" name="TextBox 59"/>
           <p:cNvSpPr txBox="1"/>
           <p:nvPr/>
@@ -11439,8 +10854,16 @@
           <a:lstStyle/>
           <a:p>
             <a:r>
+              <a:rPr lang="en-US" dirty="0"/>
+              <a:t>(optional) Patient </a:t>
+            </a:r>
+            <a:r>
               <a:rPr lang="en-US" dirty="0" smtClean="0"/>
-              <a:t>(optional) End user updates patient coverage information</a:t>
+              <a:t>supplies updated coverage </a:t>
+            </a:r>
+            <a:r>
+              <a:rPr lang="en-US" dirty="0" smtClean="0"/>
+              <a:t>information</a:t>
             </a:r>
             <a:endParaRPr lang="en-US" dirty="0"/>
           </a:p>
@@ -11479,44 +10902,6 @@
           </a:fontRef>
         </p:style>
       </p:cxnSp>
-      <p:sp>
-        <p:nvSpPr>
-          <p:cNvPr id="63" name="TextBox 62"/>
-          <p:cNvSpPr txBox="1"/>
-          <p:nvPr/>
-        </p:nvSpPr>
-        <p:spPr>
-          <a:xfrm>
-            <a:off x="2168093" y="1810359"/>
-            <a:ext cx="333072" cy="369332"/>
-          </a:xfrm>
-          <a:prstGeom prst="rect">
-            <a:avLst/>
-          </a:prstGeom>
-          <a:noFill/>
-          <a:ln w="25400">
-            <a:solidFill>
-              <a:schemeClr val="accent1">
-                <a:shade val="50000"/>
-              </a:schemeClr>
-            </a:solidFill>
-          </a:ln>
-        </p:spPr>
-        <p:txBody>
-          <a:bodyPr wrap="square" rtlCol="0">
-            <a:spAutoFit/>
-          </a:bodyPr>
-          <a:lstStyle/>
-          <a:p>
-            <a:pPr algn="ctr"/>
-            <a:r>
-              <a:rPr lang="en-US" dirty="0" smtClean="0"/>
-              <a:t>A</a:t>
-            </a:r>
-            <a:endParaRPr lang="en-US" dirty="0"/>
-          </a:p>
-        </p:txBody>
-      </p:sp>
     </p:spTree>
     <p:extLst>
       <p:ext uri="{BB962C8B-B14F-4D97-AF65-F5344CB8AC3E}">
@@ -11578,39 +10963,6 @@
           </a:prstGeom>
         </p:spPr>
       </p:pic>
-      <p:sp>
-        <p:nvSpPr>
-          <p:cNvPr id="2" name="Rectangle 1"/>
-          <p:cNvSpPr/>
-          <p:nvPr/>
-        </p:nvSpPr>
-        <p:spPr>
-          <a:xfrm>
-            <a:off x="3370962" y="947183"/>
-            <a:ext cx="5639044" cy="369332"/>
-          </a:xfrm>
-          <a:prstGeom prst="rect">
-            <a:avLst/>
-          </a:prstGeom>
-        </p:spPr>
-        <p:txBody>
-          <a:bodyPr wrap="none">
-            <a:spAutoFit/>
-          </a:bodyPr>
-          <a:lstStyle/>
-          <a:p>
-            <a:r>
-              <a:rPr lang="en-US" dirty="0"/>
-              <a:t>Provider Scheduling Work Flow :  </a:t>
-            </a:r>
-            <a:r>
-              <a:rPr lang="en-US" dirty="0" smtClean="0"/>
-              <a:t>Appointment Availability</a:t>
-            </a:r>
-            <a:endParaRPr lang="en-US" dirty="0"/>
-          </a:p>
-        </p:txBody>
-      </p:sp>
       <p:sp>
         <p:nvSpPr>
           <p:cNvPr id="39" name="Can 38"/>
@@ -11787,44 +11139,6 @@
             </a:fontRef>
           </p:style>
         </p:cxnSp>
-        <p:sp>
-          <p:nvSpPr>
-            <p:cNvPr id="23" name="TextBox 22"/>
-            <p:cNvSpPr txBox="1"/>
-            <p:nvPr/>
-          </p:nvSpPr>
-          <p:spPr>
-            <a:xfrm>
-              <a:off x="-1771812" y="2209681"/>
-              <a:ext cx="1580394" cy="499340"/>
-            </a:xfrm>
-            <a:prstGeom prst="rect">
-              <a:avLst/>
-            </a:prstGeom>
-            <a:noFill/>
-            <a:ln w="25400">
-              <a:solidFill>
-                <a:schemeClr val="accent1">
-                  <a:shade val="50000"/>
-                </a:schemeClr>
-              </a:solidFill>
-            </a:ln>
-          </p:spPr>
-          <p:txBody>
-            <a:bodyPr wrap="square" rtlCol="0">
-              <a:spAutoFit/>
-            </a:bodyPr>
-            <a:lstStyle/>
-            <a:p>
-              <a:pPr algn="ctr"/>
-              <a:r>
-                <a:rPr lang="en-US" dirty="0" smtClean="0"/>
-                <a:t>A</a:t>
-              </a:r>
-              <a:endParaRPr lang="en-US" dirty="0"/>
-            </a:p>
-          </p:txBody>
-        </p:sp>
       </p:grpSp>
       <p:cxnSp>
         <p:nvCxnSpPr>
@@ -11862,43 +11176,6 @@
       </p:cxnSp>
       <p:sp>
         <p:nvSpPr>
-          <p:cNvPr id="25" name="TextBox 24"/>
-          <p:cNvSpPr txBox="1"/>
-          <p:nvPr/>
-        </p:nvSpPr>
-        <p:spPr>
-          <a:xfrm>
-            <a:off x="6483468" y="4003998"/>
-            <a:ext cx="431023" cy="369332"/>
-          </a:xfrm>
-          <a:prstGeom prst="rect">
-            <a:avLst/>
-          </a:prstGeom>
-          <a:noFill/>
-          <a:ln w="25400">
-            <a:solidFill>
-              <a:schemeClr val="accent1">
-                <a:shade val="50000"/>
-              </a:schemeClr>
-            </a:solidFill>
-          </a:ln>
-        </p:spPr>
-        <p:txBody>
-          <a:bodyPr wrap="square" rtlCol="0">
-            <a:spAutoFit/>
-          </a:bodyPr>
-          <a:lstStyle/>
-          <a:p>
-            <a:pPr algn="ctr"/>
-            <a:r>
-              <a:rPr lang="en-US" dirty="0"/>
-              <a:t>A</a:t>
-            </a:r>
-          </a:p>
-        </p:txBody>
-      </p:sp>
-      <p:sp>
-        <p:nvSpPr>
           <p:cNvPr id="26" name="TextBox 25"/>
           <p:cNvSpPr txBox="1"/>
           <p:nvPr/>
@@ -11954,7 +11231,15 @@
           <a:p>
             <a:r>
               <a:rPr lang="en-US" dirty="0" smtClean="0"/>
-              <a:t>(optional) End user provides information (</a:t>
+              <a:t>(optional) </a:t>
+            </a:r>
+            <a:r>
+              <a:rPr lang="en-US" dirty="0" smtClean="0"/>
+              <a:t>patient </a:t>
+            </a:r>
+            <a:r>
+              <a:rPr lang="en-US" dirty="0" smtClean="0"/>
+              <a:t>provides information (</a:t>
             </a:r>
             <a:r>
               <a:rPr lang="en-US" dirty="0" err="1" smtClean="0"/>
@@ -12001,44 +11286,6 @@
           </a:fontRef>
         </p:style>
       </p:cxnSp>
-      <p:sp>
-        <p:nvSpPr>
-          <p:cNvPr id="35" name="TextBox 34"/>
-          <p:cNvSpPr txBox="1"/>
-          <p:nvPr/>
-        </p:nvSpPr>
-        <p:spPr>
-          <a:xfrm>
-            <a:off x="2168093" y="1810359"/>
-            <a:ext cx="333072" cy="369332"/>
-          </a:xfrm>
-          <a:prstGeom prst="rect">
-            <a:avLst/>
-          </a:prstGeom>
-          <a:noFill/>
-          <a:ln w="25400">
-            <a:solidFill>
-              <a:schemeClr val="accent1">
-                <a:shade val="50000"/>
-              </a:schemeClr>
-            </a:solidFill>
-          </a:ln>
-        </p:spPr>
-        <p:txBody>
-          <a:bodyPr wrap="square" rtlCol="0">
-            <a:spAutoFit/>
-          </a:bodyPr>
-          <a:lstStyle/>
-          <a:p>
-            <a:pPr algn="ctr"/>
-            <a:r>
-              <a:rPr lang="en-US" dirty="0" smtClean="0"/>
-              <a:t>A</a:t>
-            </a:r>
-            <a:endParaRPr lang="en-US" dirty="0"/>
-          </a:p>
-        </p:txBody>
-      </p:sp>
     </p:spTree>
     <p:extLst>
       <p:ext uri="{BB962C8B-B14F-4D97-AF65-F5344CB8AC3E}">
@@ -12102,34 +11349,6 @@
       </p:pic>
       <p:sp>
         <p:nvSpPr>
-          <p:cNvPr id="2" name="Rectangle 1"/>
-          <p:cNvSpPr/>
-          <p:nvPr/>
-        </p:nvSpPr>
-        <p:spPr>
-          <a:xfrm>
-            <a:off x="3370962" y="947183"/>
-            <a:ext cx="5639044" cy="369332"/>
-          </a:xfrm>
-          <a:prstGeom prst="rect">
-            <a:avLst/>
-          </a:prstGeom>
-        </p:spPr>
-        <p:txBody>
-          <a:bodyPr wrap="none">
-            <a:spAutoFit/>
-          </a:bodyPr>
-          <a:lstStyle/>
-          <a:p>
-            <a:r>
-              <a:rPr lang="en-US" dirty="0"/>
-              <a:t>Provider Scheduling Work Flow :  Hold/Book Appointment</a:t>
-            </a:r>
-          </a:p>
-        </p:txBody>
-      </p:sp>
-      <p:sp>
-        <p:nvSpPr>
           <p:cNvPr id="39" name="Can 38"/>
           <p:cNvSpPr/>
           <p:nvPr/>
@@ -12223,210 +11442,16 @@
           </a:p>
         </p:txBody>
       </p:sp>
-      <p:grpSp>
-        <p:nvGrpSpPr>
-          <p:cNvPr id="20" name="Group 19"/>
-          <p:cNvGrpSpPr/>
-          <p:nvPr/>
-        </p:nvGrpSpPr>
-        <p:grpSpPr>
-          <a:xfrm>
-            <a:off x="6482947" y="2719537"/>
-            <a:ext cx="2713910" cy="780169"/>
-            <a:chOff x="-1796260" y="2092757"/>
-            <a:chExt cx="10092590" cy="1054796"/>
-          </a:xfrm>
-        </p:grpSpPr>
-        <p:sp>
-          <p:nvSpPr>
-            <p:cNvPr id="21" name="TextBox 20"/>
-            <p:cNvSpPr txBox="1"/>
-            <p:nvPr/>
-          </p:nvSpPr>
-          <p:spPr>
-            <a:xfrm>
-              <a:off x="260056" y="2092757"/>
-              <a:ext cx="7983794" cy="873846"/>
-            </a:xfrm>
-            <a:prstGeom prst="rect">
-              <a:avLst/>
-            </a:prstGeom>
-            <a:solidFill>
-              <a:schemeClr val="bg1"/>
-            </a:solidFill>
-            <a:effectLst/>
-          </p:spPr>
-          <p:txBody>
-            <a:bodyPr wrap="square" rtlCol="0">
-              <a:spAutoFit/>
-            </a:bodyPr>
-            <a:lstStyle/>
-            <a:p>
-              <a:r>
-                <a:rPr lang="en-US" dirty="0" smtClean="0"/>
-                <a:t>Holds/Books </a:t>
-              </a:r>
-              <a:r>
-                <a:rPr lang="en-US" dirty="0"/>
-                <a:t>Appointment</a:t>
-              </a:r>
-            </a:p>
-          </p:txBody>
-        </p:sp>
-        <p:cxnSp>
-          <p:nvCxnSpPr>
-            <p:cNvPr id="22" name="Straight Arrow Connector 21"/>
-            <p:cNvCxnSpPr/>
-            <p:nvPr/>
-          </p:nvCxnSpPr>
-          <p:spPr>
-            <a:xfrm>
-              <a:off x="-1796260" y="3134605"/>
-              <a:ext cx="10092590" cy="12948"/>
-            </a:xfrm>
-            <a:prstGeom prst="straightConnector1">
-              <a:avLst/>
-            </a:prstGeom>
-            <a:ln w="63500">
-              <a:headEnd type="none"/>
-              <a:tailEnd type="triangle"/>
-            </a:ln>
-          </p:spPr>
-          <p:style>
-            <a:lnRef idx="1">
-              <a:schemeClr val="accent1"/>
-            </a:lnRef>
-            <a:fillRef idx="0">
-              <a:schemeClr val="accent1"/>
-            </a:fillRef>
-            <a:effectRef idx="0">
-              <a:schemeClr val="accent1"/>
-            </a:effectRef>
-            <a:fontRef idx="minor">
-              <a:schemeClr val="tx1"/>
-            </a:fontRef>
-          </p:style>
-        </p:cxnSp>
-        <p:sp>
-          <p:nvSpPr>
-            <p:cNvPr id="23" name="TextBox 22"/>
-            <p:cNvSpPr txBox="1"/>
-            <p:nvPr/>
-          </p:nvSpPr>
-          <p:spPr>
-            <a:xfrm>
-              <a:off x="-1771812" y="2209681"/>
-              <a:ext cx="1580394" cy="499340"/>
-            </a:xfrm>
-            <a:prstGeom prst="rect">
-              <a:avLst/>
-            </a:prstGeom>
-            <a:noFill/>
-            <a:ln w="25400">
-              <a:solidFill>
-                <a:schemeClr val="accent1">
-                  <a:shade val="50000"/>
-                </a:schemeClr>
-              </a:solidFill>
-            </a:ln>
-          </p:spPr>
-          <p:txBody>
-            <a:bodyPr wrap="square" rtlCol="0">
-              <a:spAutoFit/>
-            </a:bodyPr>
-            <a:lstStyle/>
-            <a:p>
-              <a:pPr algn="ctr"/>
-              <a:r>
-                <a:rPr lang="en-US" dirty="0" smtClean="0"/>
-                <a:t>A</a:t>
-              </a:r>
-              <a:endParaRPr lang="en-US" dirty="0"/>
-            </a:p>
-          </p:txBody>
-        </p:sp>
-      </p:grpSp>
-      <p:cxnSp>
-        <p:nvCxnSpPr>
-          <p:cNvPr id="24" name="Straight Arrow Connector 23"/>
-          <p:cNvCxnSpPr/>
-          <p:nvPr/>
-        </p:nvCxnSpPr>
-        <p:spPr>
-          <a:xfrm>
-            <a:off x="6468835" y="3680645"/>
-            <a:ext cx="2713910" cy="8575"/>
-          </a:xfrm>
-          <a:prstGeom prst="straightConnector1">
-            <a:avLst/>
-          </a:prstGeom>
-          <a:ln w="63500">
-            <a:headEnd type="triangle"/>
-            <a:tailEnd type="none"/>
-          </a:ln>
-        </p:spPr>
-        <p:style>
-          <a:lnRef idx="1">
-            <a:schemeClr val="accent1"/>
-          </a:lnRef>
-          <a:fillRef idx="0">
-            <a:schemeClr val="accent1"/>
-          </a:fillRef>
-          <a:effectRef idx="0">
-            <a:schemeClr val="accent1"/>
-          </a:effectRef>
-          <a:fontRef idx="minor">
-            <a:schemeClr val="tx1"/>
-          </a:fontRef>
-        </p:style>
-      </p:cxnSp>
-      <p:sp>
-        <p:nvSpPr>
-          <p:cNvPr id="25" name="TextBox 24"/>
+      <p:sp>
+        <p:nvSpPr>
+          <p:cNvPr id="21" name="TextBox 20"/>
           <p:cNvSpPr txBox="1"/>
           <p:nvPr/>
         </p:nvSpPr>
         <p:spPr>
           <a:xfrm>
-            <a:off x="6483468" y="4003998"/>
-            <a:ext cx="431023" cy="369332"/>
-          </a:xfrm>
-          <a:prstGeom prst="rect">
-            <a:avLst/>
-          </a:prstGeom>
-          <a:noFill/>
-          <a:ln w="25400">
-            <a:solidFill>
-              <a:schemeClr val="accent1">
-                <a:shade val="50000"/>
-              </a:schemeClr>
-            </a:solidFill>
-          </a:ln>
-        </p:spPr>
-        <p:txBody>
-          <a:bodyPr wrap="square" rtlCol="0">
-            <a:spAutoFit/>
-          </a:bodyPr>
-          <a:lstStyle/>
-          <a:p>
-            <a:pPr algn="ctr"/>
-            <a:r>
-              <a:rPr lang="en-US" dirty="0"/>
-              <a:t>A</a:t>
-            </a:r>
-          </a:p>
-        </p:txBody>
-      </p:sp>
-      <p:sp>
-        <p:nvSpPr>
-          <p:cNvPr id="26" name="TextBox 25"/>
-          <p:cNvSpPr txBox="1"/>
-          <p:nvPr/>
-        </p:nvSpPr>
-        <p:spPr>
-          <a:xfrm>
-            <a:off x="6914492" y="3890367"/>
-            <a:ext cx="2282366" cy="923330"/>
+            <a:off x="6752364" y="2813266"/>
+            <a:ext cx="2146852" cy="369332"/>
           </a:xfrm>
           <a:prstGeom prst="rect">
             <a:avLst/>
@@ -12443,61 +11468,32 @@
           <a:lstStyle/>
           <a:p>
             <a:r>
-              <a:rPr lang="en-US" dirty="0" smtClean="0"/>
-              <a:t>Returns Confirmation with patient ID </a:t>
+              <a:rPr lang="en-US" smtClean="0"/>
+              <a:t>Hold </a:t>
             </a:r>
             <a:r>
               <a:rPr lang="en-US" dirty="0"/>
-              <a:t>or Rejection</a:t>
-            </a:r>
-          </a:p>
-        </p:txBody>
-      </p:sp>
-      <p:sp>
-        <p:nvSpPr>
-          <p:cNvPr id="13" name="TextBox 12"/>
-          <p:cNvSpPr txBox="1"/>
-          <p:nvPr/>
-        </p:nvSpPr>
-        <p:spPr>
-          <a:xfrm>
-            <a:off x="2104435" y="2261452"/>
-            <a:ext cx="1736532" cy="923330"/>
-          </a:xfrm>
-          <a:prstGeom prst="rect">
-            <a:avLst/>
-          </a:prstGeom>
-          <a:noFill/>
-        </p:spPr>
-        <p:txBody>
-          <a:bodyPr wrap="square" rtlCol="0">
-            <a:spAutoFit/>
-          </a:bodyPr>
-          <a:lstStyle/>
-          <a:p>
-            <a:r>
-              <a:rPr lang="en-US" dirty="0" smtClean="0"/>
-              <a:t>End user selects from available appointments</a:t>
-            </a:r>
-            <a:endParaRPr lang="en-US" dirty="0"/>
+              <a:t>Appointment</a:t>
+            </a:r>
           </a:p>
         </p:txBody>
       </p:sp>
       <p:cxnSp>
         <p:nvCxnSpPr>
-          <p:cNvPr id="14" name="Straight Arrow Connector 13"/>
+          <p:cNvPr id="22" name="Straight Arrow Connector 21"/>
           <p:cNvCxnSpPr/>
           <p:nvPr/>
         </p:nvCxnSpPr>
         <p:spPr>
-          <a:xfrm flipV="1">
-            <a:off x="2319196" y="3361487"/>
-            <a:ext cx="1463387" cy="15532"/>
+          <a:xfrm>
+            <a:off x="6497060" y="3469921"/>
+            <a:ext cx="2713910" cy="9577"/>
           </a:xfrm>
           <a:prstGeom prst="straightConnector1">
             <a:avLst/>
           </a:prstGeom>
           <a:ln w="63500">
+            <a:headEnd type="none"/>
             <a:tailEnd type="triangle"/>
           </a:ln>
         </p:spPr>
@@ -12518,14 +11514,14 @@
       </p:cxnSp>
       <p:cxnSp>
         <p:nvCxnSpPr>
-          <p:cNvPr id="15" name="Straight Arrow Connector 14"/>
+          <p:cNvPr id="24" name="Straight Arrow Connector 23"/>
           <p:cNvCxnSpPr/>
           <p:nvPr/>
         </p:nvCxnSpPr>
         <p:spPr>
-          <a:xfrm flipV="1">
-            <a:off x="2280186" y="3689220"/>
-            <a:ext cx="1502397" cy="11151"/>
+          <a:xfrm>
+            <a:off x="6468835" y="3680645"/>
+            <a:ext cx="2713910" cy="8575"/>
           </a:xfrm>
           <a:prstGeom prst="straightConnector1">
             <a:avLst/>
@@ -12552,19 +11548,22 @@
       </p:cxnSp>
       <p:sp>
         <p:nvSpPr>
-          <p:cNvPr id="16" name="TextBox 15"/>
+          <p:cNvPr id="26" name="TextBox 25"/>
           <p:cNvSpPr txBox="1"/>
           <p:nvPr/>
         </p:nvSpPr>
         <p:spPr>
           <a:xfrm>
-            <a:off x="2280185" y="3920203"/>
-            <a:ext cx="1767708" cy="1200329"/>
+            <a:off x="6770422" y="3894534"/>
+            <a:ext cx="2282366" cy="369332"/>
           </a:xfrm>
           <a:prstGeom prst="rect">
             <a:avLst/>
           </a:prstGeom>
-          <a:noFill/>
+          <a:solidFill>
+            <a:schemeClr val="bg1"/>
+          </a:solidFill>
+          <a:effectLst/>
         </p:spPr>
         <p:txBody>
           <a:bodyPr wrap="square" rtlCol="0">
@@ -12573,46 +11572,28 @@
           <a:lstStyle/>
           <a:p>
             <a:r>
-              <a:rPr lang="en-US" dirty="0" smtClean="0"/>
-              <a:t>Confirms booking </a:t>
-            </a:r>
-            <a:r>
-              <a:rPr lang="en-US" dirty="0"/>
-              <a:t>or </a:t>
-            </a:r>
-            <a:r>
-              <a:rPr lang="en-US" dirty="0" smtClean="0"/>
-              <a:t>notified </a:t>
-            </a:r>
-            <a:r>
-              <a:rPr lang="en-US" dirty="0"/>
-              <a:t>of rejection</a:t>
-            </a:r>
-          </a:p>
-        </p:txBody>
-      </p:sp>
-      <p:sp>
-        <p:nvSpPr>
-          <p:cNvPr id="17" name="TextBox 16"/>
+              <a:rPr lang="en-US" smtClean="0"/>
+              <a:t>Confirm/reject hold</a:t>
+            </a:r>
+            <a:endParaRPr lang="en-US" dirty="0"/>
+          </a:p>
+        </p:txBody>
+      </p:sp>
+      <p:sp>
+        <p:nvSpPr>
+          <p:cNvPr id="13" name="TextBox 12"/>
           <p:cNvSpPr txBox="1"/>
           <p:nvPr/>
         </p:nvSpPr>
         <p:spPr>
           <a:xfrm>
-            <a:off x="2152660" y="1872469"/>
-            <a:ext cx="333072" cy="369332"/>
+            <a:off x="2146767" y="2168924"/>
+            <a:ext cx="1736532" cy="1200329"/>
           </a:xfrm>
           <a:prstGeom prst="rect">
             <a:avLst/>
           </a:prstGeom>
           <a:noFill/>
-          <a:ln w="25400">
-            <a:solidFill>
-              <a:schemeClr val="accent1">
-                <a:shade val="50000"/>
-              </a:schemeClr>
-            </a:solidFill>
-          </a:ln>
         </p:spPr>
         <p:txBody>
           <a:bodyPr wrap="square" rtlCol="0">
@@ -12620,134 +11601,51 @@
           </a:bodyPr>
           <a:lstStyle/>
           <a:p>
-            <a:pPr algn="ctr"/>
-            <a:r>
-              <a:rPr lang="en-US" dirty="0"/>
-              <a:t>A</a:t>
-            </a:r>
-          </a:p>
-        </p:txBody>
-      </p:sp>
-      <p:sp>
-        <p:nvSpPr>
-          <p:cNvPr id="18" name="TextBox 17"/>
-          <p:cNvSpPr txBox="1"/>
-          <p:nvPr/>
-        </p:nvSpPr>
-        <p:spPr>
-          <a:xfrm>
-            <a:off x="3370962" y="3909799"/>
-            <a:ext cx="415619" cy="369332"/>
-          </a:xfrm>
-          <a:prstGeom prst="rect">
-            <a:avLst/>
-          </a:prstGeom>
-          <a:noFill/>
-          <a:ln w="25400">
-            <a:solidFill>
-              <a:schemeClr val="accent1">
-                <a:shade val="50000"/>
-              </a:schemeClr>
-            </a:solidFill>
+            <a:r>
+              <a:rPr lang="en-US" dirty="0" smtClean="0"/>
+              <a:t>(optional) Patient selects </a:t>
+            </a:r>
+            <a:r>
+              <a:rPr lang="en-US" dirty="0" smtClean="0"/>
+              <a:t>from available appointments</a:t>
+            </a:r>
+            <a:endParaRPr lang="en-US" dirty="0"/>
+          </a:p>
+        </p:txBody>
+      </p:sp>
+      <p:cxnSp>
+        <p:nvCxnSpPr>
+          <p:cNvPr id="14" name="Straight Arrow Connector 13"/>
+          <p:cNvCxnSpPr/>
+          <p:nvPr/>
+        </p:nvCxnSpPr>
+        <p:spPr>
+          <a:xfrm flipV="1">
+            <a:off x="2319196" y="3361487"/>
+            <a:ext cx="1463387" cy="15532"/>
+          </a:xfrm>
+          <a:prstGeom prst="straightConnector1">
+            <a:avLst/>
+          </a:prstGeom>
+          <a:ln w="63500">
+            <a:tailEnd type="triangle"/>
           </a:ln>
         </p:spPr>
-        <p:txBody>
-          <a:bodyPr wrap="square" rtlCol="0">
-            <a:spAutoFit/>
-          </a:bodyPr>
-          <a:lstStyle/>
-          <a:p>
-            <a:pPr algn="ctr"/>
-            <a:r>
-              <a:rPr lang="en-US" dirty="0"/>
-              <a:t>A</a:t>
-            </a:r>
-          </a:p>
-        </p:txBody>
-      </p:sp>
-      <p:sp>
-        <p:nvSpPr>
-          <p:cNvPr id="31" name="Circular Arrow 30"/>
-          <p:cNvSpPr/>
-          <p:nvPr/>
-        </p:nvSpPr>
-        <p:spPr>
-          <a:xfrm rot="10800000">
-            <a:off x="10080703" y="4094465"/>
-            <a:ext cx="978408" cy="1391850"/>
-          </a:xfrm>
-          <a:prstGeom prst="circularArrow">
-            <a:avLst/>
-          </a:prstGeom>
-          <a:solidFill>
-            <a:schemeClr val="accent1"/>
-          </a:solidFill>
-          <a:ln w="12700">
-            <a:solidFill>
-              <a:schemeClr val="accent1">
-                <a:shade val="50000"/>
-              </a:schemeClr>
-            </a:solidFill>
-          </a:ln>
-        </p:spPr>
         <p:style>
-          <a:lnRef idx="2">
-            <a:schemeClr val="accent1">
-              <a:shade val="50000"/>
-            </a:schemeClr>
+          <a:lnRef idx="1">
+            <a:schemeClr val="accent1"/>
           </a:lnRef>
-          <a:fillRef idx="1">
+          <a:fillRef idx="0">
             <a:schemeClr val="accent1"/>
           </a:fillRef>
           <a:effectRef idx="0">
             <a:schemeClr val="accent1"/>
           </a:effectRef>
           <a:fontRef idx="minor">
-            <a:schemeClr val="lt1"/>
+            <a:schemeClr val="tx1"/>
           </a:fontRef>
         </p:style>
-        <p:txBody>
-          <a:bodyPr rtlCol="0" anchor="ctr"/>
-          <a:lstStyle/>
-          <a:p>
-            <a:pPr algn="ctr"/>
-            <a:endParaRPr lang="en-US">
-              <a:solidFill>
-                <a:schemeClr val="tx1"/>
-              </a:solidFill>
-            </a:endParaRPr>
-          </a:p>
-        </p:txBody>
-      </p:sp>
-      <p:sp>
-        <p:nvSpPr>
-          <p:cNvPr id="34" name="Rectangle 33"/>
-          <p:cNvSpPr/>
-          <p:nvPr/>
-        </p:nvSpPr>
-        <p:spPr>
-          <a:xfrm>
-            <a:off x="9254188" y="5486316"/>
-            <a:ext cx="2467727" cy="369332"/>
-          </a:xfrm>
-          <a:prstGeom prst="rect">
-            <a:avLst/>
-          </a:prstGeom>
-        </p:spPr>
-        <p:txBody>
-          <a:bodyPr wrap="none">
-            <a:spAutoFit/>
-          </a:bodyPr>
-          <a:lstStyle/>
-          <a:p>
-            <a:r>
-              <a:rPr lang="en-US" dirty="0" smtClean="0"/>
-              <a:t>New patient registration</a:t>
-            </a:r>
-            <a:endParaRPr lang="en-US" dirty="0"/>
-          </a:p>
-        </p:txBody>
-      </p:sp>
+      </p:cxnSp>
     </p:spTree>
     <p:extLst>
       <p:ext uri="{BB962C8B-B14F-4D97-AF65-F5344CB8AC3E}">
@@ -12809,34 +11707,6 @@
           </a:prstGeom>
         </p:spPr>
       </p:pic>
-      <p:sp>
-        <p:nvSpPr>
-          <p:cNvPr id="2" name="Rectangle 1"/>
-          <p:cNvSpPr/>
-          <p:nvPr/>
-        </p:nvSpPr>
-        <p:spPr>
-          <a:xfrm>
-            <a:off x="3370962" y="947183"/>
-            <a:ext cx="6021970" cy="369332"/>
-          </a:xfrm>
-          <a:prstGeom prst="rect">
-            <a:avLst/>
-          </a:prstGeom>
-        </p:spPr>
-        <p:txBody>
-          <a:bodyPr wrap="none">
-            <a:spAutoFit/>
-          </a:bodyPr>
-          <a:lstStyle/>
-          <a:p>
-            <a:r>
-              <a:rPr lang="en-US" dirty="0"/>
-              <a:t>Provider Scheduling Work Flow :  Update/Cancel Appointment</a:t>
-            </a:r>
-          </a:p>
-        </p:txBody>
-      </p:sp>
       <p:sp>
         <p:nvSpPr>
           <p:cNvPr id="39" name="Can 38"/>
@@ -13013,44 +11883,6 @@
             </a:fontRef>
           </p:style>
         </p:cxnSp>
-        <p:sp>
-          <p:nvSpPr>
-            <p:cNvPr id="23" name="TextBox 22"/>
-            <p:cNvSpPr txBox="1"/>
-            <p:nvPr/>
-          </p:nvSpPr>
-          <p:spPr>
-            <a:xfrm>
-              <a:off x="-1771812" y="2209681"/>
-              <a:ext cx="1580394" cy="499340"/>
-            </a:xfrm>
-            <a:prstGeom prst="rect">
-              <a:avLst/>
-            </a:prstGeom>
-            <a:noFill/>
-            <a:ln w="25400">
-              <a:solidFill>
-                <a:schemeClr val="accent1">
-                  <a:shade val="50000"/>
-                </a:schemeClr>
-              </a:solidFill>
-            </a:ln>
-          </p:spPr>
-          <p:txBody>
-            <a:bodyPr wrap="square" rtlCol="0">
-              <a:spAutoFit/>
-            </a:bodyPr>
-            <a:lstStyle/>
-            <a:p>
-              <a:pPr algn="ctr"/>
-              <a:r>
-                <a:rPr lang="en-US" dirty="0" smtClean="0"/>
-                <a:t>A</a:t>
-              </a:r>
-              <a:endParaRPr lang="en-US" dirty="0"/>
-            </a:p>
-          </p:txBody>
-        </p:sp>
       </p:grpSp>
       <p:cxnSp>
         <p:nvCxnSpPr>
@@ -13088,43 +11920,6 @@
       </p:cxnSp>
       <p:sp>
         <p:nvSpPr>
-          <p:cNvPr id="25" name="TextBox 24"/>
-          <p:cNvSpPr txBox="1"/>
-          <p:nvPr/>
-        </p:nvSpPr>
-        <p:spPr>
-          <a:xfrm>
-            <a:off x="6483468" y="4003998"/>
-            <a:ext cx="431023" cy="369332"/>
-          </a:xfrm>
-          <a:prstGeom prst="rect">
-            <a:avLst/>
-          </a:prstGeom>
-          <a:noFill/>
-          <a:ln w="25400">
-            <a:solidFill>
-              <a:schemeClr val="accent1">
-                <a:shade val="50000"/>
-              </a:schemeClr>
-            </a:solidFill>
-          </a:ln>
-        </p:spPr>
-        <p:txBody>
-          <a:bodyPr wrap="square" rtlCol="0">
-            <a:spAutoFit/>
-          </a:bodyPr>
-          <a:lstStyle/>
-          <a:p>
-            <a:pPr algn="ctr"/>
-            <a:r>
-              <a:rPr lang="en-US" dirty="0"/>
-              <a:t>A</a:t>
-            </a:r>
-          </a:p>
-        </p:txBody>
-      </p:sp>
-      <p:sp>
-        <p:nvSpPr>
           <p:cNvPr id="26" name="TextBox 25"/>
           <p:cNvSpPr txBox="1"/>
           <p:nvPr/>
@@ -13195,148 +11990,17 @@
           <a:p>
             <a:r>
               <a:rPr lang="en-US" dirty="0" smtClean="0"/>
-              <a:t>End user cancels booked appointment</a:t>
+              <a:t>Patient </a:t>
+            </a:r>
+            <a:r>
+              <a:rPr lang="en-US" dirty="0" smtClean="0"/>
+              <a:t>cancels </a:t>
+            </a:r>
+            <a:r>
+              <a:rPr lang="en-US" dirty="0" smtClean="0"/>
+              <a:t>booked appointment</a:t>
             </a:r>
             <a:endParaRPr lang="en-US" dirty="0"/>
-          </a:p>
-        </p:txBody>
-      </p:sp>
-      <p:cxnSp>
-        <p:nvCxnSpPr>
-          <p:cNvPr id="14" name="Straight Arrow Connector 13"/>
-          <p:cNvCxnSpPr/>
-          <p:nvPr/>
-        </p:nvCxnSpPr>
-        <p:spPr>
-          <a:xfrm>
-            <a:off x="2226946" y="3733633"/>
-            <a:ext cx="1608610" cy="11153"/>
-          </a:xfrm>
-          <a:prstGeom prst="straightConnector1">
-            <a:avLst/>
-          </a:prstGeom>
-          <a:ln w="63500">
-            <a:headEnd type="triangle"/>
-            <a:tailEnd type="none"/>
-          </a:ln>
-        </p:spPr>
-        <p:style>
-          <a:lnRef idx="1">
-            <a:schemeClr val="accent1"/>
-          </a:lnRef>
-          <a:fillRef idx="0">
-            <a:schemeClr val="accent1"/>
-          </a:fillRef>
-          <a:effectRef idx="0">
-            <a:schemeClr val="accent1"/>
-          </a:effectRef>
-          <a:fontRef idx="minor">
-            <a:schemeClr val="tx1"/>
-          </a:fontRef>
-        </p:style>
-      </p:cxnSp>
-      <p:sp>
-        <p:nvSpPr>
-          <p:cNvPr id="15" name="TextBox 14"/>
-          <p:cNvSpPr txBox="1"/>
-          <p:nvPr/>
-        </p:nvSpPr>
-        <p:spPr>
-          <a:xfrm>
-            <a:off x="2281086" y="3956474"/>
-            <a:ext cx="1736532" cy="646331"/>
-          </a:xfrm>
-          <a:prstGeom prst="rect">
-            <a:avLst/>
-          </a:prstGeom>
-          <a:noFill/>
-        </p:spPr>
-        <p:txBody>
-          <a:bodyPr wrap="square" rtlCol="0">
-            <a:spAutoFit/>
-          </a:bodyPr>
-          <a:lstStyle/>
-          <a:p>
-            <a:r>
-              <a:rPr lang="en-US" dirty="0" smtClean="0"/>
-              <a:t>Confirms cancellation</a:t>
-            </a:r>
-            <a:endParaRPr lang="en-US" dirty="0"/>
-          </a:p>
-        </p:txBody>
-      </p:sp>
-      <p:sp>
-        <p:nvSpPr>
-          <p:cNvPr id="16" name="TextBox 15"/>
-          <p:cNvSpPr txBox="1"/>
-          <p:nvPr/>
-        </p:nvSpPr>
-        <p:spPr>
-          <a:xfrm>
-            <a:off x="2319479" y="1908740"/>
-            <a:ext cx="554738" cy="307777"/>
-          </a:xfrm>
-          <a:prstGeom prst="rect">
-            <a:avLst/>
-          </a:prstGeom>
-          <a:noFill/>
-          <a:ln w="25400">
-            <a:solidFill>
-              <a:schemeClr val="accent1">
-                <a:shade val="50000"/>
-              </a:schemeClr>
-            </a:solidFill>
-          </a:ln>
-        </p:spPr>
-        <p:txBody>
-          <a:bodyPr wrap="square" rtlCol="0">
-            <a:spAutoFit/>
-          </a:bodyPr>
-          <a:lstStyle/>
-          <a:p>
-            <a:pPr algn="ctr"/>
-            <a:r>
-              <a:rPr lang="en-US" sz="1400" dirty="0"/>
-              <a:t>A</a:t>
-            </a:r>
-          </a:p>
-        </p:txBody>
-      </p:sp>
-      <p:sp>
-        <p:nvSpPr>
-          <p:cNvPr id="17" name="TextBox 16"/>
-          <p:cNvSpPr txBox="1"/>
-          <p:nvPr/>
-        </p:nvSpPr>
-        <p:spPr>
-          <a:xfrm>
-            <a:off x="3302087" y="4037433"/>
-            <a:ext cx="554738" cy="307777"/>
-          </a:xfrm>
-          <a:prstGeom prst="rect">
-            <a:avLst/>
-          </a:prstGeom>
-          <a:noFill/>
-          <a:ln w="25400">
-            <a:solidFill>
-              <a:schemeClr val="accent1">
-                <a:shade val="50000"/>
-              </a:schemeClr>
-            </a:solidFill>
-          </a:ln>
-        </p:spPr>
-        <p:txBody>
-          <a:bodyPr wrap="square" rtlCol="0">
-            <a:spAutoFit/>
-          </a:bodyPr>
-          <a:lstStyle/>
-          <a:p>
-            <a:pPr algn="ctr"/>
-            <a:r>
-              <a:rPr lang="en-US" sz="1400" dirty="0" smtClean="0"/>
-              <a:t>A</a:t>
-            </a:r>
-            <a:endParaRPr lang="en-US" sz="1400" dirty="0"/>
           </a:p>
         </p:txBody>
       </p:sp>
@@ -13411,9 +12075,348 @@
           <a:chExt cx="0" cy="0"/>
         </a:xfrm>
       </p:grpSpPr>
+      <p:sp>
+        <p:nvSpPr>
+          <p:cNvPr id="39" name="Can 38"/>
+          <p:cNvSpPr/>
+          <p:nvPr/>
+        </p:nvSpPr>
+        <p:spPr>
+          <a:xfrm>
+            <a:off x="3883299" y="2390275"/>
+            <a:ext cx="2484820" cy="2258969"/>
+          </a:xfrm>
+          <a:prstGeom prst="can">
+            <a:avLst/>
+          </a:prstGeom>
+        </p:spPr>
+        <p:style>
+          <a:lnRef idx="2">
+            <a:schemeClr val="accent1">
+              <a:shade val="50000"/>
+            </a:schemeClr>
+          </a:lnRef>
+          <a:fillRef idx="1">
+            <a:schemeClr val="accent1"/>
+          </a:fillRef>
+          <a:effectRef idx="0">
+            <a:schemeClr val="accent1"/>
+          </a:effectRef>
+          <a:fontRef idx="minor">
+            <a:schemeClr val="lt1"/>
+          </a:fontRef>
+        </p:style>
+        <p:txBody>
+          <a:bodyPr rtlCol="0" anchor="ctr"/>
+          <a:lstStyle/>
+          <a:p>
+            <a:pPr algn="ctr"/>
+            <a:r>
+              <a:rPr lang="en-US" sz="2400" dirty="0" smtClean="0"/>
+              <a:t>Provider</a:t>
+            </a:r>
+          </a:p>
+          <a:p>
+            <a:pPr algn="ctr"/>
+            <a:r>
+              <a:rPr lang="en-US" sz="2400" dirty="0" smtClean="0"/>
+              <a:t>Scheduling Application</a:t>
+            </a:r>
+            <a:endParaRPr lang="en-US" sz="2400" dirty="0"/>
+          </a:p>
+        </p:txBody>
+      </p:sp>
+      <p:sp>
+        <p:nvSpPr>
+          <p:cNvPr id="53" name="Can 52"/>
+          <p:cNvSpPr/>
+          <p:nvPr/>
+        </p:nvSpPr>
+        <p:spPr>
+          <a:xfrm>
+            <a:off x="9297574" y="2359802"/>
+            <a:ext cx="2380957" cy="2258969"/>
+          </a:xfrm>
+          <a:prstGeom prst="can">
+            <a:avLst/>
+          </a:prstGeom>
+        </p:spPr>
+        <p:style>
+          <a:lnRef idx="2">
+            <a:schemeClr val="accent1">
+              <a:shade val="50000"/>
+            </a:schemeClr>
+          </a:lnRef>
+          <a:fillRef idx="1">
+            <a:schemeClr val="accent1"/>
+          </a:fillRef>
+          <a:effectRef idx="0">
+            <a:schemeClr val="accent1"/>
+          </a:effectRef>
+          <a:fontRef idx="minor">
+            <a:schemeClr val="lt1"/>
+          </a:fontRef>
+        </p:style>
+        <p:txBody>
+          <a:bodyPr rtlCol="0" anchor="ctr"/>
+          <a:lstStyle/>
+          <a:p>
+            <a:pPr algn="ctr"/>
+            <a:r>
+              <a:rPr lang="en-US" sz="2400" dirty="0" smtClean="0"/>
+              <a:t>FHIR Scheduler, (EHR)</a:t>
+            </a:r>
+            <a:endParaRPr lang="en-US" sz="2400" dirty="0"/>
+          </a:p>
+        </p:txBody>
+      </p:sp>
+      <p:sp>
+        <p:nvSpPr>
+          <p:cNvPr id="21" name="TextBox 20"/>
+          <p:cNvSpPr txBox="1"/>
+          <p:nvPr/>
+        </p:nvSpPr>
+        <p:spPr>
+          <a:xfrm>
+            <a:off x="7010139" y="2939857"/>
+            <a:ext cx="2146852" cy="369333"/>
+          </a:xfrm>
+          <a:prstGeom prst="rect">
+            <a:avLst/>
+          </a:prstGeom>
+          <a:solidFill>
+            <a:schemeClr val="bg1"/>
+          </a:solidFill>
+          <a:effectLst/>
+        </p:spPr>
+        <p:txBody>
+          <a:bodyPr wrap="square" rtlCol="0">
+            <a:spAutoFit/>
+          </a:bodyPr>
+          <a:lstStyle/>
+          <a:p>
+            <a:r>
+              <a:rPr lang="en-US" dirty="0" smtClean="0"/>
+              <a:t>Cancel </a:t>
+            </a:r>
+            <a:r>
+              <a:rPr lang="en-US" dirty="0" smtClean="0"/>
+              <a:t>hold</a:t>
+            </a:r>
+            <a:endParaRPr lang="en-US" dirty="0"/>
+          </a:p>
+        </p:txBody>
+      </p:sp>
+      <p:cxnSp>
+        <p:nvCxnSpPr>
+          <p:cNvPr id="22" name="Straight Arrow Connector 21"/>
+          <p:cNvCxnSpPr/>
+          <p:nvPr/>
+        </p:nvCxnSpPr>
+        <p:spPr>
+          <a:xfrm>
+            <a:off x="6482947" y="3490129"/>
+            <a:ext cx="2713910" cy="9577"/>
+          </a:xfrm>
+          <a:prstGeom prst="straightConnector1">
+            <a:avLst/>
+          </a:prstGeom>
+          <a:ln w="63500">
+            <a:headEnd type="none"/>
+            <a:tailEnd type="triangle"/>
+          </a:ln>
+        </p:spPr>
+        <p:style>
+          <a:lnRef idx="1">
+            <a:schemeClr val="accent1"/>
+          </a:lnRef>
+          <a:fillRef idx="0">
+            <a:schemeClr val="accent1"/>
+          </a:fillRef>
+          <a:effectRef idx="0">
+            <a:schemeClr val="accent1"/>
+          </a:effectRef>
+          <a:fontRef idx="minor">
+            <a:schemeClr val="tx1"/>
+          </a:fontRef>
+        </p:style>
+      </p:cxnSp>
+      <p:cxnSp>
+        <p:nvCxnSpPr>
+          <p:cNvPr id="24" name="Straight Arrow Connector 23"/>
+          <p:cNvCxnSpPr/>
+          <p:nvPr/>
+        </p:nvCxnSpPr>
+        <p:spPr>
+          <a:xfrm>
+            <a:off x="6468835" y="3680645"/>
+            <a:ext cx="2713910" cy="8575"/>
+          </a:xfrm>
+          <a:prstGeom prst="straightConnector1">
+            <a:avLst/>
+          </a:prstGeom>
+          <a:ln w="63500">
+            <a:headEnd type="triangle"/>
+            <a:tailEnd type="none"/>
+          </a:ln>
+        </p:spPr>
+        <p:style>
+          <a:lnRef idx="1">
+            <a:schemeClr val="accent1"/>
+          </a:lnRef>
+          <a:fillRef idx="0">
+            <a:schemeClr val="accent1"/>
+          </a:fillRef>
+          <a:effectRef idx="0">
+            <a:schemeClr val="accent1"/>
+          </a:effectRef>
+          <a:fontRef idx="minor">
+            <a:schemeClr val="tx1"/>
+          </a:fontRef>
+        </p:style>
+      </p:cxnSp>
+      <p:sp>
+        <p:nvSpPr>
+          <p:cNvPr id="26" name="TextBox 25"/>
+          <p:cNvSpPr txBox="1"/>
+          <p:nvPr/>
+        </p:nvSpPr>
+        <p:spPr>
+          <a:xfrm>
+            <a:off x="6702355" y="3870159"/>
+            <a:ext cx="2139382" cy="369332"/>
+          </a:xfrm>
+          <a:prstGeom prst="rect">
+            <a:avLst/>
+          </a:prstGeom>
+          <a:solidFill>
+            <a:schemeClr val="bg1"/>
+          </a:solidFill>
+          <a:effectLst/>
+        </p:spPr>
+        <p:txBody>
+          <a:bodyPr wrap="square" rtlCol="0">
+            <a:spAutoFit/>
+          </a:bodyPr>
+          <a:lstStyle/>
+          <a:p>
+            <a:r>
+              <a:rPr lang="en-US" smtClean="0"/>
+              <a:t>C</a:t>
+            </a:r>
+            <a:r>
+              <a:rPr lang="en-US" smtClean="0"/>
+              <a:t>onfirm/reject hold</a:t>
+            </a:r>
+            <a:endParaRPr lang="en-US" dirty="0"/>
+          </a:p>
+        </p:txBody>
+      </p:sp>
+      <p:sp>
+        <p:nvSpPr>
+          <p:cNvPr id="19" name="Can 18"/>
+          <p:cNvSpPr/>
+          <p:nvPr/>
+        </p:nvSpPr>
+        <p:spPr>
+          <a:xfrm>
+            <a:off x="3870512" y="2383272"/>
+            <a:ext cx="2484820" cy="2258969"/>
+          </a:xfrm>
+          <a:prstGeom prst="can">
+            <a:avLst/>
+          </a:prstGeom>
+        </p:spPr>
+        <p:style>
+          <a:lnRef idx="2">
+            <a:schemeClr val="accent1">
+              <a:shade val="50000"/>
+            </a:schemeClr>
+          </a:lnRef>
+          <a:fillRef idx="1">
+            <a:schemeClr val="accent1"/>
+          </a:fillRef>
+          <a:effectRef idx="0">
+            <a:schemeClr val="accent1"/>
+          </a:effectRef>
+          <a:fontRef idx="minor">
+            <a:schemeClr val="lt1"/>
+          </a:fontRef>
+        </p:style>
+        <p:txBody>
+          <a:bodyPr rtlCol="0" anchor="ctr"/>
+          <a:lstStyle/>
+          <a:p>
+            <a:pPr algn="ctr"/>
+            <a:r>
+              <a:rPr lang="en-US" sz="2400" dirty="0" smtClean="0"/>
+              <a:t>Provider</a:t>
+            </a:r>
+          </a:p>
+          <a:p>
+            <a:pPr algn="ctr"/>
+            <a:r>
+              <a:rPr lang="en-US" sz="2400" dirty="0" smtClean="0"/>
+              <a:t>Scheduling Application</a:t>
+            </a:r>
+            <a:endParaRPr lang="en-US" sz="2400" dirty="0"/>
+          </a:p>
+        </p:txBody>
+      </p:sp>
+      <p:sp>
+        <p:nvSpPr>
+          <p:cNvPr id="28" name="Can 27"/>
+          <p:cNvSpPr/>
+          <p:nvPr/>
+        </p:nvSpPr>
+        <p:spPr>
+          <a:xfrm>
+            <a:off x="3856400" y="2390274"/>
+            <a:ext cx="2484820" cy="2258969"/>
+          </a:xfrm>
+          <a:prstGeom prst="can">
+            <a:avLst/>
+          </a:prstGeom>
+        </p:spPr>
+        <p:style>
+          <a:lnRef idx="2">
+            <a:schemeClr val="accent1">
+              <a:shade val="50000"/>
+            </a:schemeClr>
+          </a:lnRef>
+          <a:fillRef idx="1">
+            <a:schemeClr val="accent1"/>
+          </a:fillRef>
+          <a:effectRef idx="0">
+            <a:schemeClr val="accent1"/>
+          </a:effectRef>
+          <a:fontRef idx="minor">
+            <a:schemeClr val="lt1"/>
+          </a:fontRef>
+        </p:style>
+        <p:txBody>
+          <a:bodyPr rtlCol="0" anchor="ctr"/>
+          <a:lstStyle/>
+          <a:p>
+            <a:pPr algn="ctr"/>
+            <a:r>
+              <a:rPr lang="en-US" sz="2400" dirty="0" smtClean="0"/>
+              <a:t>Provider</a:t>
+            </a:r>
+          </a:p>
+          <a:p>
+            <a:pPr algn="ctr"/>
+            <a:r>
+              <a:rPr lang="en-US" sz="2400" dirty="0" smtClean="0"/>
+              <a:t>Scheduling Application</a:t>
+            </a:r>
+            <a:endParaRPr lang="en-US" sz="2400" dirty="0"/>
+          </a:p>
+        </p:txBody>
+      </p:sp>
       <p:pic>
         <p:nvPicPr>
-          <p:cNvPr id="3" name="Picture 2"/>
+          <p:cNvPr id="29" name="Picture 28"/>
           <p:cNvPicPr>
             <a:picLocks noChangeAspect="1"/>
           </p:cNvPicPr>
@@ -13433,675 +12436,14 @@
           <a:prstGeom prst="rect">
             <a:avLst/>
           </a:prstGeom>
-        </p:spPr>
-      </p:pic>
-      <p:sp>
-        <p:nvSpPr>
-          <p:cNvPr id="2" name="Rectangle 1"/>
-          <p:cNvSpPr/>
-          <p:nvPr/>
-        </p:nvSpPr>
-        <p:spPr>
-          <a:xfrm>
-            <a:off x="3370962" y="947183"/>
-            <a:ext cx="6021970" cy="369332"/>
-          </a:xfrm>
-          <a:prstGeom prst="rect">
-            <a:avLst/>
-          </a:prstGeom>
-        </p:spPr>
-        <p:txBody>
-          <a:bodyPr wrap="none">
-            <a:spAutoFit/>
-          </a:bodyPr>
-          <a:lstStyle/>
-          <a:p>
-            <a:r>
-              <a:rPr lang="en-US" dirty="0"/>
-              <a:t>Provider Scheduling Work Flow :  Update/Cancel Appointment</a:t>
-            </a:r>
-          </a:p>
-        </p:txBody>
-      </p:sp>
-      <p:sp>
-        <p:nvSpPr>
-          <p:cNvPr id="39" name="Can 38"/>
-          <p:cNvSpPr/>
-          <p:nvPr/>
-        </p:nvSpPr>
-        <p:spPr>
-          <a:xfrm>
-            <a:off x="3883299" y="2390275"/>
-            <a:ext cx="2484820" cy="2258969"/>
-          </a:xfrm>
-          <a:prstGeom prst="can">
-            <a:avLst/>
-          </a:prstGeom>
-        </p:spPr>
-        <p:style>
-          <a:lnRef idx="2">
-            <a:schemeClr val="accent1">
-              <a:shade val="50000"/>
-            </a:schemeClr>
-          </a:lnRef>
-          <a:fillRef idx="1">
-            <a:schemeClr val="accent1"/>
-          </a:fillRef>
-          <a:effectRef idx="0">
-            <a:schemeClr val="accent1"/>
-          </a:effectRef>
-          <a:fontRef idx="minor">
-            <a:schemeClr val="lt1"/>
-          </a:fontRef>
-        </p:style>
-        <p:txBody>
-          <a:bodyPr rtlCol="0" anchor="ctr"/>
-          <a:lstStyle/>
-          <a:p>
-            <a:pPr algn="ctr"/>
-            <a:r>
-              <a:rPr lang="en-US" sz="2400" dirty="0" smtClean="0"/>
-              <a:t>Provider</a:t>
-            </a:r>
-          </a:p>
-          <a:p>
-            <a:pPr algn="ctr"/>
-            <a:r>
-              <a:rPr lang="en-US" sz="2400" dirty="0" smtClean="0"/>
-              <a:t>Scheduling Application</a:t>
-            </a:r>
-            <a:endParaRPr lang="en-US" sz="2400" dirty="0"/>
-          </a:p>
-        </p:txBody>
-      </p:sp>
-      <p:sp>
-        <p:nvSpPr>
-          <p:cNvPr id="53" name="Can 52"/>
-          <p:cNvSpPr/>
-          <p:nvPr/>
-        </p:nvSpPr>
-        <p:spPr>
-          <a:xfrm>
-            <a:off x="9297574" y="2359802"/>
-            <a:ext cx="2380957" cy="2258969"/>
-          </a:xfrm>
-          <a:prstGeom prst="can">
-            <a:avLst/>
-          </a:prstGeom>
-        </p:spPr>
-        <p:style>
-          <a:lnRef idx="2">
-            <a:schemeClr val="accent1">
-              <a:shade val="50000"/>
-            </a:schemeClr>
-          </a:lnRef>
-          <a:fillRef idx="1">
-            <a:schemeClr val="accent1"/>
-          </a:fillRef>
-          <a:effectRef idx="0">
-            <a:schemeClr val="accent1"/>
-          </a:effectRef>
-          <a:fontRef idx="minor">
-            <a:schemeClr val="lt1"/>
-          </a:fontRef>
-        </p:style>
-        <p:txBody>
-          <a:bodyPr rtlCol="0" anchor="ctr"/>
-          <a:lstStyle/>
-          <a:p>
-            <a:pPr algn="ctr"/>
-            <a:r>
-              <a:rPr lang="en-US" sz="2400" dirty="0" smtClean="0"/>
-              <a:t>FHIR Scheduler, (EHR)</a:t>
-            </a:r>
-            <a:endParaRPr lang="en-US" sz="2400" dirty="0"/>
-          </a:p>
-        </p:txBody>
-      </p:sp>
-      <p:grpSp>
-        <p:nvGrpSpPr>
-          <p:cNvPr id="20" name="Group 19"/>
-          <p:cNvGrpSpPr/>
-          <p:nvPr/>
-        </p:nvGrpSpPr>
-        <p:grpSpPr>
-          <a:xfrm>
-            <a:off x="6482947" y="2743201"/>
-            <a:ext cx="2713910" cy="756504"/>
-            <a:chOff x="-1796260" y="2124752"/>
-            <a:chExt cx="10092590" cy="1022801"/>
-          </a:xfrm>
-        </p:grpSpPr>
-        <p:sp>
-          <p:nvSpPr>
-            <p:cNvPr id="21" name="TextBox 20"/>
-            <p:cNvSpPr txBox="1"/>
-            <p:nvPr/>
-          </p:nvSpPr>
-          <p:spPr>
-            <a:xfrm>
-              <a:off x="260056" y="2124752"/>
-              <a:ext cx="7983794" cy="873846"/>
-            </a:xfrm>
-            <a:prstGeom prst="rect">
-              <a:avLst/>
-            </a:prstGeom>
-            <a:solidFill>
-              <a:schemeClr val="bg1"/>
-            </a:solidFill>
-            <a:effectLst/>
-          </p:spPr>
-          <p:txBody>
-            <a:bodyPr wrap="square" rtlCol="0">
-              <a:spAutoFit/>
-            </a:bodyPr>
-            <a:lstStyle/>
-            <a:p>
-              <a:r>
-                <a:rPr lang="en-US" dirty="0" smtClean="0"/>
-                <a:t>Cancels appointment</a:t>
-              </a:r>
-              <a:endParaRPr lang="en-US" dirty="0"/>
-            </a:p>
-          </p:txBody>
-        </p:sp>
-        <p:cxnSp>
-          <p:nvCxnSpPr>
-            <p:cNvPr id="22" name="Straight Arrow Connector 21"/>
-            <p:cNvCxnSpPr/>
-            <p:nvPr/>
-          </p:nvCxnSpPr>
-          <p:spPr>
-            <a:xfrm>
-              <a:off x="-1796260" y="3134605"/>
-              <a:ext cx="10092590" cy="12948"/>
-            </a:xfrm>
-            <a:prstGeom prst="straightConnector1">
-              <a:avLst/>
-            </a:prstGeom>
-            <a:ln w="63500">
-              <a:headEnd type="none"/>
-              <a:tailEnd type="triangle"/>
-            </a:ln>
-          </p:spPr>
-          <p:style>
-            <a:lnRef idx="1">
-              <a:schemeClr val="accent1"/>
-            </a:lnRef>
-            <a:fillRef idx="0">
-              <a:schemeClr val="accent1"/>
-            </a:fillRef>
-            <a:effectRef idx="0">
-              <a:schemeClr val="accent1"/>
-            </a:effectRef>
-            <a:fontRef idx="minor">
-              <a:schemeClr val="tx1"/>
-            </a:fontRef>
-          </p:style>
-        </p:cxnSp>
-        <p:sp>
-          <p:nvSpPr>
-            <p:cNvPr id="23" name="TextBox 22"/>
-            <p:cNvSpPr txBox="1"/>
-            <p:nvPr/>
-          </p:nvSpPr>
-          <p:spPr>
-            <a:xfrm>
-              <a:off x="-1771812" y="2209681"/>
-              <a:ext cx="1580394" cy="499340"/>
-            </a:xfrm>
-            <a:prstGeom prst="rect">
-              <a:avLst/>
-            </a:prstGeom>
-            <a:noFill/>
-            <a:ln w="25400">
-              <a:solidFill>
-                <a:schemeClr val="accent1">
-                  <a:shade val="50000"/>
-                </a:schemeClr>
-              </a:solidFill>
-            </a:ln>
-          </p:spPr>
-          <p:txBody>
-            <a:bodyPr wrap="square" rtlCol="0">
-              <a:spAutoFit/>
-            </a:bodyPr>
-            <a:lstStyle/>
-            <a:p>
-              <a:pPr algn="ctr"/>
-              <a:r>
-                <a:rPr lang="en-US" dirty="0" smtClean="0"/>
-                <a:t>A</a:t>
-              </a:r>
-              <a:endParaRPr lang="en-US" dirty="0"/>
-            </a:p>
-          </p:txBody>
-        </p:sp>
-      </p:grpSp>
-      <p:cxnSp>
-        <p:nvCxnSpPr>
-          <p:cNvPr id="24" name="Straight Arrow Connector 23"/>
-          <p:cNvCxnSpPr/>
-          <p:nvPr/>
-        </p:nvCxnSpPr>
-        <p:spPr>
-          <a:xfrm>
-            <a:off x="6468835" y="3680645"/>
-            <a:ext cx="2713910" cy="8575"/>
-          </a:xfrm>
-          <a:prstGeom prst="straightConnector1">
-            <a:avLst/>
-          </a:prstGeom>
-          <a:ln w="63500">
-            <a:headEnd type="triangle"/>
-            <a:tailEnd type="none"/>
-          </a:ln>
-        </p:spPr>
-        <p:style>
-          <a:lnRef idx="1">
-            <a:schemeClr val="accent1"/>
-          </a:lnRef>
-          <a:fillRef idx="0">
-            <a:schemeClr val="accent1"/>
-          </a:fillRef>
-          <a:effectRef idx="0">
-            <a:schemeClr val="accent1"/>
-          </a:effectRef>
-          <a:fontRef idx="minor">
-            <a:schemeClr val="tx1"/>
-          </a:fontRef>
-        </p:style>
-      </p:cxnSp>
-      <p:sp>
-        <p:nvSpPr>
-          <p:cNvPr id="25" name="TextBox 24"/>
-          <p:cNvSpPr txBox="1"/>
-          <p:nvPr/>
-        </p:nvSpPr>
-        <p:spPr>
-          <a:xfrm>
-            <a:off x="6483468" y="4003998"/>
-            <a:ext cx="431023" cy="369332"/>
-          </a:xfrm>
-          <a:prstGeom prst="rect">
-            <a:avLst/>
-          </a:prstGeom>
-          <a:noFill/>
           <a:ln w="25400">
             <a:solidFill>
-              <a:schemeClr val="accent1">
-                <a:shade val="50000"/>
-              </a:schemeClr>
+              <a:schemeClr val="tx1"/>
             </a:solidFill>
+            <a:prstDash val="dash"/>
           </a:ln>
         </p:spPr>
-        <p:txBody>
-          <a:bodyPr wrap="square" rtlCol="0">
-            <a:spAutoFit/>
-          </a:bodyPr>
-          <a:lstStyle/>
-          <a:p>
-            <a:pPr algn="ctr"/>
-            <a:r>
-              <a:rPr lang="en-US" dirty="0"/>
-              <a:t>A</a:t>
-            </a:r>
-          </a:p>
-        </p:txBody>
-      </p:sp>
-      <p:sp>
-        <p:nvSpPr>
-          <p:cNvPr id="26" name="TextBox 25"/>
-          <p:cNvSpPr txBox="1"/>
-          <p:nvPr/>
-        </p:nvSpPr>
-        <p:spPr>
-          <a:xfrm>
-            <a:off x="7035893" y="3890367"/>
-            <a:ext cx="2006450" cy="923330"/>
-          </a:xfrm>
-          <a:prstGeom prst="rect">
-            <a:avLst/>
-          </a:prstGeom>
-          <a:solidFill>
-            <a:schemeClr val="bg1"/>
-          </a:solidFill>
-          <a:effectLst/>
-        </p:spPr>
-        <p:txBody>
-          <a:bodyPr wrap="square" rtlCol="0">
-            <a:spAutoFit/>
-          </a:bodyPr>
-          <a:lstStyle/>
-          <a:p>
-            <a:r>
-              <a:rPr lang="en-US" dirty="0" smtClean="0"/>
-              <a:t>Returns </a:t>
-            </a:r>
-            <a:endParaRPr lang="en-US" dirty="0"/>
-          </a:p>
-          <a:p>
-            <a:r>
-              <a:rPr lang="en-US" dirty="0" smtClean="0"/>
-              <a:t>confirmation </a:t>
-            </a:r>
-            <a:r>
-              <a:rPr lang="en-US" dirty="0"/>
-              <a:t>of </a:t>
-            </a:r>
-            <a:r>
-              <a:rPr lang="en-US" dirty="0" smtClean="0"/>
-              <a:t>cancellation</a:t>
-            </a:r>
-            <a:endParaRPr lang="en-US" dirty="0"/>
-          </a:p>
-        </p:txBody>
-      </p:sp>
-      <p:sp>
-        <p:nvSpPr>
-          <p:cNvPr id="13" name="TextBox 12"/>
-          <p:cNvSpPr txBox="1"/>
-          <p:nvPr/>
-        </p:nvSpPr>
-        <p:spPr>
-          <a:xfrm>
-            <a:off x="2271254" y="2297723"/>
-            <a:ext cx="1736532" cy="923330"/>
-          </a:xfrm>
-          <a:prstGeom prst="rect">
-            <a:avLst/>
-          </a:prstGeom>
-          <a:noFill/>
-        </p:spPr>
-        <p:txBody>
-          <a:bodyPr wrap="square" rtlCol="0">
-            <a:spAutoFit/>
-          </a:bodyPr>
-          <a:lstStyle/>
-          <a:p>
-            <a:r>
-              <a:rPr lang="en-US" dirty="0" smtClean="0"/>
-              <a:t>End user cancels booked appointment</a:t>
-            </a:r>
-            <a:endParaRPr lang="en-US" dirty="0"/>
-          </a:p>
-        </p:txBody>
-      </p:sp>
-      <p:cxnSp>
-        <p:nvCxnSpPr>
-          <p:cNvPr id="14" name="Straight Arrow Connector 13"/>
-          <p:cNvCxnSpPr/>
-          <p:nvPr/>
-        </p:nvCxnSpPr>
-        <p:spPr>
-          <a:xfrm>
-            <a:off x="2226946" y="3733633"/>
-            <a:ext cx="1608610" cy="11153"/>
-          </a:xfrm>
-          <a:prstGeom prst="straightConnector1">
-            <a:avLst/>
-          </a:prstGeom>
-          <a:ln w="63500">
-            <a:headEnd type="triangle"/>
-            <a:tailEnd type="none"/>
-          </a:ln>
-        </p:spPr>
-        <p:style>
-          <a:lnRef idx="1">
-            <a:schemeClr val="accent1"/>
-          </a:lnRef>
-          <a:fillRef idx="0">
-            <a:schemeClr val="accent1"/>
-          </a:fillRef>
-          <a:effectRef idx="0">
-            <a:schemeClr val="accent1"/>
-          </a:effectRef>
-          <a:fontRef idx="minor">
-            <a:schemeClr val="tx1"/>
-          </a:fontRef>
-        </p:style>
-      </p:cxnSp>
-      <p:sp>
-        <p:nvSpPr>
-          <p:cNvPr id="15" name="TextBox 14"/>
-          <p:cNvSpPr txBox="1"/>
-          <p:nvPr/>
-        </p:nvSpPr>
-        <p:spPr>
-          <a:xfrm>
-            <a:off x="2281086" y="3956474"/>
-            <a:ext cx="1736532" cy="646331"/>
-          </a:xfrm>
-          <a:prstGeom prst="rect">
-            <a:avLst/>
-          </a:prstGeom>
-          <a:noFill/>
-        </p:spPr>
-        <p:txBody>
-          <a:bodyPr wrap="square" rtlCol="0">
-            <a:spAutoFit/>
-          </a:bodyPr>
-          <a:lstStyle/>
-          <a:p>
-            <a:r>
-              <a:rPr lang="en-US" dirty="0" smtClean="0"/>
-              <a:t>Confirms cancellation</a:t>
-            </a:r>
-            <a:endParaRPr lang="en-US" dirty="0"/>
-          </a:p>
-        </p:txBody>
-      </p:sp>
-      <p:sp>
-        <p:nvSpPr>
-          <p:cNvPr id="16" name="TextBox 15"/>
-          <p:cNvSpPr txBox="1"/>
-          <p:nvPr/>
-        </p:nvSpPr>
-        <p:spPr>
-          <a:xfrm>
-            <a:off x="2319479" y="1908740"/>
-            <a:ext cx="554738" cy="307777"/>
-          </a:xfrm>
-          <a:prstGeom prst="rect">
-            <a:avLst/>
-          </a:prstGeom>
-          <a:noFill/>
-          <a:ln w="25400">
-            <a:solidFill>
-              <a:schemeClr val="accent1">
-                <a:shade val="50000"/>
-              </a:schemeClr>
-            </a:solidFill>
-          </a:ln>
-        </p:spPr>
-        <p:txBody>
-          <a:bodyPr wrap="square" rtlCol="0">
-            <a:spAutoFit/>
-          </a:bodyPr>
-          <a:lstStyle/>
-          <a:p>
-            <a:pPr algn="ctr"/>
-            <a:r>
-              <a:rPr lang="en-US" sz="1400" dirty="0"/>
-              <a:t>A</a:t>
-            </a:r>
-          </a:p>
-        </p:txBody>
-      </p:sp>
-      <p:sp>
-        <p:nvSpPr>
-          <p:cNvPr id="17" name="TextBox 16"/>
-          <p:cNvSpPr txBox="1"/>
-          <p:nvPr/>
-        </p:nvSpPr>
-        <p:spPr>
-          <a:xfrm>
-            <a:off x="3302087" y="4037433"/>
-            <a:ext cx="554738" cy="307777"/>
-          </a:xfrm>
-          <a:prstGeom prst="rect">
-            <a:avLst/>
-          </a:prstGeom>
-          <a:noFill/>
-          <a:ln w="25400">
-            <a:solidFill>
-              <a:schemeClr val="accent1">
-                <a:shade val="50000"/>
-              </a:schemeClr>
-            </a:solidFill>
-          </a:ln>
-        </p:spPr>
-        <p:txBody>
-          <a:bodyPr wrap="square" rtlCol="0">
-            <a:spAutoFit/>
-          </a:bodyPr>
-          <a:lstStyle/>
-          <a:p>
-            <a:pPr algn="ctr"/>
-            <a:r>
-              <a:rPr lang="en-US" sz="1400" dirty="0" smtClean="0"/>
-              <a:t>A</a:t>
-            </a:r>
-            <a:endParaRPr lang="en-US" sz="1400" dirty="0"/>
-          </a:p>
-        </p:txBody>
-      </p:sp>
-      <p:cxnSp>
-        <p:nvCxnSpPr>
-          <p:cNvPr id="27" name="Straight Arrow Connector 26"/>
-          <p:cNvCxnSpPr/>
-          <p:nvPr/>
-        </p:nvCxnSpPr>
-        <p:spPr>
-          <a:xfrm>
-            <a:off x="2224331" y="3442022"/>
-            <a:ext cx="1608610" cy="11153"/>
-          </a:xfrm>
-          <a:prstGeom prst="straightConnector1">
-            <a:avLst/>
-          </a:prstGeom>
-          <a:ln w="63500">
-            <a:headEnd type="none"/>
-            <a:tailEnd type="triangle"/>
-          </a:ln>
-        </p:spPr>
-        <p:style>
-          <a:lnRef idx="1">
-            <a:schemeClr val="accent1"/>
-          </a:lnRef>
-          <a:fillRef idx="0">
-            <a:schemeClr val="accent1"/>
-          </a:fillRef>
-          <a:effectRef idx="0">
-            <a:schemeClr val="accent1"/>
-          </a:effectRef>
-          <a:fontRef idx="minor">
-            <a:schemeClr val="tx1"/>
-          </a:fontRef>
-        </p:style>
-      </p:cxnSp>
-      <p:sp>
-        <p:nvSpPr>
-          <p:cNvPr id="19" name="Can 18"/>
-          <p:cNvSpPr/>
-          <p:nvPr/>
-        </p:nvSpPr>
-        <p:spPr>
-          <a:xfrm>
-            <a:off x="3870512" y="2383272"/>
-            <a:ext cx="2484820" cy="2258969"/>
-          </a:xfrm>
-          <a:prstGeom prst="can">
-            <a:avLst/>
-          </a:prstGeom>
-        </p:spPr>
-        <p:style>
-          <a:lnRef idx="2">
-            <a:schemeClr val="accent1">
-              <a:shade val="50000"/>
-            </a:schemeClr>
-          </a:lnRef>
-          <a:fillRef idx="1">
-            <a:schemeClr val="accent1"/>
-          </a:fillRef>
-          <a:effectRef idx="0">
-            <a:schemeClr val="accent1"/>
-          </a:effectRef>
-          <a:fontRef idx="minor">
-            <a:schemeClr val="lt1"/>
-          </a:fontRef>
-        </p:style>
-        <p:txBody>
-          <a:bodyPr rtlCol="0" anchor="ctr"/>
-          <a:lstStyle/>
-          <a:p>
-            <a:pPr algn="ctr"/>
-            <a:r>
-              <a:rPr lang="en-US" sz="2400" dirty="0" smtClean="0"/>
-              <a:t>Provider</a:t>
-            </a:r>
-          </a:p>
-          <a:p>
-            <a:pPr algn="ctr"/>
-            <a:r>
-              <a:rPr lang="en-US" sz="2400" dirty="0" smtClean="0"/>
-              <a:t>Scheduling Application</a:t>
-            </a:r>
-            <a:endParaRPr lang="en-US" sz="2400" dirty="0"/>
-          </a:p>
-        </p:txBody>
-      </p:sp>
-      <p:sp>
-        <p:nvSpPr>
-          <p:cNvPr id="28" name="Can 27"/>
-          <p:cNvSpPr/>
-          <p:nvPr/>
-        </p:nvSpPr>
-        <p:spPr>
-          <a:xfrm>
-            <a:off x="3856400" y="2390274"/>
-            <a:ext cx="2484820" cy="2258969"/>
-          </a:xfrm>
-          <a:prstGeom prst="can">
-            <a:avLst/>
-          </a:prstGeom>
-        </p:spPr>
-        <p:style>
-          <a:lnRef idx="2">
-            <a:schemeClr val="accent1">
-              <a:shade val="50000"/>
-            </a:schemeClr>
-          </a:lnRef>
-          <a:fillRef idx="1">
-            <a:schemeClr val="accent1"/>
-          </a:fillRef>
-          <a:effectRef idx="0">
-            <a:schemeClr val="accent1"/>
-          </a:effectRef>
-          <a:fontRef idx="minor">
-            <a:schemeClr val="lt1"/>
-          </a:fontRef>
-        </p:style>
-        <p:txBody>
-          <a:bodyPr rtlCol="0" anchor="ctr"/>
-          <a:lstStyle/>
-          <a:p>
-            <a:pPr algn="ctr"/>
-            <a:r>
-              <a:rPr lang="en-US" sz="2400" dirty="0" smtClean="0"/>
-              <a:t>Provider</a:t>
-            </a:r>
-          </a:p>
-          <a:p>
-            <a:pPr algn="ctr"/>
-            <a:r>
-              <a:rPr lang="en-US" sz="2400" dirty="0" smtClean="0"/>
-              <a:t>Scheduling Application</a:t>
-            </a:r>
-            <a:endParaRPr lang="en-US" sz="2400" dirty="0"/>
-          </a:p>
-        </p:txBody>
-      </p:sp>
+      </p:pic>
     </p:spTree>
     <p:extLst>
       <p:ext uri="{BB962C8B-B14F-4D97-AF65-F5344CB8AC3E}">
@@ -18353,8 +16695,8 @@
         </p:nvSpPr>
         <p:spPr>
           <a:xfrm>
-            <a:off x="1307401" y="1345852"/>
-            <a:ext cx="1857375" cy="1200329"/>
+            <a:off x="1041401" y="1345852"/>
+            <a:ext cx="2123376" cy="923330"/>
           </a:xfrm>
           <a:prstGeom prst="rect">
             <a:avLst/>
@@ -18369,56 +16711,36 @@
           <a:p>
             <a:r>
               <a:rPr lang="en-US" dirty="0"/>
-              <a:t>Scenario 1: </a:t>
+              <a:t>Scenario </a:t>
+            </a:r>
+            <a:r>
+              <a:rPr lang="en-US" dirty="0" smtClean="0"/>
+              <a:t>2: </a:t>
             </a:r>
             <a:r>
               <a:rPr lang="en-US" dirty="0" smtClean="0"/>
               <a:t>Provider Scheduling </a:t>
             </a:r>
             <a:r>
+              <a:rPr lang="en-US"/>
+              <a:t>for </a:t>
+            </a:r>
+            <a:r>
+              <a:rPr lang="en-US"/>
+              <a:t>E</a:t>
+            </a:r>
+            <a:r>
+              <a:rPr lang="en-US" smtClean="0"/>
+              <a:t>xisting </a:t>
+            </a:r>
+            <a:r>
               <a:rPr lang="en-US" dirty="0"/>
-              <a:t>for </a:t>
-            </a:r>
-            <a:r>
-              <a:rPr lang="en-US" dirty="0" smtClean="0"/>
-              <a:t>existing </a:t>
-            </a:r>
-            <a:r>
-              <a:rPr lang="en-US" dirty="0"/>
-              <a:t>patient</a:t>
-            </a:r>
-          </a:p>
-        </p:txBody>
-      </p:sp>
-      <p:sp>
-        <p:nvSpPr>
-          <p:cNvPr id="2" name="TextBox 1"/>
-          <p:cNvSpPr txBox="1"/>
-          <p:nvPr/>
-        </p:nvSpPr>
-        <p:spPr>
-          <a:xfrm>
-            <a:off x="5690339" y="1022686"/>
-            <a:ext cx="1220527" cy="923330"/>
-          </a:xfrm>
-          <a:prstGeom prst="rect">
-            <a:avLst/>
-          </a:prstGeom>
-          <a:noFill/>
-        </p:spPr>
-        <p:txBody>
-          <a:bodyPr wrap="square" rtlCol="0">
-            <a:spAutoFit/>
-          </a:bodyPr>
-          <a:lstStyle/>
-          <a:p>
+              <a:t>P</a:t>
+            </a:r>
             <a:r>
               <a:rPr lang="en-US" smtClean="0"/>
-              <a:t>Existing patient</a:t>
-            </a:r>
-            <a:endParaRPr lang="en-US" dirty="0"/>
-          </a:p>
-          <a:p>
+              <a:t>atient</a:t>
+            </a:r>
             <a:endParaRPr lang="en-US" dirty="0"/>
           </a:p>
         </p:txBody>
@@ -18798,12 +17120,12 @@
               <a:buAutoNum type="arabicPeriod" startAt="2"/>
             </a:pPr>
             <a:r>
-              <a:rPr lang="en-US" dirty="0"/>
-              <a:t>Patient </a:t>
-            </a:r>
-            <a:r>
               <a:rPr lang="en-US" dirty="0" smtClean="0"/>
-              <a:t>registration/ coverage (option A)</a:t>
+              <a:t>New patient registration/ </a:t>
+            </a:r>
+            <a:r>
+              <a:rPr lang="en-US" dirty="0" smtClean="0"/>
+              <a:t>coverage (option A)</a:t>
             </a:r>
             <a:endParaRPr lang="en-US" dirty="0"/>
           </a:p>
@@ -18849,8 +17171,8 @@
               <a:buAutoNum type="arabicPeriod" startAt="5"/>
             </a:pPr>
             <a:r>
-              <a:rPr lang="en-US" dirty="0"/>
-              <a:t>Patient </a:t>
+              <a:rPr lang="en-US" dirty="0" smtClean="0"/>
+              <a:t>New patient </a:t>
             </a:r>
             <a:r>
               <a:rPr lang="en-US" dirty="0" smtClean="0"/>
@@ -19025,7 +17347,7 @@
         <p:spPr>
           <a:xfrm>
             <a:off x="822211" y="1181691"/>
-            <a:ext cx="1857375" cy="1200329"/>
+            <a:ext cx="2152235" cy="923330"/>
           </a:xfrm>
           <a:prstGeom prst="rect">
             <a:avLst/>
@@ -19043,8 +17365,36 @@
               <a:t>Scenario </a:t>
             </a:r>
             <a:r>
+              <a:rPr lang="en-US" dirty="0"/>
+              <a:t>1</a:t>
+            </a:r>
+            <a:r>
               <a:rPr lang="en-US" dirty="0" smtClean="0"/>
-              <a:t>2: Provider scheduling for  new patient</a:t>
+              <a:t>: </a:t>
+            </a:r>
+            <a:r>
+              <a:rPr lang="en-US" dirty="0" smtClean="0"/>
+              <a:t>Provider </a:t>
+            </a:r>
+            <a:r>
+              <a:rPr lang="en-US" smtClean="0"/>
+              <a:t>scheduling </a:t>
+            </a:r>
+            <a:r>
+              <a:rPr lang="en-US" smtClean="0"/>
+              <a:t>G</a:t>
+            </a:r>
+            <a:r>
+              <a:rPr lang="en-US" smtClean="0"/>
+              <a:t>eneral </a:t>
+            </a:r>
+            <a:r>
+              <a:rPr lang="en-US" dirty="0"/>
+              <a:t>C</a:t>
+            </a:r>
+            <a:r>
+              <a:rPr lang="en-US" smtClean="0"/>
+              <a:t>ase</a:t>
             </a:r>
             <a:endParaRPr lang="en-US" dirty="0"/>
           </a:p>
@@ -19260,35 +17610,6 @@
           </a:fontRef>
         </p:style>
       </p:cxnSp>
-      <p:sp>
-        <p:nvSpPr>
-          <p:cNvPr id="73" name="Rectangle 72"/>
-          <p:cNvSpPr/>
-          <p:nvPr/>
-        </p:nvSpPr>
-        <p:spPr>
-          <a:xfrm>
-            <a:off x="5179518" y="1117066"/>
-            <a:ext cx="866899" cy="646331"/>
-          </a:xfrm>
-          <a:prstGeom prst="rect">
-            <a:avLst/>
-          </a:prstGeom>
-        </p:spPr>
-        <p:txBody>
-          <a:bodyPr wrap="square">
-            <a:spAutoFit/>
-          </a:bodyPr>
-          <a:lstStyle/>
-          <a:p>
-            <a:r>
-              <a:rPr lang="en-US" smtClean="0"/>
-              <a:t>New patient</a:t>
-            </a:r>
-            <a:endParaRPr lang="en-US" dirty="0"/>
-          </a:p>
-        </p:txBody>
-      </p:sp>
     </p:spTree>
     <p:extLst>
       <p:ext uri="{BB962C8B-B14F-4D97-AF65-F5344CB8AC3E}">
@@ -20555,6 +18876,423 @@
 </p:sld>
 </file>
 
+<file path=ppt/slides/slide39.xml><?xml version="1.0" encoding="utf-8"?>
+<p:sld xmlns:a="http://schemas.openxmlformats.org/drawingml/2006/main" xmlns:r="http://schemas.openxmlformats.org/officeDocument/2006/relationships" xmlns:p="http://schemas.openxmlformats.org/presentationml/2006/main">
+  <p:cSld>
+    <p:spTree>
+      <p:nvGrpSpPr>
+        <p:cNvPr id="1" name=""/>
+        <p:cNvGrpSpPr/>
+        <p:nvPr/>
+      </p:nvGrpSpPr>
+      <p:grpSpPr>
+        <a:xfrm>
+          <a:off x="0" y="0"/>
+          <a:ext cx="0" cy="0"/>
+          <a:chOff x="0" y="0"/>
+          <a:chExt cx="0" cy="0"/>
+        </a:xfrm>
+      </p:grpSpPr>
+      <p:pic>
+        <p:nvPicPr>
+          <p:cNvPr id="3" name="Picture 2"/>
+          <p:cNvPicPr>
+            <a:picLocks noChangeAspect="1"/>
+          </p:cNvPicPr>
+          <p:nvPr/>
+        </p:nvPicPr>
+        <p:blipFill>
+          <a:blip r:embed="rId2"/>
+          <a:stretch>
+            <a:fillRect/>
+          </a:stretch>
+        </p:blipFill>
+        <p:spPr>
+          <a:xfrm>
+            <a:off x="585214" y="2230650"/>
+            <a:ext cx="1916243" cy="1916243"/>
+          </a:xfrm>
+          <a:prstGeom prst="rect">
+            <a:avLst/>
+          </a:prstGeom>
+          <a:ln w="25400">
+            <a:solidFill>
+              <a:schemeClr val="tx1"/>
+            </a:solidFill>
+            <a:prstDash val="dash"/>
+          </a:ln>
+        </p:spPr>
+      </p:pic>
+      <p:sp>
+        <p:nvSpPr>
+          <p:cNvPr id="39" name="Can 38"/>
+          <p:cNvSpPr/>
+          <p:nvPr/>
+        </p:nvSpPr>
+        <p:spPr>
+          <a:xfrm>
+            <a:off x="3883299" y="2390275"/>
+            <a:ext cx="2484820" cy="2258969"/>
+          </a:xfrm>
+          <a:prstGeom prst="can">
+            <a:avLst/>
+          </a:prstGeom>
+        </p:spPr>
+        <p:style>
+          <a:lnRef idx="2">
+            <a:schemeClr val="accent1">
+              <a:shade val="50000"/>
+            </a:schemeClr>
+          </a:lnRef>
+          <a:fillRef idx="1">
+            <a:schemeClr val="accent1"/>
+          </a:fillRef>
+          <a:effectRef idx="0">
+            <a:schemeClr val="accent1"/>
+          </a:effectRef>
+          <a:fontRef idx="minor">
+            <a:schemeClr val="lt1"/>
+          </a:fontRef>
+        </p:style>
+        <p:txBody>
+          <a:bodyPr rtlCol="0" anchor="ctr"/>
+          <a:lstStyle/>
+          <a:p>
+            <a:pPr algn="ctr"/>
+            <a:r>
+              <a:rPr lang="en-US" sz="2400" dirty="0" smtClean="0"/>
+              <a:t>Provider</a:t>
+            </a:r>
+          </a:p>
+          <a:p>
+            <a:pPr algn="ctr"/>
+            <a:r>
+              <a:rPr lang="en-US" sz="2400" dirty="0" smtClean="0"/>
+              <a:t>Scheduling Application</a:t>
+            </a:r>
+            <a:endParaRPr lang="en-US" sz="2400" dirty="0"/>
+          </a:p>
+        </p:txBody>
+      </p:sp>
+      <p:sp>
+        <p:nvSpPr>
+          <p:cNvPr id="53" name="Can 52"/>
+          <p:cNvSpPr/>
+          <p:nvPr/>
+        </p:nvSpPr>
+        <p:spPr>
+          <a:xfrm>
+            <a:off x="9297574" y="2359802"/>
+            <a:ext cx="2380957" cy="2258969"/>
+          </a:xfrm>
+          <a:prstGeom prst="can">
+            <a:avLst/>
+          </a:prstGeom>
+        </p:spPr>
+        <p:style>
+          <a:lnRef idx="2">
+            <a:schemeClr val="accent1">
+              <a:shade val="50000"/>
+            </a:schemeClr>
+          </a:lnRef>
+          <a:fillRef idx="1">
+            <a:schemeClr val="accent1"/>
+          </a:fillRef>
+          <a:effectRef idx="0">
+            <a:schemeClr val="accent1"/>
+          </a:effectRef>
+          <a:fontRef idx="minor">
+            <a:schemeClr val="lt1"/>
+          </a:fontRef>
+        </p:style>
+        <p:txBody>
+          <a:bodyPr rtlCol="0" anchor="ctr"/>
+          <a:lstStyle/>
+          <a:p>
+            <a:pPr algn="ctr"/>
+            <a:r>
+              <a:rPr lang="en-US" sz="2400" dirty="0" smtClean="0"/>
+              <a:t>FHIR Scheduler, (EHR)</a:t>
+            </a:r>
+            <a:endParaRPr lang="en-US" sz="2400" dirty="0"/>
+          </a:p>
+        </p:txBody>
+      </p:sp>
+      <p:grpSp>
+        <p:nvGrpSpPr>
+          <p:cNvPr id="20" name="Group 19"/>
+          <p:cNvGrpSpPr/>
+          <p:nvPr/>
+        </p:nvGrpSpPr>
+        <p:grpSpPr>
+          <a:xfrm>
+            <a:off x="6526250" y="2831485"/>
+            <a:ext cx="2713910" cy="580056"/>
+            <a:chOff x="-1796260" y="2363311"/>
+            <a:chExt cx="10092590" cy="784242"/>
+          </a:xfrm>
+        </p:grpSpPr>
+        <p:sp>
+          <p:nvSpPr>
+            <p:cNvPr id="21" name="TextBox 20"/>
+            <p:cNvSpPr txBox="1"/>
+            <p:nvPr/>
+          </p:nvSpPr>
+          <p:spPr>
+            <a:xfrm>
+              <a:off x="-741862" y="2363311"/>
+              <a:ext cx="7983794" cy="499341"/>
+            </a:xfrm>
+            <a:prstGeom prst="rect">
+              <a:avLst/>
+            </a:prstGeom>
+            <a:solidFill>
+              <a:schemeClr val="bg1"/>
+            </a:solidFill>
+            <a:effectLst/>
+          </p:spPr>
+          <p:txBody>
+            <a:bodyPr wrap="square" rtlCol="0">
+              <a:spAutoFit/>
+            </a:bodyPr>
+            <a:lstStyle/>
+            <a:p>
+              <a:r>
+                <a:rPr lang="en-US" dirty="0" smtClean="0"/>
+                <a:t>Appointment Search</a:t>
+              </a:r>
+              <a:endParaRPr lang="en-US" dirty="0"/>
+            </a:p>
+          </p:txBody>
+        </p:sp>
+        <p:cxnSp>
+          <p:nvCxnSpPr>
+            <p:cNvPr id="22" name="Straight Arrow Connector 21"/>
+            <p:cNvCxnSpPr/>
+            <p:nvPr/>
+          </p:nvCxnSpPr>
+          <p:spPr>
+            <a:xfrm>
+              <a:off x="-1796260" y="3134605"/>
+              <a:ext cx="10092590" cy="12948"/>
+            </a:xfrm>
+            <a:prstGeom prst="straightConnector1">
+              <a:avLst/>
+            </a:prstGeom>
+            <a:ln w="63500">
+              <a:headEnd type="none"/>
+              <a:tailEnd type="triangle"/>
+            </a:ln>
+          </p:spPr>
+          <p:style>
+            <a:lnRef idx="1">
+              <a:schemeClr val="accent1"/>
+            </a:lnRef>
+            <a:fillRef idx="0">
+              <a:schemeClr val="accent1"/>
+            </a:fillRef>
+            <a:effectRef idx="0">
+              <a:schemeClr val="accent1"/>
+            </a:effectRef>
+            <a:fontRef idx="minor">
+              <a:schemeClr val="tx1"/>
+            </a:fontRef>
+          </p:style>
+        </p:cxnSp>
+      </p:grpSp>
+      <p:cxnSp>
+        <p:nvCxnSpPr>
+          <p:cNvPr id="24" name="Straight Arrow Connector 23"/>
+          <p:cNvCxnSpPr/>
+          <p:nvPr/>
+        </p:nvCxnSpPr>
+        <p:spPr>
+          <a:xfrm>
+            <a:off x="6468835" y="3680645"/>
+            <a:ext cx="2713910" cy="8575"/>
+          </a:xfrm>
+          <a:prstGeom prst="straightConnector1">
+            <a:avLst/>
+          </a:prstGeom>
+          <a:ln w="63500">
+            <a:headEnd type="triangle"/>
+            <a:tailEnd type="none"/>
+          </a:ln>
+        </p:spPr>
+        <p:style>
+          <a:lnRef idx="1">
+            <a:schemeClr val="accent1"/>
+          </a:lnRef>
+          <a:fillRef idx="0">
+            <a:schemeClr val="accent1"/>
+          </a:fillRef>
+          <a:effectRef idx="0">
+            <a:schemeClr val="accent1"/>
+          </a:effectRef>
+          <a:fontRef idx="minor">
+            <a:schemeClr val="tx1"/>
+          </a:fontRef>
+        </p:style>
+      </p:cxnSp>
+      <p:sp>
+        <p:nvSpPr>
+          <p:cNvPr id="26" name="TextBox 25"/>
+          <p:cNvSpPr txBox="1"/>
+          <p:nvPr/>
+        </p:nvSpPr>
+        <p:spPr>
+          <a:xfrm>
+            <a:off x="6709063" y="3958324"/>
+            <a:ext cx="2247568" cy="369332"/>
+          </a:xfrm>
+          <a:prstGeom prst="rect">
+            <a:avLst/>
+          </a:prstGeom>
+          <a:solidFill>
+            <a:schemeClr val="bg1"/>
+          </a:solidFill>
+          <a:effectLst/>
+        </p:spPr>
+        <p:txBody>
+          <a:bodyPr wrap="square" rtlCol="0">
+            <a:spAutoFit/>
+          </a:bodyPr>
+          <a:lstStyle/>
+          <a:p>
+            <a:r>
+              <a:rPr lang="en-US" dirty="0" smtClean="0"/>
+              <a:t>Return Search </a:t>
+            </a:r>
+            <a:r>
+              <a:rPr lang="en-US" smtClean="0"/>
+              <a:t>Results </a:t>
+            </a:r>
+            <a:endParaRPr lang="en-US" dirty="0"/>
+          </a:p>
+        </p:txBody>
+      </p:sp>
+      <p:sp>
+        <p:nvSpPr>
+          <p:cNvPr id="19" name="Can 18"/>
+          <p:cNvSpPr/>
+          <p:nvPr/>
+        </p:nvSpPr>
+        <p:spPr>
+          <a:xfrm>
+            <a:off x="3870512" y="2383272"/>
+            <a:ext cx="2484820" cy="2258969"/>
+          </a:xfrm>
+          <a:prstGeom prst="can">
+            <a:avLst/>
+          </a:prstGeom>
+        </p:spPr>
+        <p:style>
+          <a:lnRef idx="2">
+            <a:schemeClr val="accent1">
+              <a:shade val="50000"/>
+            </a:schemeClr>
+          </a:lnRef>
+          <a:fillRef idx="1">
+            <a:schemeClr val="accent1"/>
+          </a:fillRef>
+          <a:effectRef idx="0">
+            <a:schemeClr val="accent1"/>
+          </a:effectRef>
+          <a:fontRef idx="minor">
+            <a:schemeClr val="lt1"/>
+          </a:fontRef>
+        </p:style>
+        <p:txBody>
+          <a:bodyPr rtlCol="0" anchor="ctr"/>
+          <a:lstStyle/>
+          <a:p>
+            <a:pPr algn="ctr"/>
+            <a:r>
+              <a:rPr lang="en-US" sz="2400" dirty="0" smtClean="0"/>
+              <a:t>Provider</a:t>
+            </a:r>
+          </a:p>
+          <a:p>
+            <a:pPr algn="ctr"/>
+            <a:r>
+              <a:rPr lang="en-US" sz="2400" dirty="0" smtClean="0"/>
+              <a:t>Scheduling Application</a:t>
+            </a:r>
+            <a:endParaRPr lang="en-US" sz="2400" dirty="0"/>
+          </a:p>
+        </p:txBody>
+      </p:sp>
+      <p:sp>
+        <p:nvSpPr>
+          <p:cNvPr id="28" name="Can 27"/>
+          <p:cNvSpPr/>
+          <p:nvPr/>
+        </p:nvSpPr>
+        <p:spPr>
+          <a:xfrm>
+            <a:off x="3856400" y="2390274"/>
+            <a:ext cx="2484820" cy="2258969"/>
+          </a:xfrm>
+          <a:prstGeom prst="can">
+            <a:avLst/>
+          </a:prstGeom>
+        </p:spPr>
+        <p:style>
+          <a:lnRef idx="2">
+            <a:schemeClr val="accent1">
+              <a:shade val="50000"/>
+            </a:schemeClr>
+          </a:lnRef>
+          <a:fillRef idx="1">
+            <a:schemeClr val="accent1"/>
+          </a:fillRef>
+          <a:effectRef idx="0">
+            <a:schemeClr val="accent1"/>
+          </a:effectRef>
+          <a:fontRef idx="minor">
+            <a:schemeClr val="lt1"/>
+          </a:fontRef>
+        </p:style>
+        <p:txBody>
+          <a:bodyPr rtlCol="0" anchor="ctr"/>
+          <a:lstStyle/>
+          <a:p>
+            <a:pPr algn="ctr"/>
+            <a:r>
+              <a:rPr lang="en-US" sz="2400" dirty="0" smtClean="0"/>
+              <a:t>Provider</a:t>
+            </a:r>
+          </a:p>
+          <a:p>
+            <a:pPr algn="ctr"/>
+            <a:r>
+              <a:rPr lang="en-US" sz="2400" dirty="0" smtClean="0"/>
+              <a:t>Scheduling Application</a:t>
+            </a:r>
+            <a:endParaRPr lang="en-US" sz="2400" dirty="0"/>
+          </a:p>
+        </p:txBody>
+      </p:sp>
+    </p:spTree>
+    <p:extLst>
+      <p:ext uri="{BB962C8B-B14F-4D97-AF65-F5344CB8AC3E}">
+        <p14:creationId xmlns:p14="http://schemas.microsoft.com/office/powerpoint/2010/main" val="450343683"/>
+      </p:ext>
+    </p:extLst>
+  </p:cSld>
+  <p:clrMapOvr>
+    <a:masterClrMapping/>
+  </p:clrMapOvr>
+  <p:timing>
+    <p:tnLst>
+      <p:par>
+        <p:cTn id="1" dur="indefinite" restart="never" nodeType="tmRoot"/>
+      </p:par>
+    </p:tnLst>
+  </p:timing>
+</p:sld>
+</file>
+
 <file path=ppt/slides/slide4.xml><?xml version="1.0" encoding="utf-8"?>
 <p:sld xmlns:a="http://schemas.openxmlformats.org/drawingml/2006/main" xmlns:r="http://schemas.openxmlformats.org/officeDocument/2006/relationships" xmlns:p="http://schemas.openxmlformats.org/presentationml/2006/main">
   <p:cSld>
@@ -20999,6 +19737,755 @@
     <p:extLst>
       <p:ext uri="{BB962C8B-B14F-4D97-AF65-F5344CB8AC3E}">
         <p14:creationId xmlns:p14="http://schemas.microsoft.com/office/powerpoint/2010/main" val="848340449"/>
+      </p:ext>
+    </p:extLst>
+  </p:cSld>
+  <p:clrMapOvr>
+    <a:masterClrMapping/>
+  </p:clrMapOvr>
+  <p:timing>
+    <p:tnLst>
+      <p:par>
+        <p:cTn id="1" dur="indefinite" restart="never" nodeType="tmRoot"/>
+      </p:par>
+    </p:tnLst>
+  </p:timing>
+</p:sld>
+</file>
+
+<file path=ppt/slides/slide40.xml><?xml version="1.0" encoding="utf-8"?>
+<p:sld xmlns:a="http://schemas.openxmlformats.org/drawingml/2006/main" xmlns:r="http://schemas.openxmlformats.org/officeDocument/2006/relationships" xmlns:p="http://schemas.openxmlformats.org/presentationml/2006/main">
+  <p:cSld>
+    <p:spTree>
+      <p:nvGrpSpPr>
+        <p:cNvPr id="1" name=""/>
+        <p:cNvGrpSpPr/>
+        <p:nvPr/>
+      </p:nvGrpSpPr>
+      <p:grpSpPr>
+        <a:xfrm>
+          <a:off x="0" y="0"/>
+          <a:ext cx="0" cy="0"/>
+          <a:chOff x="0" y="0"/>
+          <a:chExt cx="0" cy="0"/>
+        </a:xfrm>
+      </p:grpSpPr>
+      <p:sp>
+        <p:nvSpPr>
+          <p:cNvPr id="3" name="Rounded Rectangle 2"/>
+          <p:cNvSpPr/>
+          <p:nvPr/>
+        </p:nvSpPr>
+        <p:spPr>
+          <a:xfrm>
+            <a:off x="3443893" y="968124"/>
+            <a:ext cx="1991328" cy="1163412"/>
+          </a:xfrm>
+          <a:prstGeom prst="roundRect">
+            <a:avLst/>
+          </a:prstGeom>
+        </p:spPr>
+        <p:style>
+          <a:lnRef idx="2">
+            <a:schemeClr val="accent1">
+              <a:shade val="50000"/>
+            </a:schemeClr>
+          </a:lnRef>
+          <a:fillRef idx="1">
+            <a:schemeClr val="accent1"/>
+          </a:fillRef>
+          <a:effectRef idx="0">
+            <a:schemeClr val="accent1"/>
+          </a:effectRef>
+          <a:fontRef idx="minor">
+            <a:schemeClr val="lt1"/>
+          </a:fontRef>
+        </p:style>
+        <p:txBody>
+          <a:bodyPr rtlCol="0" anchor="ctr"/>
+          <a:lstStyle/>
+          <a:p>
+            <a:pPr marL="342900" indent="-342900">
+              <a:buFont typeface="+mj-lt"/>
+              <a:buAutoNum type="arabicPeriod"/>
+            </a:pPr>
+            <a:r>
+              <a:rPr lang="en-US" dirty="0" smtClean="0"/>
+              <a:t>Patient registration/ coverage</a:t>
+            </a:r>
+            <a:endParaRPr lang="en-US" dirty="0"/>
+          </a:p>
+        </p:txBody>
+      </p:sp>
+      <p:sp>
+        <p:nvSpPr>
+          <p:cNvPr id="8" name="Rounded Rectangle 7"/>
+          <p:cNvSpPr/>
+          <p:nvPr/>
+        </p:nvSpPr>
+        <p:spPr>
+          <a:xfrm>
+            <a:off x="3456972" y="2848076"/>
+            <a:ext cx="1991328" cy="1163412"/>
+          </a:xfrm>
+          <a:prstGeom prst="roundRect">
+            <a:avLst/>
+          </a:prstGeom>
+        </p:spPr>
+        <p:style>
+          <a:lnRef idx="2">
+            <a:schemeClr val="accent1">
+              <a:shade val="50000"/>
+            </a:schemeClr>
+          </a:lnRef>
+          <a:fillRef idx="1">
+            <a:schemeClr val="accent1"/>
+          </a:fillRef>
+          <a:effectRef idx="0">
+            <a:schemeClr val="accent1"/>
+          </a:effectRef>
+          <a:fontRef idx="minor">
+            <a:schemeClr val="lt1"/>
+          </a:fontRef>
+        </p:style>
+        <p:txBody>
+          <a:bodyPr rtlCol="0" anchor="ctr"/>
+          <a:lstStyle/>
+          <a:p>
+            <a:pPr marL="342900" indent="-342900">
+              <a:buFont typeface="+mj-lt"/>
+              <a:buAutoNum type="arabicPeriod" startAt="2"/>
+            </a:pPr>
+            <a:r>
+              <a:rPr lang="en-US" dirty="0"/>
+              <a:t>Appointment availability search</a:t>
+            </a:r>
+            <a:endParaRPr lang="en-US" dirty="0"/>
+          </a:p>
+        </p:txBody>
+      </p:sp>
+      <p:cxnSp>
+        <p:nvCxnSpPr>
+          <p:cNvPr id="12" name="Straight Arrow Connector 11"/>
+          <p:cNvCxnSpPr>
+            <a:endCxn id="3" idx="2"/>
+          </p:cNvCxnSpPr>
+          <p:nvPr/>
+        </p:nvCxnSpPr>
+        <p:spPr>
+          <a:xfrm flipV="1">
+            <a:off x="4439557" y="2131536"/>
+            <a:ext cx="0" cy="716541"/>
+          </a:xfrm>
+          <a:prstGeom prst="straightConnector1">
+            <a:avLst/>
+          </a:prstGeom>
+          <a:ln w="38100">
+            <a:solidFill>
+              <a:schemeClr val="tx1"/>
+            </a:solidFill>
+            <a:headEnd type="triangle"/>
+            <a:tailEnd type="none"/>
+          </a:ln>
+        </p:spPr>
+        <p:style>
+          <a:lnRef idx="1">
+            <a:schemeClr val="accent1"/>
+          </a:lnRef>
+          <a:fillRef idx="0">
+            <a:schemeClr val="accent1"/>
+          </a:fillRef>
+          <a:effectRef idx="0">
+            <a:schemeClr val="accent1"/>
+          </a:effectRef>
+          <a:fontRef idx="minor">
+            <a:schemeClr val="tx1"/>
+          </a:fontRef>
+        </p:style>
+      </p:cxnSp>
+      <p:cxnSp>
+        <p:nvCxnSpPr>
+          <p:cNvPr id="25" name="Straight Arrow Connector 24"/>
+          <p:cNvCxnSpPr>
+            <a:endCxn id="3" idx="0"/>
+          </p:cNvCxnSpPr>
+          <p:nvPr/>
+        </p:nvCxnSpPr>
+        <p:spPr>
+          <a:xfrm flipH="1">
+            <a:off x="4439557" y="254000"/>
+            <a:ext cx="13079" cy="714124"/>
+          </a:xfrm>
+          <a:prstGeom prst="straightConnector1">
+            <a:avLst/>
+          </a:prstGeom>
+          <a:ln w="38100">
+            <a:solidFill>
+              <a:schemeClr val="tx1"/>
+            </a:solidFill>
+            <a:tailEnd type="triangle"/>
+          </a:ln>
+        </p:spPr>
+        <p:style>
+          <a:lnRef idx="1">
+            <a:schemeClr val="accent1"/>
+          </a:lnRef>
+          <a:fillRef idx="0">
+            <a:schemeClr val="accent1"/>
+          </a:fillRef>
+          <a:effectRef idx="0">
+            <a:schemeClr val="accent1"/>
+          </a:effectRef>
+          <a:fontRef idx="minor">
+            <a:schemeClr val="tx1"/>
+          </a:fontRef>
+        </p:style>
+      </p:cxnSp>
+      <p:sp>
+        <p:nvSpPr>
+          <p:cNvPr id="50" name="TextBox 49"/>
+          <p:cNvSpPr txBox="1"/>
+          <p:nvPr/>
+        </p:nvSpPr>
+        <p:spPr>
+          <a:xfrm>
+            <a:off x="1041401" y="1345852"/>
+            <a:ext cx="2123376" cy="1200329"/>
+          </a:xfrm>
+          <a:prstGeom prst="rect">
+            <a:avLst/>
+          </a:prstGeom>
+          <a:noFill/>
+        </p:spPr>
+        <p:txBody>
+          <a:bodyPr wrap="square" rtlCol="0">
+            <a:spAutoFit/>
+          </a:bodyPr>
+          <a:lstStyle/>
+          <a:p>
+            <a:r>
+              <a:rPr lang="en-US" dirty="0"/>
+              <a:t>Scenario </a:t>
+            </a:r>
+            <a:r>
+              <a:rPr lang="en-US" dirty="0"/>
+              <a:t>3</a:t>
+            </a:r>
+            <a:r>
+              <a:rPr lang="en-US" dirty="0" smtClean="0"/>
+              <a:t>: </a:t>
+            </a:r>
+            <a:r>
+              <a:rPr lang="en-US" dirty="0" smtClean="0"/>
+              <a:t>Provider Scheduling </a:t>
+            </a:r>
+            <a:r>
+              <a:rPr lang="en-US" dirty="0"/>
+              <a:t>for </a:t>
+            </a:r>
+            <a:r>
+              <a:rPr lang="en-US" dirty="0"/>
+              <a:t>E</a:t>
+            </a:r>
+            <a:r>
+              <a:rPr lang="en-US" dirty="0" smtClean="0"/>
+              <a:t>xisting </a:t>
+            </a:r>
+            <a:r>
+              <a:rPr lang="en-US" dirty="0" smtClean="0"/>
+              <a:t>P</a:t>
+            </a:r>
+            <a:r>
+              <a:rPr lang="en-US" dirty="0" smtClean="0"/>
+              <a:t>atient </a:t>
+            </a:r>
+            <a:r>
+              <a:rPr lang="en-US" i="1" dirty="0" smtClean="0"/>
+              <a:t>within</a:t>
+            </a:r>
+            <a:r>
+              <a:rPr lang="en-US" dirty="0" smtClean="0"/>
+              <a:t> system</a:t>
+            </a:r>
+            <a:endParaRPr lang="en-US" dirty="0"/>
+          </a:p>
+        </p:txBody>
+      </p:sp>
+      <p:cxnSp>
+        <p:nvCxnSpPr>
+          <p:cNvPr id="14" name="Straight Arrow Connector 13"/>
+          <p:cNvCxnSpPr>
+            <a:stCxn id="8" idx="2"/>
+            <a:endCxn id="15" idx="0"/>
+          </p:cNvCxnSpPr>
+          <p:nvPr/>
+        </p:nvCxnSpPr>
+        <p:spPr>
+          <a:xfrm>
+            <a:off x="4452636" y="4011488"/>
+            <a:ext cx="0" cy="716540"/>
+          </a:xfrm>
+          <a:prstGeom prst="straightConnector1">
+            <a:avLst/>
+          </a:prstGeom>
+          <a:ln w="38100">
+            <a:solidFill>
+              <a:schemeClr val="tx1"/>
+            </a:solidFill>
+            <a:tailEnd type="triangle"/>
+          </a:ln>
+        </p:spPr>
+        <p:style>
+          <a:lnRef idx="1">
+            <a:schemeClr val="accent1"/>
+          </a:lnRef>
+          <a:fillRef idx="0">
+            <a:schemeClr val="accent1"/>
+          </a:fillRef>
+          <a:effectRef idx="0">
+            <a:schemeClr val="accent1"/>
+          </a:effectRef>
+          <a:fontRef idx="minor">
+            <a:schemeClr val="tx1"/>
+          </a:fontRef>
+        </p:style>
+      </p:cxnSp>
+      <p:sp>
+        <p:nvSpPr>
+          <p:cNvPr id="15" name="Rounded Rectangle 14"/>
+          <p:cNvSpPr/>
+          <p:nvPr/>
+        </p:nvSpPr>
+        <p:spPr>
+          <a:xfrm>
+            <a:off x="3456972" y="4728028"/>
+            <a:ext cx="1991328" cy="1163412"/>
+          </a:xfrm>
+          <a:prstGeom prst="roundRect">
+            <a:avLst/>
+          </a:prstGeom>
+        </p:spPr>
+        <p:style>
+          <a:lnRef idx="2">
+            <a:schemeClr val="accent1">
+              <a:shade val="50000"/>
+            </a:schemeClr>
+          </a:lnRef>
+          <a:fillRef idx="1">
+            <a:schemeClr val="accent1"/>
+          </a:fillRef>
+          <a:effectRef idx="0">
+            <a:schemeClr val="accent1"/>
+          </a:effectRef>
+          <a:fontRef idx="minor">
+            <a:schemeClr val="lt1"/>
+          </a:fontRef>
+        </p:style>
+        <p:txBody>
+          <a:bodyPr rtlCol="0" anchor="ctr"/>
+          <a:lstStyle/>
+          <a:p>
+            <a:pPr marL="342900" indent="-342900">
+              <a:buFont typeface="+mj-lt"/>
+              <a:buAutoNum type="arabicPeriod" startAt="3"/>
+            </a:pPr>
+            <a:r>
+              <a:rPr lang="en-US" dirty="0"/>
+              <a:t>Book appointment</a:t>
+            </a:r>
+            <a:endParaRPr lang="en-US" dirty="0"/>
+          </a:p>
+        </p:txBody>
+      </p:sp>
+      <p:cxnSp>
+        <p:nvCxnSpPr>
+          <p:cNvPr id="16" name="Straight Arrow Connector 15"/>
+          <p:cNvCxnSpPr/>
+          <p:nvPr/>
+        </p:nvCxnSpPr>
+        <p:spPr>
+          <a:xfrm>
+            <a:off x="4439557" y="5891440"/>
+            <a:ext cx="0" cy="694402"/>
+          </a:xfrm>
+          <a:prstGeom prst="straightConnector1">
+            <a:avLst/>
+          </a:prstGeom>
+          <a:ln w="38100">
+            <a:solidFill>
+              <a:schemeClr val="tx1"/>
+            </a:solidFill>
+            <a:tailEnd type="triangle"/>
+          </a:ln>
+        </p:spPr>
+        <p:style>
+          <a:lnRef idx="1">
+            <a:schemeClr val="accent1"/>
+          </a:lnRef>
+          <a:fillRef idx="0">
+            <a:schemeClr val="accent1"/>
+          </a:fillRef>
+          <a:effectRef idx="0">
+            <a:schemeClr val="accent1"/>
+          </a:effectRef>
+          <a:fontRef idx="minor">
+            <a:schemeClr val="tx1"/>
+          </a:fontRef>
+        </p:style>
+      </p:cxnSp>
+    </p:spTree>
+    <p:extLst>
+      <p:ext uri="{BB962C8B-B14F-4D97-AF65-F5344CB8AC3E}">
+        <p14:creationId xmlns:p14="http://schemas.microsoft.com/office/powerpoint/2010/main" val="386018964"/>
+      </p:ext>
+    </p:extLst>
+  </p:cSld>
+  <p:clrMapOvr>
+    <a:masterClrMapping/>
+  </p:clrMapOvr>
+</p:sld>
+</file>
+
+<file path=ppt/slides/slide41.xml><?xml version="1.0" encoding="utf-8"?>
+<p:sld xmlns:a="http://schemas.openxmlformats.org/drawingml/2006/main" xmlns:r="http://schemas.openxmlformats.org/officeDocument/2006/relationships" xmlns:p="http://schemas.openxmlformats.org/presentationml/2006/main">
+  <p:cSld>
+    <p:spTree>
+      <p:nvGrpSpPr>
+        <p:cNvPr id="1" name=""/>
+        <p:cNvGrpSpPr/>
+        <p:nvPr/>
+      </p:nvGrpSpPr>
+      <p:grpSpPr>
+        <a:xfrm>
+          <a:off x="0" y="0"/>
+          <a:ext cx="0" cy="0"/>
+          <a:chOff x="0" y="0"/>
+          <a:chExt cx="0" cy="0"/>
+        </a:xfrm>
+      </p:grpSpPr>
+      <p:pic>
+        <p:nvPicPr>
+          <p:cNvPr id="3" name="Picture 2"/>
+          <p:cNvPicPr>
+            <a:picLocks noChangeAspect="1"/>
+          </p:cNvPicPr>
+          <p:nvPr/>
+        </p:nvPicPr>
+        <p:blipFill>
+          <a:blip r:embed="rId2"/>
+          <a:stretch>
+            <a:fillRect/>
+          </a:stretch>
+        </p:blipFill>
+        <p:spPr>
+          <a:xfrm>
+            <a:off x="585214" y="2230650"/>
+            <a:ext cx="1916243" cy="1916243"/>
+          </a:xfrm>
+          <a:prstGeom prst="rect">
+            <a:avLst/>
+          </a:prstGeom>
+        </p:spPr>
+      </p:pic>
+      <p:sp>
+        <p:nvSpPr>
+          <p:cNvPr id="39" name="Can 38"/>
+          <p:cNvSpPr/>
+          <p:nvPr/>
+        </p:nvSpPr>
+        <p:spPr>
+          <a:xfrm>
+            <a:off x="3883299" y="2390275"/>
+            <a:ext cx="2484820" cy="2258969"/>
+          </a:xfrm>
+          <a:prstGeom prst="can">
+            <a:avLst/>
+          </a:prstGeom>
+        </p:spPr>
+        <p:style>
+          <a:lnRef idx="2">
+            <a:schemeClr val="accent1">
+              <a:shade val="50000"/>
+            </a:schemeClr>
+          </a:lnRef>
+          <a:fillRef idx="1">
+            <a:schemeClr val="accent1"/>
+          </a:fillRef>
+          <a:effectRef idx="0">
+            <a:schemeClr val="accent1"/>
+          </a:effectRef>
+          <a:fontRef idx="minor">
+            <a:schemeClr val="lt1"/>
+          </a:fontRef>
+        </p:style>
+        <p:txBody>
+          <a:bodyPr rtlCol="0" anchor="ctr"/>
+          <a:lstStyle/>
+          <a:p>
+            <a:pPr algn="ctr"/>
+            <a:r>
+              <a:rPr lang="en-US" sz="2400" dirty="0" smtClean="0"/>
+              <a:t>Provider</a:t>
+            </a:r>
+          </a:p>
+          <a:p>
+            <a:pPr algn="ctr"/>
+            <a:r>
+              <a:rPr lang="en-US" sz="2400" dirty="0" smtClean="0"/>
+              <a:t>Scheduling Application</a:t>
+            </a:r>
+            <a:endParaRPr lang="en-US" sz="2400" dirty="0"/>
+          </a:p>
+        </p:txBody>
+      </p:sp>
+      <p:sp>
+        <p:nvSpPr>
+          <p:cNvPr id="53" name="Can 52"/>
+          <p:cNvSpPr/>
+          <p:nvPr/>
+        </p:nvSpPr>
+        <p:spPr>
+          <a:xfrm>
+            <a:off x="9297574" y="2359802"/>
+            <a:ext cx="2380957" cy="2258969"/>
+          </a:xfrm>
+          <a:prstGeom prst="can">
+            <a:avLst/>
+          </a:prstGeom>
+        </p:spPr>
+        <p:style>
+          <a:lnRef idx="2">
+            <a:schemeClr val="accent1">
+              <a:shade val="50000"/>
+            </a:schemeClr>
+          </a:lnRef>
+          <a:fillRef idx="1">
+            <a:schemeClr val="accent1"/>
+          </a:fillRef>
+          <a:effectRef idx="0">
+            <a:schemeClr val="accent1"/>
+          </a:effectRef>
+          <a:fontRef idx="minor">
+            <a:schemeClr val="lt1"/>
+          </a:fontRef>
+        </p:style>
+        <p:txBody>
+          <a:bodyPr rtlCol="0" anchor="ctr"/>
+          <a:lstStyle/>
+          <a:p>
+            <a:pPr algn="ctr"/>
+            <a:r>
+              <a:rPr lang="en-US" sz="2400" dirty="0" smtClean="0"/>
+              <a:t>FHIR Scheduler, (EHR)</a:t>
+            </a:r>
+            <a:endParaRPr lang="en-US" sz="2400" dirty="0"/>
+          </a:p>
+        </p:txBody>
+      </p:sp>
+      <p:sp>
+        <p:nvSpPr>
+          <p:cNvPr id="21" name="TextBox 20"/>
+          <p:cNvSpPr txBox="1"/>
+          <p:nvPr/>
+        </p:nvSpPr>
+        <p:spPr>
+          <a:xfrm>
+            <a:off x="6842104" y="2914802"/>
+            <a:ext cx="2146852" cy="369332"/>
+          </a:xfrm>
+          <a:prstGeom prst="rect">
+            <a:avLst/>
+          </a:prstGeom>
+          <a:solidFill>
+            <a:schemeClr val="bg1"/>
+          </a:solidFill>
+          <a:effectLst/>
+        </p:spPr>
+        <p:txBody>
+          <a:bodyPr wrap="square" rtlCol="0">
+            <a:spAutoFit/>
+          </a:bodyPr>
+          <a:lstStyle/>
+          <a:p>
+            <a:r>
+              <a:rPr lang="en-US" smtClean="0"/>
+              <a:t>Books </a:t>
+            </a:r>
+            <a:r>
+              <a:rPr lang="en-US" dirty="0"/>
+              <a:t>Appointment</a:t>
+            </a:r>
+          </a:p>
+        </p:txBody>
+      </p:sp>
+      <p:cxnSp>
+        <p:nvCxnSpPr>
+          <p:cNvPr id="22" name="Straight Arrow Connector 21"/>
+          <p:cNvCxnSpPr/>
+          <p:nvPr/>
+        </p:nvCxnSpPr>
+        <p:spPr>
+          <a:xfrm>
+            <a:off x="6482947" y="3490129"/>
+            <a:ext cx="2713910" cy="9577"/>
+          </a:xfrm>
+          <a:prstGeom prst="straightConnector1">
+            <a:avLst/>
+          </a:prstGeom>
+          <a:ln w="63500">
+            <a:headEnd type="none"/>
+            <a:tailEnd type="triangle"/>
+          </a:ln>
+        </p:spPr>
+        <p:style>
+          <a:lnRef idx="1">
+            <a:schemeClr val="accent1"/>
+          </a:lnRef>
+          <a:fillRef idx="0">
+            <a:schemeClr val="accent1"/>
+          </a:fillRef>
+          <a:effectRef idx="0">
+            <a:schemeClr val="accent1"/>
+          </a:effectRef>
+          <a:fontRef idx="minor">
+            <a:schemeClr val="tx1"/>
+          </a:fontRef>
+        </p:style>
+      </p:cxnSp>
+      <p:cxnSp>
+        <p:nvCxnSpPr>
+          <p:cNvPr id="24" name="Straight Arrow Connector 23"/>
+          <p:cNvCxnSpPr/>
+          <p:nvPr/>
+        </p:nvCxnSpPr>
+        <p:spPr>
+          <a:xfrm>
+            <a:off x="6468835" y="3680645"/>
+            <a:ext cx="2713910" cy="8575"/>
+          </a:xfrm>
+          <a:prstGeom prst="straightConnector1">
+            <a:avLst/>
+          </a:prstGeom>
+          <a:ln w="63500">
+            <a:headEnd type="triangle"/>
+            <a:tailEnd type="none"/>
+          </a:ln>
+        </p:spPr>
+        <p:style>
+          <a:lnRef idx="1">
+            <a:schemeClr val="accent1"/>
+          </a:lnRef>
+          <a:fillRef idx="0">
+            <a:schemeClr val="accent1"/>
+          </a:fillRef>
+          <a:effectRef idx="0">
+            <a:schemeClr val="accent1"/>
+          </a:effectRef>
+          <a:fontRef idx="minor">
+            <a:schemeClr val="tx1"/>
+          </a:fontRef>
+        </p:style>
+      </p:cxnSp>
+      <p:sp>
+        <p:nvSpPr>
+          <p:cNvPr id="26" name="TextBox 25"/>
+          <p:cNvSpPr txBox="1"/>
+          <p:nvPr/>
+        </p:nvSpPr>
+        <p:spPr>
+          <a:xfrm>
+            <a:off x="6634203" y="3890367"/>
+            <a:ext cx="2562655" cy="369332"/>
+          </a:xfrm>
+          <a:prstGeom prst="rect">
+            <a:avLst/>
+          </a:prstGeom>
+          <a:solidFill>
+            <a:schemeClr val="bg1"/>
+          </a:solidFill>
+          <a:effectLst/>
+        </p:spPr>
+        <p:txBody>
+          <a:bodyPr wrap="square" rtlCol="0">
+            <a:spAutoFit/>
+          </a:bodyPr>
+          <a:lstStyle/>
+          <a:p>
+            <a:r>
+              <a:rPr lang="en-US" smtClean="0"/>
+              <a:t>Confirm/reject booking</a:t>
+            </a:r>
+            <a:endParaRPr lang="en-US" dirty="0"/>
+          </a:p>
+        </p:txBody>
+      </p:sp>
+      <p:sp>
+        <p:nvSpPr>
+          <p:cNvPr id="13" name="TextBox 12"/>
+          <p:cNvSpPr txBox="1"/>
+          <p:nvPr/>
+        </p:nvSpPr>
+        <p:spPr>
+          <a:xfrm>
+            <a:off x="2104435" y="2261452"/>
+            <a:ext cx="1736532" cy="923330"/>
+          </a:xfrm>
+          <a:prstGeom prst="rect">
+            <a:avLst/>
+          </a:prstGeom>
+          <a:noFill/>
+        </p:spPr>
+        <p:txBody>
+          <a:bodyPr wrap="square" rtlCol="0">
+            <a:spAutoFit/>
+          </a:bodyPr>
+          <a:lstStyle/>
+          <a:p>
+            <a:r>
+              <a:rPr lang="en-US" dirty="0" smtClean="0"/>
+              <a:t>End user selects from available appointments</a:t>
+            </a:r>
+            <a:endParaRPr lang="en-US" dirty="0"/>
+          </a:p>
+        </p:txBody>
+      </p:sp>
+      <p:cxnSp>
+        <p:nvCxnSpPr>
+          <p:cNvPr id="14" name="Straight Arrow Connector 13"/>
+          <p:cNvCxnSpPr/>
+          <p:nvPr/>
+        </p:nvCxnSpPr>
+        <p:spPr>
+          <a:xfrm flipV="1">
+            <a:off x="2319196" y="3361487"/>
+            <a:ext cx="1463387" cy="15532"/>
+          </a:xfrm>
+          <a:prstGeom prst="straightConnector1">
+            <a:avLst/>
+          </a:prstGeom>
+          <a:ln w="63500">
+            <a:tailEnd type="triangle"/>
+          </a:ln>
+        </p:spPr>
+        <p:style>
+          <a:lnRef idx="1">
+            <a:schemeClr val="accent1"/>
+          </a:lnRef>
+          <a:fillRef idx="0">
+            <a:schemeClr val="accent1"/>
+          </a:fillRef>
+          <a:effectRef idx="0">
+            <a:schemeClr val="accent1"/>
+          </a:effectRef>
+          <a:fontRef idx="minor">
+            <a:schemeClr val="tx1"/>
+          </a:fontRef>
+        </p:style>
+      </p:cxnSp>
+    </p:spTree>
+    <p:extLst>
+      <p:ext uri="{BB962C8B-B14F-4D97-AF65-F5344CB8AC3E}">
+        <p14:creationId xmlns:p14="http://schemas.microsoft.com/office/powerpoint/2010/main" val="1172123660"/>
       </p:ext>
     </p:extLst>
   </p:cSld>
@@ -22748,36 +22235,6 @@
           </a:p>
         </p:txBody>
       </p:sp>
-      <p:sp>
-        <p:nvSpPr>
-          <p:cNvPr id="2" name="TextBox 1"/>
-          <p:cNvSpPr txBox="1"/>
-          <p:nvPr/>
-        </p:nvSpPr>
-        <p:spPr>
-          <a:xfrm>
-            <a:off x="3281082" y="731520"/>
-            <a:ext cx="4292302" cy="369332"/>
-          </a:xfrm>
-          <a:prstGeom prst="rect">
-            <a:avLst/>
-          </a:prstGeom>
-          <a:noFill/>
-        </p:spPr>
-        <p:txBody>
-          <a:bodyPr wrap="square" rtlCol="0">
-            <a:spAutoFit/>
-          </a:bodyPr>
-          <a:lstStyle/>
-          <a:p>
-            <a:r>
-              <a:rPr lang="en-US" dirty="0" smtClean="0"/>
-              <a:t>Pre-fetch Work Flow </a:t>
-            </a:r>
-            <a:endParaRPr lang="en-US" dirty="0"/>
-          </a:p>
-        </p:txBody>
-      </p:sp>
       <p:pic>
         <p:nvPicPr>
           <p:cNvPr id="9" name="Picture 8"/>
@@ -23090,44 +22547,6 @@
               <a:t>FHIR Scheduler, (EHR)</a:t>
             </a:r>
             <a:endParaRPr lang="en-US" sz="2400" dirty="0"/>
-          </a:p>
-        </p:txBody>
-      </p:sp>
-      <p:sp>
-        <p:nvSpPr>
-          <p:cNvPr id="9" name="TextBox 8"/>
-          <p:cNvSpPr txBox="1"/>
-          <p:nvPr/>
-        </p:nvSpPr>
-        <p:spPr>
-          <a:xfrm>
-            <a:off x="3281082" y="731520"/>
-            <a:ext cx="4292302" cy="646331"/>
-          </a:xfrm>
-          <a:prstGeom prst="rect">
-            <a:avLst/>
-          </a:prstGeom>
-          <a:noFill/>
-        </p:spPr>
-        <p:txBody>
-          <a:bodyPr wrap="square" rtlCol="0">
-            <a:spAutoFit/>
-          </a:bodyPr>
-          <a:lstStyle/>
-          <a:p>
-            <a:r>
-              <a:rPr lang="en-US" dirty="0" smtClean="0"/>
-              <a:t>Pre-fetch Work Flow </a:t>
-            </a:r>
-            <a:r>
-              <a:rPr lang="mr-IN" dirty="0" smtClean="0"/>
-              <a:t>–</a:t>
-            </a:r>
-            <a:r>
-              <a:rPr lang="en-US" dirty="0" smtClean="0"/>
-              <a:t> Option 1: Poll for open slots</a:t>
-            </a:r>
-            <a:endParaRPr lang="en-US" dirty="0"/>
           </a:p>
         </p:txBody>
       </p:sp>

</xml_diff>

<commit_message>
qa edits update to operations
</commit_message>
<xml_diff>
--- a/meeting-notes/diagrams.pptx
+++ b/meeting-notes/diagrams.pptx
@@ -6683,159 +6683,106 @@
           </a:p>
         </p:txBody>
       </p:sp>
-      <p:grpSp>
-        <p:nvGrpSpPr>
-          <p:cNvPr id="15" name="Group 14"/>
-          <p:cNvGrpSpPr/>
-          <p:nvPr/>
-        </p:nvGrpSpPr>
-        <p:grpSpPr>
-          <a:xfrm>
-            <a:off x="6368119" y="2498690"/>
-            <a:ext cx="2929455" cy="1290702"/>
-            <a:chOff x="3858207" y="1856851"/>
-            <a:chExt cx="4595305" cy="1290702"/>
-          </a:xfrm>
-        </p:grpSpPr>
-        <p:cxnSp>
-          <p:nvCxnSpPr>
-            <p:cNvPr id="22" name="Straight Arrow Connector 21"/>
-            <p:cNvCxnSpPr/>
-            <p:nvPr/>
-          </p:nvCxnSpPr>
-          <p:spPr>
-            <a:xfrm>
-              <a:off x="4015389" y="2877921"/>
-              <a:ext cx="4438123" cy="0"/>
-            </a:xfrm>
-            <a:prstGeom prst="straightConnector1">
-              <a:avLst/>
-            </a:prstGeom>
-            <a:ln w="63500">
-              <a:tailEnd type="triangle"/>
-            </a:ln>
-          </p:spPr>
-          <p:style>
-            <a:lnRef idx="1">
-              <a:schemeClr val="accent1"/>
-            </a:lnRef>
-            <a:fillRef idx="0">
-              <a:schemeClr val="accent1"/>
-            </a:fillRef>
-            <a:effectRef idx="0">
-              <a:schemeClr val="accent1"/>
-            </a:effectRef>
-            <a:fontRef idx="minor">
-              <a:schemeClr val="tx1"/>
-            </a:fontRef>
-          </p:style>
-        </p:cxnSp>
-        <p:sp>
-          <p:nvSpPr>
-            <p:cNvPr id="4" name="TextBox 3"/>
-            <p:cNvSpPr txBox="1"/>
-            <p:nvPr/>
-          </p:nvSpPr>
-          <p:spPr>
-            <a:xfrm>
-              <a:off x="4853279" y="1856851"/>
-              <a:ext cx="3521642" cy="923330"/>
-            </a:xfrm>
-            <a:prstGeom prst="rect">
-              <a:avLst/>
-            </a:prstGeom>
-            <a:solidFill>
-              <a:schemeClr val="bg1"/>
-            </a:solidFill>
-            <a:effectLst/>
-          </p:spPr>
-          <p:txBody>
-            <a:bodyPr wrap="square" rtlCol="0">
-              <a:spAutoFit/>
-            </a:bodyPr>
-            <a:lstStyle/>
-            <a:p>
-              <a:r>
-                <a:rPr lang="en-US" dirty="0" smtClean="0"/>
-                <a:t>Fetch “initial load” of open Slots* for Service(s)</a:t>
-              </a:r>
-              <a:endParaRPr lang="en-US" dirty="0"/>
-            </a:p>
-          </p:txBody>
-        </p:sp>
-        <p:cxnSp>
-          <p:nvCxnSpPr>
-            <p:cNvPr id="23" name="Straight Arrow Connector 22"/>
-            <p:cNvCxnSpPr/>
-            <p:nvPr/>
-          </p:nvCxnSpPr>
-          <p:spPr>
-            <a:xfrm>
-              <a:off x="3858207" y="3147553"/>
-              <a:ext cx="4438123" cy="0"/>
-            </a:xfrm>
-            <a:prstGeom prst="straightConnector1">
-              <a:avLst/>
-            </a:prstGeom>
-            <a:ln w="63500">
-              <a:headEnd type="triangle"/>
-              <a:tailEnd type="none"/>
-            </a:ln>
-          </p:spPr>
-          <p:style>
-            <a:lnRef idx="1">
-              <a:schemeClr val="accent1"/>
-            </a:lnRef>
-            <a:fillRef idx="0">
-              <a:schemeClr val="accent1"/>
-            </a:fillRef>
-            <a:effectRef idx="0">
-              <a:schemeClr val="accent1"/>
-            </a:effectRef>
-            <a:fontRef idx="minor">
-              <a:schemeClr val="tx1"/>
-            </a:fontRef>
-          </p:style>
-        </p:cxnSp>
-        <p:sp>
-          <p:nvSpPr>
-            <p:cNvPr id="29" name="TextBox 28"/>
-            <p:cNvSpPr txBox="1"/>
-            <p:nvPr/>
-          </p:nvSpPr>
-          <p:spPr>
-            <a:xfrm>
-              <a:off x="4015389" y="2238958"/>
-              <a:ext cx="853118" cy="369332"/>
-            </a:xfrm>
-            <a:prstGeom prst="rect">
-              <a:avLst/>
-            </a:prstGeom>
-            <a:noFill/>
-            <a:ln w="25400">
-              <a:solidFill>
-                <a:schemeClr val="accent1">
-                  <a:shade val="50000"/>
-                </a:schemeClr>
-              </a:solidFill>
-            </a:ln>
-          </p:spPr>
-          <p:txBody>
-            <a:bodyPr wrap="square" rtlCol="0">
-              <a:spAutoFit/>
-            </a:bodyPr>
-            <a:lstStyle/>
-            <a:p>
-              <a:pPr algn="ctr"/>
-              <a:r>
-                <a:rPr lang="en-US" dirty="0" smtClean="0"/>
-                <a:t>AA</a:t>
-              </a:r>
-              <a:endParaRPr lang="en-US" dirty="0"/>
-            </a:p>
-          </p:txBody>
-        </p:sp>
-      </p:grpSp>
+      <p:cxnSp>
+        <p:nvCxnSpPr>
+          <p:cNvPr id="22" name="Straight Arrow Connector 21"/>
+          <p:cNvCxnSpPr/>
+          <p:nvPr/>
+        </p:nvCxnSpPr>
+        <p:spPr>
+          <a:xfrm>
+            <a:off x="6468321" y="3519760"/>
+            <a:ext cx="2829253" cy="0"/>
+          </a:xfrm>
+          <a:prstGeom prst="straightConnector1">
+            <a:avLst/>
+          </a:prstGeom>
+          <a:ln w="63500">
+            <a:tailEnd type="triangle"/>
+          </a:ln>
+        </p:spPr>
+        <p:style>
+          <a:lnRef idx="1">
+            <a:schemeClr val="accent1"/>
+          </a:lnRef>
+          <a:fillRef idx="0">
+            <a:schemeClr val="accent1"/>
+          </a:fillRef>
+          <a:effectRef idx="0">
+            <a:schemeClr val="accent1"/>
+          </a:effectRef>
+          <a:fontRef idx="minor">
+            <a:schemeClr val="tx1"/>
+          </a:fontRef>
+        </p:style>
+      </p:cxnSp>
+      <p:sp>
+        <p:nvSpPr>
+          <p:cNvPr id="4" name="TextBox 3"/>
+          <p:cNvSpPr txBox="1"/>
+          <p:nvPr/>
+        </p:nvSpPr>
+        <p:spPr>
+          <a:xfrm>
+            <a:off x="7002466" y="2498690"/>
+            <a:ext cx="2245007" cy="923330"/>
+          </a:xfrm>
+          <a:prstGeom prst="rect">
+            <a:avLst/>
+          </a:prstGeom>
+          <a:solidFill>
+            <a:schemeClr val="bg1"/>
+          </a:solidFill>
+          <a:effectLst/>
+        </p:spPr>
+        <p:txBody>
+          <a:bodyPr wrap="square" rtlCol="0">
+            <a:spAutoFit/>
+          </a:bodyPr>
+          <a:lstStyle/>
+          <a:p>
+            <a:r>
+              <a:rPr lang="en-US" dirty="0" smtClean="0"/>
+              <a:t>Fetch “initial load” of open Slots* for Service(s)</a:t>
+            </a:r>
+            <a:endParaRPr lang="en-US" dirty="0"/>
+          </a:p>
+        </p:txBody>
+      </p:sp>
+      <p:cxnSp>
+        <p:nvCxnSpPr>
+          <p:cNvPr id="23" name="Straight Arrow Connector 22"/>
+          <p:cNvCxnSpPr/>
+          <p:nvPr/>
+        </p:nvCxnSpPr>
+        <p:spPr>
+          <a:xfrm>
+            <a:off x="6368119" y="3789392"/>
+            <a:ext cx="2829253" cy="0"/>
+          </a:xfrm>
+          <a:prstGeom prst="straightConnector1">
+            <a:avLst/>
+          </a:prstGeom>
+          <a:ln w="63500">
+            <a:headEnd type="triangle"/>
+            <a:tailEnd type="none"/>
+          </a:ln>
+        </p:spPr>
+        <p:style>
+          <a:lnRef idx="1">
+            <a:schemeClr val="accent1"/>
+          </a:lnRef>
+          <a:fillRef idx="0">
+            <a:schemeClr val="accent1"/>
+          </a:fillRef>
+          <a:effectRef idx="0">
+            <a:schemeClr val="accent1"/>
+          </a:effectRef>
+          <a:fontRef idx="minor">
+            <a:schemeClr val="tx1"/>
+          </a:fontRef>
+        </p:style>
+      </p:cxnSp>
       <p:sp>
         <p:nvSpPr>
           <p:cNvPr id="8" name="Can 7"/>
@@ -7070,175 +7017,122 @@
           </a:p>
         </p:txBody>
       </p:sp>
-      <p:grpSp>
-        <p:nvGrpSpPr>
-          <p:cNvPr id="15" name="Group 14"/>
-          <p:cNvGrpSpPr/>
-          <p:nvPr/>
-        </p:nvGrpSpPr>
-        <p:grpSpPr>
-          <a:xfrm>
-            <a:off x="6368119" y="2498690"/>
-            <a:ext cx="2929455" cy="1290702"/>
-            <a:chOff x="3858207" y="1856851"/>
-            <a:chExt cx="4595305" cy="1290702"/>
-          </a:xfrm>
-        </p:grpSpPr>
-        <p:cxnSp>
-          <p:nvCxnSpPr>
-            <p:cNvPr id="22" name="Straight Arrow Connector 21"/>
-            <p:cNvCxnSpPr/>
-            <p:nvPr/>
-          </p:nvCxnSpPr>
-          <p:spPr>
-            <a:xfrm>
-              <a:off x="4015389" y="2877921"/>
-              <a:ext cx="4438123" cy="0"/>
-            </a:xfrm>
-            <a:prstGeom prst="straightConnector1">
-              <a:avLst/>
-            </a:prstGeom>
-            <a:ln w="63500">
-              <a:tailEnd type="triangle"/>
-            </a:ln>
-          </p:spPr>
-          <p:style>
-            <a:lnRef idx="1">
-              <a:schemeClr val="accent1"/>
-            </a:lnRef>
-            <a:fillRef idx="0">
-              <a:schemeClr val="accent1"/>
-            </a:fillRef>
-            <a:effectRef idx="0">
-              <a:schemeClr val="accent1"/>
-            </a:effectRef>
-            <a:fontRef idx="minor">
-              <a:schemeClr val="tx1"/>
-            </a:fontRef>
-          </p:style>
-        </p:cxnSp>
-        <p:sp>
-          <p:nvSpPr>
-            <p:cNvPr id="4" name="TextBox 3"/>
-            <p:cNvSpPr txBox="1"/>
-            <p:nvPr/>
-          </p:nvSpPr>
-          <p:spPr>
-            <a:xfrm>
-              <a:off x="4853279" y="1856851"/>
-              <a:ext cx="3521642" cy="923330"/>
-            </a:xfrm>
-            <a:prstGeom prst="rect">
-              <a:avLst/>
-            </a:prstGeom>
-            <a:solidFill>
-              <a:schemeClr val="bg1"/>
-            </a:solidFill>
-            <a:effectLst/>
-          </p:spPr>
-          <p:txBody>
-            <a:bodyPr wrap="square" rtlCol="0">
-              <a:spAutoFit/>
-            </a:bodyPr>
-            <a:lstStyle/>
-            <a:p>
-              <a:r>
-                <a:rPr lang="en-US" dirty="0" smtClean="0"/>
-                <a:t>Fetch </a:t>
-              </a:r>
-              <a:r>
-                <a:rPr lang="en-US" i="1" dirty="0" smtClean="0"/>
-                <a:t>all</a:t>
-              </a:r>
-              <a:r>
-                <a:rPr lang="en-US" dirty="0" smtClean="0"/>
-                <a:t> Slots</a:t>
-              </a:r>
-              <a:r>
-                <a:rPr lang="en-US" dirty="0" smtClean="0"/>
-                <a:t>* updated </a:t>
-              </a:r>
-              <a:r>
-                <a:rPr lang="en-US" dirty="0" smtClean="0"/>
-                <a:t>since last fetch</a:t>
-              </a:r>
-              <a:endParaRPr lang="en-US" dirty="0"/>
-            </a:p>
-          </p:txBody>
-        </p:sp>
-        <p:cxnSp>
-          <p:nvCxnSpPr>
-            <p:cNvPr id="23" name="Straight Arrow Connector 22"/>
-            <p:cNvCxnSpPr/>
-            <p:nvPr/>
-          </p:nvCxnSpPr>
-          <p:spPr>
-            <a:xfrm>
-              <a:off x="3858207" y="3147553"/>
-              <a:ext cx="4438123" cy="0"/>
-            </a:xfrm>
-            <a:prstGeom prst="straightConnector1">
-              <a:avLst/>
-            </a:prstGeom>
-            <a:ln w="63500">
-              <a:headEnd type="triangle"/>
-              <a:tailEnd type="none"/>
-            </a:ln>
-          </p:spPr>
-          <p:style>
-            <a:lnRef idx="1">
-              <a:schemeClr val="accent1"/>
-            </a:lnRef>
-            <a:fillRef idx="0">
-              <a:schemeClr val="accent1"/>
-            </a:fillRef>
-            <a:effectRef idx="0">
-              <a:schemeClr val="accent1"/>
-            </a:effectRef>
-            <a:fontRef idx="minor">
-              <a:schemeClr val="tx1"/>
-            </a:fontRef>
-          </p:style>
-        </p:cxnSp>
-        <p:sp>
-          <p:nvSpPr>
-            <p:cNvPr id="29" name="TextBox 28"/>
-            <p:cNvSpPr txBox="1"/>
-            <p:nvPr/>
-          </p:nvSpPr>
-          <p:spPr>
-            <a:xfrm>
-              <a:off x="4160992" y="2205609"/>
-              <a:ext cx="415618" cy="369332"/>
-            </a:xfrm>
-            <a:prstGeom prst="rect">
-              <a:avLst/>
-            </a:prstGeom>
-            <a:noFill/>
-            <a:ln w="25400">
-              <a:solidFill>
-                <a:schemeClr val="accent1">
-                  <a:shade val="50000"/>
-                </a:schemeClr>
-              </a:solidFill>
-            </a:ln>
-          </p:spPr>
-          <p:txBody>
-            <a:bodyPr wrap="square" rtlCol="0">
-              <a:spAutoFit/>
-            </a:bodyPr>
-            <a:lstStyle/>
-            <a:p>
-              <a:pPr algn="ctr"/>
-              <a:r>
-                <a:rPr lang="en-US" dirty="0" smtClean="0"/>
-                <a:t>C</a:t>
-              </a:r>
-              <a:endParaRPr lang="en-US" dirty="0"/>
-            </a:p>
-          </p:txBody>
-        </p:sp>
-      </p:grpSp>
+      <p:cxnSp>
+        <p:nvCxnSpPr>
+          <p:cNvPr id="22" name="Straight Arrow Connector 21"/>
+          <p:cNvCxnSpPr/>
+          <p:nvPr/>
+        </p:nvCxnSpPr>
+        <p:spPr>
+          <a:xfrm>
+            <a:off x="6468321" y="3519760"/>
+            <a:ext cx="2829253" cy="0"/>
+          </a:xfrm>
+          <a:prstGeom prst="straightConnector1">
+            <a:avLst/>
+          </a:prstGeom>
+          <a:ln w="63500">
+            <a:tailEnd type="triangle"/>
+          </a:ln>
+        </p:spPr>
+        <p:style>
+          <a:lnRef idx="1">
+            <a:schemeClr val="accent1"/>
+          </a:lnRef>
+          <a:fillRef idx="0">
+            <a:schemeClr val="accent1"/>
+          </a:fillRef>
+          <a:effectRef idx="0">
+            <a:schemeClr val="accent1"/>
+          </a:effectRef>
+          <a:fontRef idx="minor">
+            <a:schemeClr val="tx1"/>
+          </a:fontRef>
+        </p:style>
+      </p:cxnSp>
+      <p:sp>
+        <p:nvSpPr>
+          <p:cNvPr id="4" name="TextBox 3"/>
+          <p:cNvSpPr txBox="1"/>
+          <p:nvPr/>
+        </p:nvSpPr>
+        <p:spPr>
+          <a:xfrm>
+            <a:off x="6564281" y="2637731"/>
+            <a:ext cx="2537130" cy="646331"/>
+          </a:xfrm>
+          <a:prstGeom prst="rect">
+            <a:avLst/>
+          </a:prstGeom>
+          <a:solidFill>
+            <a:schemeClr val="bg1"/>
+          </a:solidFill>
+          <a:effectLst/>
+        </p:spPr>
+        <p:txBody>
+          <a:bodyPr wrap="square" rtlCol="0">
+            <a:spAutoFit/>
+          </a:bodyPr>
+          <a:lstStyle/>
+          <a:p>
+            <a:r>
+              <a:rPr lang="en-US" dirty="0" smtClean="0"/>
+              <a:t>Fetch </a:t>
+            </a:r>
+            <a:r>
+              <a:rPr lang="en-US" i="1" dirty="0" smtClean="0"/>
+              <a:t>all</a:t>
+            </a:r>
+            <a:r>
+              <a:rPr lang="en-US" dirty="0" smtClean="0"/>
+              <a:t> Slots</a:t>
+            </a:r>
+            <a:r>
+              <a:rPr lang="en-US" dirty="0" smtClean="0"/>
+              <a:t>* updated </a:t>
+            </a:r>
+            <a:r>
+              <a:rPr lang="en-US" dirty="0" smtClean="0"/>
+              <a:t>since last fetch</a:t>
+            </a:r>
+            <a:endParaRPr lang="en-US" dirty="0"/>
+          </a:p>
+        </p:txBody>
+      </p:sp>
+      <p:cxnSp>
+        <p:nvCxnSpPr>
+          <p:cNvPr id="23" name="Straight Arrow Connector 22"/>
+          <p:cNvCxnSpPr/>
+          <p:nvPr/>
+        </p:nvCxnSpPr>
+        <p:spPr>
+          <a:xfrm>
+            <a:off x="6368119" y="3789392"/>
+            <a:ext cx="2829253" cy="0"/>
+          </a:xfrm>
+          <a:prstGeom prst="straightConnector1">
+            <a:avLst/>
+          </a:prstGeom>
+          <a:ln w="63500">
+            <a:headEnd type="triangle"/>
+            <a:tailEnd type="none"/>
+          </a:ln>
+        </p:spPr>
+        <p:style>
+          <a:lnRef idx="1">
+            <a:schemeClr val="accent1"/>
+          </a:lnRef>
+          <a:fillRef idx="0">
+            <a:schemeClr val="accent1"/>
+          </a:fillRef>
+          <a:effectRef idx="0">
+            <a:schemeClr val="accent1"/>
+          </a:effectRef>
+          <a:fontRef idx="minor">
+            <a:schemeClr val="tx1"/>
+          </a:fontRef>
+        </p:style>
+      </p:cxnSp>
       <p:sp>
         <p:nvSpPr>
           <p:cNvPr id="8" name="Can 7"/>
@@ -22072,125 +21966,73 @@
           </a:p>
         </p:txBody>
       </p:sp>
-      <p:grpSp>
-        <p:nvGrpSpPr>
-          <p:cNvPr id="15" name="Group 14"/>
-          <p:cNvGrpSpPr/>
-          <p:nvPr/>
-        </p:nvGrpSpPr>
-        <p:grpSpPr>
-          <a:xfrm>
-            <a:off x="6368119" y="2847448"/>
-            <a:ext cx="2929455" cy="941944"/>
-            <a:chOff x="3858207" y="2205609"/>
-            <a:chExt cx="4595305" cy="941944"/>
-          </a:xfrm>
-        </p:grpSpPr>
-        <p:sp>
-          <p:nvSpPr>
-            <p:cNvPr id="4" name="TextBox 3"/>
-            <p:cNvSpPr txBox="1"/>
-            <p:nvPr/>
-          </p:nvSpPr>
-          <p:spPr>
-            <a:xfrm>
-              <a:off x="4931870" y="2205609"/>
-              <a:ext cx="3521642" cy="369332"/>
-            </a:xfrm>
-            <a:prstGeom prst="rect">
-              <a:avLst/>
-            </a:prstGeom>
-            <a:solidFill>
-              <a:schemeClr val="bg1"/>
-            </a:solidFill>
-            <a:effectLst/>
-          </p:spPr>
-          <p:txBody>
-            <a:bodyPr wrap="square" rtlCol="0">
-              <a:spAutoFit/>
-            </a:bodyPr>
-            <a:lstStyle/>
-            <a:p>
-              <a:r>
-                <a:rPr lang="en-US" dirty="0" smtClean="0"/>
-                <a:t>Share Business Rules</a:t>
-              </a:r>
-              <a:endParaRPr lang="en-US" dirty="0"/>
-            </a:p>
-          </p:txBody>
-        </p:sp>
-        <p:cxnSp>
-          <p:nvCxnSpPr>
-            <p:cNvPr id="23" name="Straight Arrow Connector 22"/>
-            <p:cNvCxnSpPr/>
-            <p:nvPr/>
-          </p:nvCxnSpPr>
-          <p:spPr>
-            <a:xfrm>
-              <a:off x="3858207" y="3147553"/>
-              <a:ext cx="4438123" cy="0"/>
-            </a:xfrm>
-            <a:prstGeom prst="straightConnector1">
-              <a:avLst/>
-            </a:prstGeom>
-            <a:ln w="63500">
-              <a:headEnd type="triangle"/>
-              <a:tailEnd type="none"/>
-            </a:ln>
-          </p:spPr>
-          <p:style>
-            <a:lnRef idx="1">
-              <a:schemeClr val="accent1"/>
-            </a:lnRef>
-            <a:fillRef idx="0">
-              <a:schemeClr val="accent1"/>
-            </a:fillRef>
-            <a:effectRef idx="0">
-              <a:schemeClr val="accent1"/>
-            </a:effectRef>
-            <a:fontRef idx="minor">
-              <a:schemeClr val="tx1"/>
-            </a:fontRef>
-          </p:style>
-        </p:cxnSp>
-        <p:sp>
-          <p:nvSpPr>
-            <p:cNvPr id="29" name="TextBox 28"/>
-            <p:cNvSpPr txBox="1"/>
-            <p:nvPr/>
-          </p:nvSpPr>
-          <p:spPr>
-            <a:xfrm>
-              <a:off x="4160992" y="2205609"/>
-              <a:ext cx="415618" cy="369332"/>
-            </a:xfrm>
-            <a:prstGeom prst="rect">
-              <a:avLst/>
-            </a:prstGeom>
-            <a:noFill/>
-            <a:ln w="25400">
-              <a:solidFill>
-                <a:schemeClr val="accent1">
-                  <a:shade val="50000"/>
-                </a:schemeClr>
-              </a:solidFill>
-            </a:ln>
-          </p:spPr>
-          <p:txBody>
-            <a:bodyPr wrap="square" rtlCol="0">
-              <a:spAutoFit/>
-            </a:bodyPr>
-            <a:lstStyle/>
-            <a:p>
-              <a:pPr algn="ctr"/>
-              <a:r>
-                <a:rPr lang="en-US" dirty="0"/>
-                <a:t>A</a:t>
-              </a:r>
-            </a:p>
-          </p:txBody>
-        </p:sp>
-      </p:grpSp>
+      <p:sp>
+        <p:nvSpPr>
+          <p:cNvPr id="4" name="TextBox 3"/>
+          <p:cNvSpPr txBox="1"/>
+          <p:nvPr/>
+        </p:nvSpPr>
+        <p:spPr>
+          <a:xfrm>
+            <a:off x="6811267" y="3095872"/>
+            <a:ext cx="2245007" cy="369332"/>
+          </a:xfrm>
+          <a:prstGeom prst="rect">
+            <a:avLst/>
+          </a:prstGeom>
+          <a:solidFill>
+            <a:schemeClr val="bg1"/>
+          </a:solidFill>
+          <a:effectLst/>
+        </p:spPr>
+        <p:txBody>
+          <a:bodyPr wrap="square" rtlCol="0">
+            <a:spAutoFit/>
+          </a:bodyPr>
+          <a:lstStyle/>
+          <a:p>
+            <a:r>
+              <a:rPr lang="en-US" dirty="0" smtClean="0"/>
+              <a:t>Share Business Rules</a:t>
+            </a:r>
+            <a:endParaRPr lang="en-US" dirty="0"/>
+          </a:p>
+        </p:txBody>
+      </p:sp>
+      <p:cxnSp>
+        <p:nvCxnSpPr>
+          <p:cNvPr id="23" name="Straight Arrow Connector 22"/>
+          <p:cNvCxnSpPr/>
+          <p:nvPr/>
+        </p:nvCxnSpPr>
+        <p:spPr>
+          <a:xfrm>
+            <a:off x="6368119" y="3789392"/>
+            <a:ext cx="2829253" cy="0"/>
+          </a:xfrm>
+          <a:prstGeom prst="straightConnector1">
+            <a:avLst/>
+          </a:prstGeom>
+          <a:ln w="63500">
+            <a:headEnd type="triangle"/>
+            <a:tailEnd type="none"/>
+          </a:ln>
+        </p:spPr>
+        <p:style>
+          <a:lnRef idx="1">
+            <a:schemeClr val="accent1"/>
+          </a:lnRef>
+          <a:fillRef idx="0">
+            <a:schemeClr val="accent1"/>
+          </a:fillRef>
+          <a:effectRef idx="0">
+            <a:schemeClr val="accent1"/>
+          </a:effectRef>
+          <a:fontRef idx="minor">
+            <a:schemeClr val="tx1"/>
+          </a:fontRef>
+        </p:style>
+      </p:cxnSp>
       <p:sp>
         <p:nvSpPr>
           <p:cNvPr id="8" name="Can 7"/>

</xml_diff>

<commit_message>
edits to work on the latest ig-pub and worke on the prefetch narrative
</commit_message>
<xml_diff>
--- a/meeting-notes/diagrams.pptx
+++ b/meeting-notes/diagrams.pptx
@@ -5,7 +5,7 @@
     <p:sldMasterId id="2147483648" r:id="rId1"/>
   </p:sldMasterIdLst>
   <p:notesMasterIdLst>
-    <p:notesMasterId r:id="rId43"/>
+    <p:notesMasterId r:id="rId45"/>
   </p:notesMasterIdLst>
   <p:sldIdLst>
     <p:sldId id="256" r:id="rId2"/>
@@ -49,6 +49,8 @@
     <p:sldId id="301" r:id="rId40"/>
     <p:sldId id="302" r:id="rId41"/>
     <p:sldId id="303" r:id="rId42"/>
+    <p:sldId id="304" r:id="rId43"/>
+    <p:sldId id="305" r:id="rId44"/>
   </p:sldIdLst>
   <p:sldSz cx="12192000" cy="6858000"/>
   <p:notesSz cx="6858000" cy="9144000"/>
@@ -249,7 +251,7 @@
             <a:fld id="{7BDA92F8-9482-1145-B1E4-CE31E168D77D}" type="datetimeFigureOut">
               <a:rPr lang="en-US" smtClean="0"/>
               <a:pPr/>
-              <a:t>1/10/18</a:t>
+              <a:t>3/14/18</a:t>
             </a:fld>
             <a:endParaRPr lang="en-US"/>
           </a:p>
@@ -1198,6 +1200,91 @@
 </p:notes>
 </file>
 
+<file path=ppt/notesSlides/notesSlide9.xml><?xml version="1.0" encoding="utf-8"?>
+<p:notes xmlns:a="http://schemas.openxmlformats.org/drawingml/2006/main" xmlns:r="http://schemas.openxmlformats.org/officeDocument/2006/relationships" xmlns:p="http://schemas.openxmlformats.org/presentationml/2006/main">
+  <p:cSld>
+    <p:spTree>
+      <p:nvGrpSpPr>
+        <p:cNvPr id="1" name=""/>
+        <p:cNvGrpSpPr/>
+        <p:nvPr/>
+      </p:nvGrpSpPr>
+      <p:grpSpPr>
+        <a:xfrm>
+          <a:off x="0" y="0"/>
+          <a:ext cx="0" cy="0"/>
+          <a:chOff x="0" y="0"/>
+          <a:chExt cx="0" cy="0"/>
+        </a:xfrm>
+      </p:grpSpPr>
+      <p:sp>
+        <p:nvSpPr>
+          <p:cNvPr id="2" name="Slide Image Placeholder 1"/>
+          <p:cNvSpPr>
+            <a:spLocks noGrp="1" noRot="1" noChangeAspect="1"/>
+          </p:cNvSpPr>
+          <p:nvPr>
+            <p:ph type="sldImg"/>
+          </p:nvPr>
+        </p:nvSpPr>
+        <p:spPr/>
+      </p:sp>
+      <p:sp>
+        <p:nvSpPr>
+          <p:cNvPr id="3" name="Notes Placeholder 2"/>
+          <p:cNvSpPr>
+            <a:spLocks noGrp="1"/>
+          </p:cNvSpPr>
+          <p:nvPr>
+            <p:ph type="body" idx="1"/>
+          </p:nvPr>
+        </p:nvSpPr>
+        <p:spPr/>
+        <p:txBody>
+          <a:bodyPr/>
+          <a:lstStyle/>
+          <a:p>
+            <a:endParaRPr lang="en-US"/>
+          </a:p>
+        </p:txBody>
+      </p:sp>
+      <p:sp>
+        <p:nvSpPr>
+          <p:cNvPr id="4" name="Slide Number Placeholder 3"/>
+          <p:cNvSpPr>
+            <a:spLocks noGrp="1"/>
+          </p:cNvSpPr>
+          <p:nvPr>
+            <p:ph type="sldNum" sz="quarter" idx="10"/>
+          </p:nvPr>
+        </p:nvSpPr>
+        <p:spPr/>
+        <p:txBody>
+          <a:bodyPr/>
+          <a:lstStyle/>
+          <a:p>
+            <a:fld id="{41AA1877-C0DC-7444-845F-24A0FAE907CA}" type="slidenum">
+              <a:rPr lang="en-US" smtClean="0"/>
+              <a:pPr/>
+              <a:t>43</a:t>
+            </a:fld>
+            <a:endParaRPr lang="en-US"/>
+          </a:p>
+        </p:txBody>
+      </p:sp>
+    </p:spTree>
+    <p:extLst>
+      <p:ext uri="{BB962C8B-B14F-4D97-AF65-F5344CB8AC3E}">
+        <p14:creationId xmlns:p14="http://schemas.microsoft.com/office/powerpoint/2010/main" val="722963614"/>
+      </p:ext>
+    </p:extLst>
+  </p:cSld>
+  <p:clrMapOvr>
+    <a:masterClrMapping/>
+  </p:clrMapOvr>
+</p:notes>
+</file>
+
 <file path=ppt/slideLayouts/slideLayout1.xml><?xml version="1.0" encoding="utf-8"?>
 <p:sldLayout xmlns:a="http://schemas.openxmlformats.org/drawingml/2006/main" xmlns:r="http://schemas.openxmlformats.org/officeDocument/2006/relationships" xmlns:p="http://schemas.openxmlformats.org/presentationml/2006/main" type="title" preserve="1">
   <p:cSld name="Title Slide">
@@ -1330,7 +1417,7 @@
             <a:fld id="{150AD5B7-C160-7A4E-8FA5-E71465AAF732}" type="datetimeFigureOut">
               <a:rPr lang="en-US" smtClean="0"/>
               <a:pPr/>
-              <a:t>1/10/18</a:t>
+              <a:t>3/14/18</a:t>
             </a:fld>
             <a:endParaRPr lang="en-US"/>
           </a:p>
@@ -1502,7 +1589,7 @@
             <a:fld id="{150AD5B7-C160-7A4E-8FA5-E71465AAF732}" type="datetimeFigureOut">
               <a:rPr lang="en-US" smtClean="0"/>
               <a:pPr/>
-              <a:t>1/10/18</a:t>
+              <a:t>3/14/18</a:t>
             </a:fld>
             <a:endParaRPr lang="en-US"/>
           </a:p>
@@ -1684,7 +1771,7 @@
             <a:fld id="{150AD5B7-C160-7A4E-8FA5-E71465AAF732}" type="datetimeFigureOut">
               <a:rPr lang="en-US" smtClean="0"/>
               <a:pPr/>
-              <a:t>1/10/18</a:t>
+              <a:t>3/14/18</a:t>
             </a:fld>
             <a:endParaRPr lang="en-US"/>
           </a:p>
@@ -1856,7 +1943,7 @@
             <a:fld id="{150AD5B7-C160-7A4E-8FA5-E71465AAF732}" type="datetimeFigureOut">
               <a:rPr lang="en-US" smtClean="0"/>
               <a:pPr/>
-              <a:t>1/10/18</a:t>
+              <a:t>3/14/18</a:t>
             </a:fld>
             <a:endParaRPr lang="en-US"/>
           </a:p>
@@ -2104,7 +2191,7 @@
             <a:fld id="{150AD5B7-C160-7A4E-8FA5-E71465AAF732}" type="datetimeFigureOut">
               <a:rPr lang="en-US" smtClean="0"/>
               <a:pPr/>
-              <a:t>1/10/18</a:t>
+              <a:t>3/14/18</a:t>
             </a:fld>
             <a:endParaRPr lang="en-US"/>
           </a:p>
@@ -2338,7 +2425,7 @@
             <a:fld id="{150AD5B7-C160-7A4E-8FA5-E71465AAF732}" type="datetimeFigureOut">
               <a:rPr lang="en-US" smtClean="0"/>
               <a:pPr/>
-              <a:t>1/10/18</a:t>
+              <a:t>3/14/18</a:t>
             </a:fld>
             <a:endParaRPr lang="en-US"/>
           </a:p>
@@ -2707,7 +2794,7 @@
             <a:fld id="{150AD5B7-C160-7A4E-8FA5-E71465AAF732}" type="datetimeFigureOut">
               <a:rPr lang="en-US" smtClean="0"/>
               <a:pPr/>
-              <a:t>1/10/18</a:t>
+              <a:t>3/14/18</a:t>
             </a:fld>
             <a:endParaRPr lang="en-US"/>
           </a:p>
@@ -2827,7 +2914,7 @@
             <a:fld id="{150AD5B7-C160-7A4E-8FA5-E71465AAF732}" type="datetimeFigureOut">
               <a:rPr lang="en-US" smtClean="0"/>
               <a:pPr/>
-              <a:t>1/10/18</a:t>
+              <a:t>3/14/18</a:t>
             </a:fld>
             <a:endParaRPr lang="en-US"/>
           </a:p>
@@ -2924,7 +3011,7 @@
             <a:fld id="{150AD5B7-C160-7A4E-8FA5-E71465AAF732}" type="datetimeFigureOut">
               <a:rPr lang="en-US" smtClean="0"/>
               <a:pPr/>
-              <a:t>1/10/18</a:t>
+              <a:t>3/14/18</a:t>
             </a:fld>
             <a:endParaRPr lang="en-US"/>
           </a:p>
@@ -3203,7 +3290,7 @@
             <a:fld id="{150AD5B7-C160-7A4E-8FA5-E71465AAF732}" type="datetimeFigureOut">
               <a:rPr lang="en-US" smtClean="0"/>
               <a:pPr/>
-              <a:t>1/10/18</a:t>
+              <a:t>3/14/18</a:t>
             </a:fld>
             <a:endParaRPr lang="en-US"/>
           </a:p>
@@ -3458,7 +3545,7 @@
             <a:fld id="{150AD5B7-C160-7A4E-8FA5-E71465AAF732}" type="datetimeFigureOut">
               <a:rPr lang="en-US" smtClean="0"/>
               <a:pPr/>
-              <a:t>1/10/18</a:t>
+              <a:t>3/14/18</a:t>
             </a:fld>
             <a:endParaRPr lang="en-US"/>
           </a:p>
@@ -3673,7 +3760,7 @@
             <a:fld id="{150AD5B7-C160-7A4E-8FA5-E71465AAF732}" type="datetimeFigureOut">
               <a:rPr lang="en-US" smtClean="0"/>
               <a:pPr/>
-              <a:t>1/10/18</a:t>
+              <a:t>3/14/18</a:t>
             </a:fld>
             <a:endParaRPr lang="en-US"/>
           </a:p>
@@ -7085,15 +7172,7 @@
             </a:r>
             <a:r>
               <a:rPr lang="en-US" dirty="0" smtClean="0"/>
-              <a:t> Slots</a:t>
-            </a:r>
-            <a:r>
-              <a:rPr lang="en-US" dirty="0" smtClean="0"/>
-              <a:t>* updated </a:t>
-            </a:r>
-            <a:r>
-              <a:rPr lang="en-US" dirty="0" smtClean="0"/>
-              <a:t>since last fetch</a:t>
+              <a:t> Slots* updated since last fetch</a:t>
             </a:r>
             <a:endParaRPr lang="en-US" dirty="0"/>
           </a:p>
@@ -7223,7 +7302,6 @@
               <a:rPr lang="en-US" dirty="0"/>
               <a:t>search parameters</a:t>
             </a:r>
-            <a:endParaRPr lang="en-US" dirty="0"/>
           </a:p>
         </p:txBody>
       </p:sp>
@@ -9991,11 +10069,7 @@
           <a:p>
             <a:r>
               <a:rPr lang="en-US" dirty="0" smtClean="0"/>
-              <a:t>(optional) </a:t>
-            </a:r>
-            <a:r>
-              <a:rPr lang="en-US" dirty="0" smtClean="0"/>
-              <a:t>Patient supplies </a:t>
+              <a:t>(optional) Patient supplies </a:t>
             </a:r>
             <a:r>
               <a:rPr lang="en-US" smtClean="0"/>
@@ -10371,11 +10445,7 @@
           <a:p>
             <a:r>
               <a:rPr lang="en-US" dirty="0" smtClean="0"/>
-              <a:t>(optional) </a:t>
-            </a:r>
-            <a:r>
-              <a:rPr lang="en-US" dirty="0" smtClean="0"/>
-              <a:t>Patient supplies demographic</a:t>
+              <a:t>(optional) Patient supplies demographic</a:t>
             </a:r>
           </a:p>
           <a:p>
@@ -10753,11 +10823,7 @@
             </a:r>
             <a:r>
               <a:rPr lang="en-US" dirty="0" smtClean="0"/>
-              <a:t>supplies updated coverage </a:t>
-            </a:r>
-            <a:r>
-              <a:rPr lang="en-US" dirty="0" smtClean="0"/>
-              <a:t>information</a:t>
+              <a:t>supplies updated coverage information</a:t>
             </a:r>
             <a:endParaRPr lang="en-US" dirty="0"/>
           </a:p>
@@ -11125,15 +11191,7 @@
           <a:p>
             <a:r>
               <a:rPr lang="en-US" dirty="0" smtClean="0"/>
-              <a:t>(optional) </a:t>
-            </a:r>
-            <a:r>
-              <a:rPr lang="en-US" dirty="0" smtClean="0"/>
-              <a:t>patient </a:t>
-            </a:r>
-            <a:r>
-              <a:rPr lang="en-US" dirty="0" smtClean="0"/>
-              <a:t>provides information (</a:t>
+              <a:t>(optional) patient provides information (</a:t>
             </a:r>
             <a:r>
               <a:rPr lang="en-US" dirty="0" err="1" smtClean="0"/>
@@ -11497,11 +11555,7 @@
           <a:p>
             <a:r>
               <a:rPr lang="en-US" dirty="0" smtClean="0"/>
-              <a:t>(optional) Patient selects </a:t>
-            </a:r>
-            <a:r>
-              <a:rPr lang="en-US" dirty="0" smtClean="0"/>
-              <a:t>from available appointments</a:t>
+              <a:t>(optional) Patient selects from available appointments</a:t>
             </a:r>
             <a:endParaRPr lang="en-US" dirty="0"/>
           </a:p>
@@ -11884,15 +11938,7 @@
           <a:p>
             <a:r>
               <a:rPr lang="en-US" dirty="0" smtClean="0"/>
-              <a:t>Patient </a:t>
-            </a:r>
-            <a:r>
-              <a:rPr lang="en-US" dirty="0" smtClean="0"/>
-              <a:t>cancels </a:t>
-            </a:r>
-            <a:r>
-              <a:rPr lang="en-US" dirty="0" smtClean="0"/>
-              <a:t>booked appointment</a:t>
+              <a:t>Patient cancels booked appointment</a:t>
             </a:r>
             <a:endParaRPr lang="en-US" dirty="0"/>
           </a:p>
@@ -12091,11 +12137,7 @@
           <a:p>
             <a:r>
               <a:rPr lang="en-US" dirty="0" smtClean="0"/>
-              <a:t>Cancel </a:t>
-            </a:r>
-            <a:r>
-              <a:rPr lang="en-US" dirty="0" smtClean="0"/>
-              <a:t>hold</a:t>
+              <a:t>Cancel hold</a:t>
             </a:r>
             <a:endParaRPr lang="en-US" dirty="0"/>
           </a:p>
@@ -12196,11 +12238,7 @@
           <a:p>
             <a:r>
               <a:rPr lang="en-US" smtClean="0"/>
-              <a:t>C</a:t>
-            </a:r>
-            <a:r>
-              <a:rPr lang="en-US" smtClean="0"/>
-              <a:t>onfirm/reject hold</a:t>
+              <a:t>Confirm/reject hold</a:t>
             </a:r>
             <a:endParaRPr lang="en-US" dirty="0"/>
           </a:p>
@@ -16609,19 +16647,11 @@
             </a:r>
             <a:r>
               <a:rPr lang="en-US" dirty="0" smtClean="0"/>
-              <a:t>2: </a:t>
-            </a:r>
-            <a:r>
-              <a:rPr lang="en-US" dirty="0" smtClean="0"/>
-              <a:t>Provider Scheduling </a:t>
+              <a:t>2: Provider Scheduling </a:t>
             </a:r>
             <a:r>
               <a:rPr lang="en-US"/>
-              <a:t>for </a:t>
-            </a:r>
-            <a:r>
-              <a:rPr lang="en-US"/>
-              <a:t>E</a:t>
+              <a:t>for E</a:t>
             </a:r>
             <a:r>
               <a:rPr lang="en-US" smtClean="0"/>
@@ -17015,11 +17045,7 @@
             </a:pPr>
             <a:r>
               <a:rPr lang="en-US" dirty="0" smtClean="0"/>
-              <a:t>New patient registration/ </a:t>
-            </a:r>
-            <a:r>
-              <a:rPr lang="en-US" dirty="0" smtClean="0"/>
-              <a:t>coverage (option A)</a:t>
+              <a:t>New patient registration/ coverage (option A)</a:t>
             </a:r>
             <a:endParaRPr lang="en-US" dirty="0"/>
           </a:p>
@@ -17066,11 +17092,7 @@
             </a:pPr>
             <a:r>
               <a:rPr lang="en-US" dirty="0" smtClean="0"/>
-              <a:t>New patient </a:t>
-            </a:r>
-            <a:r>
-              <a:rPr lang="en-US" dirty="0" smtClean="0"/>
-              <a:t>registration/ coverage (option B)</a:t>
+              <a:t>New patient registration/ coverage (option B)</a:t>
             </a:r>
             <a:endParaRPr lang="en-US" dirty="0"/>
           </a:p>
@@ -17256,31 +17278,15 @@
           <a:p>
             <a:r>
               <a:rPr lang="en-US" dirty="0"/>
-              <a:t>Scenario </a:t>
-            </a:r>
-            <a:r>
-              <a:rPr lang="en-US" dirty="0"/>
-              <a:t>1</a:t>
+              <a:t>Scenario 1</a:t>
             </a:r>
             <a:r>
               <a:rPr lang="en-US" dirty="0" smtClean="0"/>
-              <a:t>: </a:t>
-            </a:r>
-            <a:r>
-              <a:rPr lang="en-US" dirty="0" smtClean="0"/>
-              <a:t>Provider </a:t>
+              <a:t>: Provider </a:t>
             </a:r>
             <a:r>
               <a:rPr lang="en-US" smtClean="0"/>
-              <a:t>scheduling </a:t>
-            </a:r>
-            <a:r>
-              <a:rPr lang="en-US" smtClean="0"/>
-              <a:t>G</a:t>
-            </a:r>
-            <a:r>
-              <a:rPr lang="en-US" smtClean="0"/>
-              <a:t>eneral </a:t>
+              <a:t>scheduling General </a:t>
             </a:r>
             <a:r>
               <a:rPr lang="en-US" dirty="0"/>
@@ -17628,7 +17634,7 @@
         </p:nvSpPr>
         <p:spPr>
           <a:xfrm>
-            <a:off x="9434036" y="2865833"/>
+            <a:off x="2850783" y="2698209"/>
             <a:ext cx="1965170" cy="1163412"/>
           </a:xfrm>
           <a:prstGeom prst="roundRect">
@@ -17660,12 +17666,8 @@
               <a:buAutoNum type="arabicPeriod" startAt="4"/>
             </a:pPr>
             <a:r>
-              <a:rPr lang="en-US" dirty="0"/>
-              <a:t>Patient </a:t>
-            </a:r>
-            <a:r>
               <a:rPr lang="en-US" dirty="0" smtClean="0"/>
-              <a:t>registration/ coverage (option A)</a:t>
+              <a:t>Notified of Schedule changes</a:t>
             </a:r>
             <a:endParaRPr lang="en-US" dirty="0"/>
           </a:p>
@@ -17679,7 +17681,7 @@
         </p:nvSpPr>
         <p:spPr>
           <a:xfrm>
-            <a:off x="9434036" y="953091"/>
+            <a:off x="6142410" y="2698209"/>
             <a:ext cx="1965170" cy="1163412"/>
           </a:xfrm>
           <a:prstGeom prst="roundRect">
@@ -17711,8 +17713,8 @@
               <a:buAutoNum type="arabicPeriod" startAt="3"/>
             </a:pPr>
             <a:r>
-              <a:rPr lang="en-US" dirty="0" smtClean="0"/>
-              <a:t>Periodically Poll for updated slots</a:t>
+              <a:rPr lang="en-US" dirty="0"/>
+              <a:t>Initial Load of open slots</a:t>
             </a:r>
             <a:endParaRPr lang="en-US" dirty="0"/>
           </a:p>
@@ -17759,7 +17761,15 @@
             </a:pPr>
             <a:r>
               <a:rPr lang="en-US" dirty="0" smtClean="0"/>
-              <a:t>Initial Load</a:t>
+              <a:t>Subscribe </a:t>
+            </a:r>
+            <a:r>
+              <a:rPr lang="en-US" dirty="0"/>
+              <a:t>for notification of </a:t>
+            </a:r>
+            <a:r>
+              <a:rPr lang="en-US" dirty="0" smtClean="0"/>
+              <a:t>schedule changes</a:t>
             </a:r>
             <a:endParaRPr lang="en-US" dirty="0"/>
           </a:p>
@@ -17773,7 +17783,7 @@
         </p:nvSpPr>
         <p:spPr>
           <a:xfrm>
-            <a:off x="6142409" y="2865833"/>
+            <a:off x="2850783" y="4551507"/>
             <a:ext cx="1965170" cy="1163412"/>
           </a:xfrm>
           <a:prstGeom prst="roundRect">
@@ -17805,9 +17815,10 @@
               <a:buAutoNum type="arabicPeriod" startAt="5"/>
             </a:pPr>
             <a:r>
-              <a:rPr lang="en-US" dirty="0"/>
-              <a:t>Search for open appointments</a:t>
-            </a:r>
+              <a:rPr lang="en-US" dirty="0" smtClean="0"/>
+              <a:t>‘Smart’ Poll for updated slot data </a:t>
+            </a:r>
+            <a:endParaRPr lang="en-US" dirty="0"/>
           </a:p>
         </p:txBody>
       </p:sp>
@@ -17815,15 +17826,14 @@
         <p:nvCxnSpPr>
           <p:cNvPr id="12" name="Straight Arrow Connector 11"/>
           <p:cNvCxnSpPr>
-            <a:stCxn id="8" idx="0"/>
-            <a:endCxn id="9" idx="2"/>
+            <a:stCxn id="8" idx="3"/>
           </p:cNvCxnSpPr>
           <p:nvPr/>
         </p:nvCxnSpPr>
         <p:spPr>
           <a:xfrm flipV="1">
-            <a:off x="10416621" y="2116503"/>
-            <a:ext cx="0" cy="749330"/>
+            <a:off x="4815953" y="3279914"/>
+            <a:ext cx="1262843" cy="1"/>
           </a:xfrm>
           <a:prstGeom prst="straightConnector1">
             <a:avLst/>
@@ -17855,15 +17865,15 @@
         <p:nvCxnSpPr>
           <p:cNvPr id="13" name="Straight Arrow Connector 12"/>
           <p:cNvCxnSpPr>
-            <a:stCxn id="10" idx="3"/>
-            <a:endCxn id="9" idx="1"/>
+            <a:stCxn id="10" idx="2"/>
+            <a:endCxn id="9" idx="0"/>
           </p:cNvCxnSpPr>
           <p:nvPr/>
         </p:nvCxnSpPr>
         <p:spPr>
           <a:xfrm>
-            <a:off x="8107580" y="1534797"/>
-            <a:ext cx="1326456" cy="0"/>
+            <a:off x="7124995" y="2116503"/>
+            <a:ext cx="0" cy="581706"/>
           </a:xfrm>
           <a:prstGeom prst="straightConnector1">
             <a:avLst/>
@@ -17894,15 +17904,15 @@
         <p:nvCxnSpPr>
           <p:cNvPr id="18" name="Straight Arrow Connector 17"/>
           <p:cNvCxnSpPr>
-            <a:stCxn id="8" idx="1"/>
-            <a:endCxn id="11" idx="3"/>
+            <a:stCxn id="8" idx="2"/>
+            <a:endCxn id="11" idx="0"/>
           </p:cNvCxnSpPr>
           <p:nvPr/>
         </p:nvCxnSpPr>
         <p:spPr>
-          <a:xfrm flipH="1">
-            <a:off x="8107579" y="3447539"/>
-            <a:ext cx="1326457" cy="0"/>
+          <a:xfrm>
+            <a:off x="3833368" y="3861621"/>
+            <a:ext cx="0" cy="689886"/>
           </a:xfrm>
           <a:prstGeom prst="straightConnector1">
             <a:avLst/>
@@ -17971,15 +17981,14 @@
         <p:nvCxnSpPr>
           <p:cNvPr id="26" name="Straight Arrow Connector 25"/>
           <p:cNvCxnSpPr>
-            <a:stCxn id="11" idx="1"/>
-            <a:endCxn id="31" idx="3"/>
+            <a:stCxn id="11" idx="2"/>
           </p:cNvCxnSpPr>
           <p:nvPr/>
         </p:nvCxnSpPr>
         <p:spPr>
-          <a:xfrm flipH="1">
-            <a:off x="4815953" y="3447539"/>
-            <a:ext cx="1326456" cy="0"/>
+          <a:xfrm>
+            <a:off x="3833368" y="5714919"/>
+            <a:ext cx="0" cy="854489"/>
           </a:xfrm>
           <a:prstGeom prst="straightConnector1">
             <a:avLst/>
@@ -18048,350 +18057,6 @@
           </a:p>
         </p:txBody>
       </p:sp>
-      <p:sp>
-        <p:nvSpPr>
-          <p:cNvPr id="31" name="Rounded Rectangle 30"/>
-          <p:cNvSpPr/>
-          <p:nvPr/>
-        </p:nvSpPr>
-        <p:spPr>
-          <a:xfrm>
-            <a:off x="2850783" y="2865833"/>
-            <a:ext cx="1965170" cy="1163412"/>
-          </a:xfrm>
-          <a:prstGeom prst="roundRect">
-            <a:avLst/>
-          </a:prstGeom>
-        </p:spPr>
-        <p:style>
-          <a:lnRef idx="2">
-            <a:schemeClr val="accent1">
-              <a:shade val="50000"/>
-            </a:schemeClr>
-          </a:lnRef>
-          <a:fillRef idx="1">
-            <a:schemeClr val="accent1"/>
-          </a:fillRef>
-          <a:effectRef idx="0">
-            <a:schemeClr val="accent1"/>
-          </a:effectRef>
-          <a:fontRef idx="minor">
-            <a:schemeClr val="lt1"/>
-          </a:fontRef>
-        </p:style>
-        <p:txBody>
-          <a:bodyPr rtlCol="0" anchor="ctr"/>
-          <a:lstStyle/>
-          <a:p>
-            <a:pPr marL="342900" indent="-342900">
-              <a:buFont typeface="+mj-lt"/>
-              <a:buAutoNum type="arabicPeriod" startAt="6"/>
-            </a:pPr>
-            <a:r>
-              <a:rPr lang="en-US" dirty="0" smtClean="0"/>
-              <a:t>Hold </a:t>
-            </a:r>
-            <a:r>
-              <a:rPr lang="en-US" dirty="0"/>
-              <a:t>appointment (optional)</a:t>
-            </a:r>
-          </a:p>
-        </p:txBody>
-      </p:sp>
-      <p:cxnSp>
-        <p:nvCxnSpPr>
-          <p:cNvPr id="32" name="Straight Arrow Connector 31"/>
-          <p:cNvCxnSpPr>
-            <a:stCxn id="31" idx="2"/>
-            <a:endCxn id="16" idx="0"/>
-          </p:cNvCxnSpPr>
-          <p:nvPr/>
-        </p:nvCxnSpPr>
-        <p:spPr>
-          <a:xfrm>
-            <a:off x="3833368" y="4029245"/>
-            <a:ext cx="0" cy="749329"/>
-          </a:xfrm>
-          <a:prstGeom prst="straightConnector1">
-            <a:avLst/>
-          </a:prstGeom>
-          <a:ln w="38100">
-            <a:solidFill>
-              <a:schemeClr val="tx1"/>
-            </a:solidFill>
-            <a:tailEnd type="triangle"/>
-          </a:ln>
-        </p:spPr>
-        <p:style>
-          <a:lnRef idx="1">
-            <a:schemeClr val="accent1"/>
-          </a:lnRef>
-          <a:fillRef idx="0">
-            <a:schemeClr val="accent1"/>
-          </a:fillRef>
-          <a:effectRef idx="0">
-            <a:schemeClr val="accent1"/>
-          </a:effectRef>
-          <a:fontRef idx="minor">
-            <a:schemeClr val="tx1"/>
-          </a:fontRef>
-        </p:style>
-      </p:cxnSp>
-      <p:sp>
-        <p:nvSpPr>
-          <p:cNvPr id="16" name="Rounded Rectangle 15"/>
-          <p:cNvSpPr/>
-          <p:nvPr/>
-        </p:nvSpPr>
-        <p:spPr>
-          <a:xfrm>
-            <a:off x="2850783" y="4778574"/>
-            <a:ext cx="1965170" cy="1163412"/>
-          </a:xfrm>
-          <a:prstGeom prst="roundRect">
-            <a:avLst/>
-          </a:prstGeom>
-        </p:spPr>
-        <p:style>
-          <a:lnRef idx="2">
-            <a:schemeClr val="accent1">
-              <a:shade val="50000"/>
-            </a:schemeClr>
-          </a:lnRef>
-          <a:fillRef idx="1">
-            <a:schemeClr val="accent1"/>
-          </a:fillRef>
-          <a:effectRef idx="0">
-            <a:schemeClr val="accent1"/>
-          </a:effectRef>
-          <a:fontRef idx="minor">
-            <a:schemeClr val="lt1"/>
-          </a:fontRef>
-        </p:style>
-        <p:txBody>
-          <a:bodyPr rtlCol="0" anchor="ctr"/>
-          <a:lstStyle/>
-          <a:p>
-            <a:pPr marL="342900" indent="-342900">
-              <a:buFont typeface="+mj-lt"/>
-              <a:buAutoNum type="arabicPeriod" startAt="7"/>
-            </a:pPr>
-            <a:r>
-              <a:rPr lang="en-US" dirty="0" smtClean="0"/>
-              <a:t>Patient registration/ coverage (option B)</a:t>
-            </a:r>
-            <a:endParaRPr lang="en-US" dirty="0"/>
-          </a:p>
-        </p:txBody>
-      </p:sp>
-      <p:cxnSp>
-        <p:nvCxnSpPr>
-          <p:cNvPr id="17" name="Straight Arrow Connector 16"/>
-          <p:cNvCxnSpPr>
-            <a:stCxn id="17" idx="3"/>
-          </p:cNvCxnSpPr>
-          <p:nvPr/>
-        </p:nvCxnSpPr>
-        <p:spPr>
-          <a:xfrm>
-            <a:off x="4815953" y="5360280"/>
-            <a:ext cx="1326457" cy="0"/>
-          </a:xfrm>
-          <a:prstGeom prst="straightConnector1">
-            <a:avLst/>
-          </a:prstGeom>
-          <a:ln w="38100">
-            <a:solidFill>
-              <a:schemeClr val="tx1"/>
-            </a:solidFill>
-            <a:tailEnd type="triangle"/>
-          </a:ln>
-        </p:spPr>
-        <p:style>
-          <a:lnRef idx="1">
-            <a:schemeClr val="accent1"/>
-          </a:lnRef>
-          <a:fillRef idx="0">
-            <a:schemeClr val="accent1"/>
-          </a:fillRef>
-          <a:effectRef idx="0">
-            <a:schemeClr val="accent1"/>
-          </a:effectRef>
-          <a:fontRef idx="minor">
-            <a:schemeClr val="tx1"/>
-          </a:fontRef>
-        </p:style>
-      </p:cxnSp>
-      <p:sp>
-        <p:nvSpPr>
-          <p:cNvPr id="20" name="Rounded Rectangle 19"/>
-          <p:cNvSpPr/>
-          <p:nvPr/>
-        </p:nvSpPr>
-        <p:spPr>
-          <a:xfrm>
-            <a:off x="9434036" y="4778574"/>
-            <a:ext cx="1965170" cy="1163412"/>
-          </a:xfrm>
-          <a:prstGeom prst="roundRect">
-            <a:avLst/>
-          </a:prstGeom>
-        </p:spPr>
-        <p:style>
-          <a:lnRef idx="2">
-            <a:schemeClr val="accent1">
-              <a:shade val="50000"/>
-            </a:schemeClr>
-          </a:lnRef>
-          <a:fillRef idx="1">
-            <a:schemeClr val="accent1"/>
-          </a:fillRef>
-          <a:effectRef idx="0">
-            <a:schemeClr val="accent1"/>
-          </a:effectRef>
-          <a:fontRef idx="minor">
-            <a:schemeClr val="lt1"/>
-          </a:fontRef>
-        </p:style>
-        <p:txBody>
-          <a:bodyPr rtlCol="0" anchor="ctr"/>
-          <a:lstStyle/>
-          <a:p>
-            <a:pPr marL="342900" indent="-342900">
-              <a:buFont typeface="+mj-lt"/>
-              <a:buAutoNum type="arabicPeriod" startAt="9"/>
-            </a:pPr>
-            <a:r>
-              <a:rPr lang="en-US" dirty="0"/>
-              <a:t>Patient coverage (option C)</a:t>
-            </a:r>
-          </a:p>
-        </p:txBody>
-      </p:sp>
-      <p:sp>
-        <p:nvSpPr>
-          <p:cNvPr id="21" name="Rounded Rectangle 20"/>
-          <p:cNvSpPr/>
-          <p:nvPr/>
-        </p:nvSpPr>
-        <p:spPr>
-          <a:xfrm>
-            <a:off x="6165068" y="4778574"/>
-            <a:ext cx="1965170" cy="1163412"/>
-          </a:xfrm>
-          <a:prstGeom prst="roundRect">
-            <a:avLst/>
-          </a:prstGeom>
-        </p:spPr>
-        <p:style>
-          <a:lnRef idx="2">
-            <a:schemeClr val="accent1">
-              <a:shade val="50000"/>
-            </a:schemeClr>
-          </a:lnRef>
-          <a:fillRef idx="1">
-            <a:schemeClr val="accent1"/>
-          </a:fillRef>
-          <a:effectRef idx="0">
-            <a:schemeClr val="accent1"/>
-          </a:effectRef>
-          <a:fontRef idx="minor">
-            <a:schemeClr val="lt1"/>
-          </a:fontRef>
-        </p:style>
-        <p:txBody>
-          <a:bodyPr rtlCol="0" anchor="ctr"/>
-          <a:lstStyle/>
-          <a:p>
-            <a:pPr marL="342900" indent="-342900">
-              <a:buFont typeface="+mj-lt"/>
-              <a:buAutoNum type="arabicPeriod" startAt="8"/>
-            </a:pPr>
-            <a:r>
-              <a:rPr lang="en-US" dirty="0"/>
-              <a:t>Book appointment</a:t>
-            </a:r>
-          </a:p>
-        </p:txBody>
-      </p:sp>
-      <p:cxnSp>
-        <p:nvCxnSpPr>
-          <p:cNvPr id="23" name="Straight Arrow Connector 22"/>
-          <p:cNvCxnSpPr>
-            <a:stCxn id="23" idx="0"/>
-            <a:endCxn id="24" idx="2"/>
-          </p:cNvCxnSpPr>
-          <p:nvPr/>
-        </p:nvCxnSpPr>
-        <p:spPr>
-          <a:xfrm flipV="1">
-            <a:off x="10416621" y="5941986"/>
-            <a:ext cx="0" cy="749330"/>
-          </a:xfrm>
-          <a:prstGeom prst="straightConnector1">
-            <a:avLst/>
-          </a:prstGeom>
-          <a:ln w="38100">
-            <a:solidFill>
-              <a:schemeClr val="tx1"/>
-            </a:solidFill>
-            <a:headEnd type="triangle"/>
-            <a:tailEnd type="none"/>
-          </a:ln>
-        </p:spPr>
-        <p:style>
-          <a:lnRef idx="1">
-            <a:schemeClr val="accent1"/>
-          </a:lnRef>
-          <a:fillRef idx="0">
-            <a:schemeClr val="accent1"/>
-          </a:fillRef>
-          <a:effectRef idx="0">
-            <a:schemeClr val="accent1"/>
-          </a:effectRef>
-          <a:fontRef idx="minor">
-            <a:schemeClr val="tx1"/>
-          </a:fontRef>
-        </p:style>
-      </p:cxnSp>
-      <p:cxnSp>
-        <p:nvCxnSpPr>
-          <p:cNvPr id="24" name="Straight Arrow Connector 23"/>
-          <p:cNvCxnSpPr>
-            <a:endCxn id="24" idx="1"/>
-          </p:cNvCxnSpPr>
-          <p:nvPr/>
-        </p:nvCxnSpPr>
-        <p:spPr>
-          <a:xfrm>
-            <a:off x="8107580" y="5360280"/>
-            <a:ext cx="1326456" cy="0"/>
-          </a:xfrm>
-          <a:prstGeom prst="straightConnector1">
-            <a:avLst/>
-          </a:prstGeom>
-          <a:ln w="38100">
-            <a:solidFill>
-              <a:schemeClr val="tx1"/>
-            </a:solidFill>
-            <a:tailEnd type="triangle"/>
-          </a:ln>
-        </p:spPr>
-        <p:style>
-          <a:lnRef idx="1">
-            <a:schemeClr val="accent1"/>
-          </a:lnRef>
-          <a:fillRef idx="0">
-            <a:schemeClr val="accent1"/>
-          </a:fillRef>
-          <a:effectRef idx="0">
-            <a:schemeClr val="accent1"/>
-          </a:effectRef>
-          <a:fontRef idx="minor">
-            <a:schemeClr val="tx1"/>
-          </a:fontRef>
-        </p:style>
-      </p:cxnSp>
     </p:spTree>
     <p:extLst>
       <p:ext uri="{BB962C8B-B14F-4D97-AF65-F5344CB8AC3E}">
@@ -18608,11 +18273,7 @@
             <a:p>
               <a:r>
                 <a:rPr lang="en-US" dirty="0" smtClean="0"/>
-                <a:t>Cancel</a:t>
-              </a:r>
-              <a:r>
-                <a:rPr lang="en-US" dirty="0" smtClean="0"/>
-                <a:t> Hold</a:t>
+                <a:t>Cancel Hold</a:t>
               </a:r>
               <a:endParaRPr lang="en-US" dirty="0"/>
             </a:p>
@@ -19754,7 +19415,6 @@
               <a:rPr lang="en-US" dirty="0"/>
               <a:t>Appointment availability search</a:t>
             </a:r>
-            <a:endParaRPr lang="en-US" dirty="0"/>
           </a:p>
         </p:txBody>
       </p:sp>
@@ -19859,39 +19519,19 @@
           <a:p>
             <a:r>
               <a:rPr lang="en-US" dirty="0"/>
-              <a:t>Scenario </a:t>
+              <a:t>Scenario 3</a:t>
+            </a:r>
+            <a:r>
+              <a:rPr lang="en-US" dirty="0" smtClean="0"/>
+              <a:t>: Provider Scheduling </a:t>
             </a:r>
             <a:r>
               <a:rPr lang="en-US" dirty="0"/>
-              <a:t>3</a:t>
+              <a:t>for E</a:t>
             </a:r>
             <a:r>
               <a:rPr lang="en-US" dirty="0" smtClean="0"/>
-              <a:t>: </a:t>
-            </a:r>
-            <a:r>
-              <a:rPr lang="en-US" dirty="0" smtClean="0"/>
-              <a:t>Provider Scheduling </a:t>
-            </a:r>
-            <a:r>
-              <a:rPr lang="en-US" dirty="0"/>
-              <a:t>for </a:t>
-            </a:r>
-            <a:r>
-              <a:rPr lang="en-US" dirty="0"/>
-              <a:t>E</a:t>
-            </a:r>
-            <a:r>
-              <a:rPr lang="en-US" dirty="0" smtClean="0"/>
-              <a:t>xisting </a:t>
-            </a:r>
-            <a:r>
-              <a:rPr lang="en-US" dirty="0" smtClean="0"/>
-              <a:t>P</a:t>
-            </a:r>
-            <a:r>
-              <a:rPr lang="en-US" dirty="0" smtClean="0"/>
-              <a:t>atient </a:t>
+              <a:t>xisting Patient </a:t>
             </a:r>
             <a:r>
               <a:rPr lang="en-US" i="1" dirty="0" smtClean="0"/>
@@ -19987,7 +19627,6 @@
               <a:rPr lang="en-US" dirty="0"/>
               <a:t>Book appointment</a:t>
             </a:r>
-            <a:endParaRPr lang="en-US" dirty="0"/>
           </a:p>
         </p:txBody>
       </p:sp>
@@ -20306,7 +19945,7 @@
           <a:lstStyle/>
           <a:p>
             <a:r>
-              <a:rPr lang="en-US" smtClean="0"/>
+              <a:rPr lang="en-US" dirty="0" smtClean="0"/>
               <a:t>Confirm/reject booking</a:t>
             </a:r>
             <a:endParaRPr lang="en-US" dirty="0"/>
@@ -20380,6 +20019,958 @@
     <p:extLst>
       <p:ext uri="{BB962C8B-B14F-4D97-AF65-F5344CB8AC3E}">
         <p14:creationId xmlns:p14="http://schemas.microsoft.com/office/powerpoint/2010/main" val="1172123660"/>
+      </p:ext>
+    </p:extLst>
+  </p:cSld>
+  <p:clrMapOvr>
+    <a:masterClrMapping/>
+  </p:clrMapOvr>
+  <p:timing>
+    <p:tnLst>
+      <p:par>
+        <p:cTn id="1" dur="indefinite" restart="never" nodeType="tmRoot"/>
+      </p:par>
+    </p:tnLst>
+  </p:timing>
+</p:sld>
+</file>
+
+<file path=ppt/slides/slide42.xml><?xml version="1.0" encoding="utf-8"?>
+<p:sld xmlns:a="http://schemas.openxmlformats.org/drawingml/2006/main" xmlns:r="http://schemas.openxmlformats.org/officeDocument/2006/relationships" xmlns:p="http://schemas.openxmlformats.org/presentationml/2006/main">
+  <p:cSld>
+    <p:spTree>
+      <p:nvGrpSpPr>
+        <p:cNvPr id="1" name=""/>
+        <p:cNvGrpSpPr/>
+        <p:nvPr/>
+      </p:nvGrpSpPr>
+      <p:grpSpPr>
+        <a:xfrm>
+          <a:off x="0" y="0"/>
+          <a:ext cx="0" cy="0"/>
+          <a:chOff x="0" y="0"/>
+          <a:chExt cx="0" cy="0"/>
+        </a:xfrm>
+      </p:grpSpPr>
+      <p:sp>
+        <p:nvSpPr>
+          <p:cNvPr id="3" name="Rounded Rectangle 2"/>
+          <p:cNvSpPr/>
+          <p:nvPr/>
+        </p:nvSpPr>
+        <p:spPr>
+          <a:xfrm>
+            <a:off x="2850783" y="1829391"/>
+            <a:ext cx="1965170" cy="1163412"/>
+          </a:xfrm>
+          <a:prstGeom prst="roundRect">
+            <a:avLst/>
+          </a:prstGeom>
+        </p:spPr>
+        <p:style>
+          <a:lnRef idx="2">
+            <a:schemeClr val="accent1">
+              <a:shade val="50000"/>
+            </a:schemeClr>
+          </a:lnRef>
+          <a:fillRef idx="1">
+            <a:schemeClr val="accent1"/>
+          </a:fillRef>
+          <a:effectRef idx="0">
+            <a:schemeClr val="accent1"/>
+          </a:effectRef>
+          <a:fontRef idx="minor">
+            <a:schemeClr val="lt1"/>
+          </a:fontRef>
+        </p:style>
+        <p:txBody>
+          <a:bodyPr rtlCol="0" anchor="ctr"/>
+          <a:lstStyle/>
+          <a:p>
+            <a:pPr marL="342900" indent="-342900">
+              <a:buFont typeface="+mj-lt"/>
+              <a:buAutoNum type="arabicPeriod" startAt="6"/>
+            </a:pPr>
+            <a:r>
+              <a:rPr lang="en-US" dirty="0" smtClean="0"/>
+              <a:t>Patient registration/ coverage (option A)</a:t>
+            </a:r>
+            <a:endParaRPr lang="en-US" dirty="0"/>
+          </a:p>
+        </p:txBody>
+      </p:sp>
+      <p:cxnSp>
+        <p:nvCxnSpPr>
+          <p:cNvPr id="7" name="Straight Arrow Connector 6"/>
+          <p:cNvCxnSpPr>
+            <a:stCxn id="3" idx="3"/>
+            <a:endCxn id="10" idx="1"/>
+          </p:cNvCxnSpPr>
+          <p:nvPr/>
+        </p:nvCxnSpPr>
+        <p:spPr>
+          <a:xfrm>
+            <a:off x="4815953" y="2411097"/>
+            <a:ext cx="1326457" cy="0"/>
+          </a:xfrm>
+          <a:prstGeom prst="straightConnector1">
+            <a:avLst/>
+          </a:prstGeom>
+          <a:ln w="38100">
+            <a:solidFill>
+              <a:schemeClr val="tx1"/>
+            </a:solidFill>
+            <a:tailEnd type="triangle"/>
+          </a:ln>
+        </p:spPr>
+        <p:style>
+          <a:lnRef idx="1">
+            <a:schemeClr val="accent1"/>
+          </a:lnRef>
+          <a:fillRef idx="0">
+            <a:schemeClr val="accent1"/>
+          </a:fillRef>
+          <a:effectRef idx="0">
+            <a:schemeClr val="accent1"/>
+          </a:effectRef>
+          <a:fontRef idx="minor">
+            <a:schemeClr val="tx1"/>
+          </a:fontRef>
+        </p:style>
+      </p:cxnSp>
+      <p:sp>
+        <p:nvSpPr>
+          <p:cNvPr id="8" name="Rounded Rectangle 7"/>
+          <p:cNvSpPr/>
+          <p:nvPr/>
+        </p:nvSpPr>
+        <p:spPr>
+          <a:xfrm>
+            <a:off x="9434036" y="3742133"/>
+            <a:ext cx="1965170" cy="1163412"/>
+          </a:xfrm>
+          <a:prstGeom prst="roundRect">
+            <a:avLst/>
+          </a:prstGeom>
+        </p:spPr>
+        <p:style>
+          <a:lnRef idx="2">
+            <a:schemeClr val="accent1">
+              <a:shade val="50000"/>
+            </a:schemeClr>
+          </a:lnRef>
+          <a:fillRef idx="1">
+            <a:schemeClr val="accent1"/>
+          </a:fillRef>
+          <a:effectRef idx="0">
+            <a:schemeClr val="accent1"/>
+          </a:effectRef>
+          <a:fontRef idx="minor">
+            <a:schemeClr val="lt1"/>
+          </a:fontRef>
+        </p:style>
+        <p:txBody>
+          <a:bodyPr rtlCol="0" anchor="ctr"/>
+          <a:lstStyle/>
+          <a:p>
+            <a:pPr marL="342900" indent="-342900">
+              <a:buFont typeface="+mj-lt"/>
+              <a:buAutoNum type="arabicPeriod" startAt="9"/>
+            </a:pPr>
+            <a:r>
+              <a:rPr lang="en-US" dirty="0"/>
+              <a:t>Patient </a:t>
+            </a:r>
+            <a:r>
+              <a:rPr lang="en-US" dirty="0" smtClean="0"/>
+              <a:t>registration/ coverage (option B)</a:t>
+            </a:r>
+            <a:endParaRPr lang="en-US" dirty="0"/>
+          </a:p>
+        </p:txBody>
+      </p:sp>
+      <p:sp>
+        <p:nvSpPr>
+          <p:cNvPr id="9" name="Rounded Rectangle 8"/>
+          <p:cNvSpPr/>
+          <p:nvPr/>
+        </p:nvSpPr>
+        <p:spPr>
+          <a:xfrm>
+            <a:off x="9434036" y="1829391"/>
+            <a:ext cx="1965170" cy="1163412"/>
+          </a:xfrm>
+          <a:prstGeom prst="roundRect">
+            <a:avLst/>
+          </a:prstGeom>
+        </p:spPr>
+        <p:style>
+          <a:lnRef idx="2">
+            <a:schemeClr val="accent1">
+              <a:shade val="50000"/>
+            </a:schemeClr>
+          </a:lnRef>
+          <a:fillRef idx="1">
+            <a:schemeClr val="accent1"/>
+          </a:fillRef>
+          <a:effectRef idx="0">
+            <a:schemeClr val="accent1"/>
+          </a:effectRef>
+          <a:fontRef idx="minor">
+            <a:schemeClr val="lt1"/>
+          </a:fontRef>
+        </p:style>
+        <p:txBody>
+          <a:bodyPr rtlCol="0" anchor="ctr"/>
+          <a:lstStyle/>
+          <a:p>
+            <a:pPr marL="342900" indent="-342900">
+              <a:buFont typeface="+mj-lt"/>
+              <a:buAutoNum type="arabicPeriod" startAt="8"/>
+            </a:pPr>
+            <a:r>
+              <a:rPr lang="en-US" dirty="0" smtClean="0"/>
+              <a:t>Create and hold </a:t>
+            </a:r>
+            <a:r>
+              <a:rPr lang="en-US" dirty="0" smtClean="0"/>
+              <a:t>appointment (optional)</a:t>
+            </a:r>
+            <a:endParaRPr lang="en-US" dirty="0"/>
+          </a:p>
+        </p:txBody>
+      </p:sp>
+      <p:sp>
+        <p:nvSpPr>
+          <p:cNvPr id="10" name="Rounded Rectangle 9"/>
+          <p:cNvSpPr/>
+          <p:nvPr/>
+        </p:nvSpPr>
+        <p:spPr>
+          <a:xfrm>
+            <a:off x="6142410" y="1829391"/>
+            <a:ext cx="1965170" cy="1163412"/>
+          </a:xfrm>
+          <a:prstGeom prst="roundRect">
+            <a:avLst/>
+          </a:prstGeom>
+        </p:spPr>
+        <p:style>
+          <a:lnRef idx="2">
+            <a:schemeClr val="accent1">
+              <a:shade val="50000"/>
+            </a:schemeClr>
+          </a:lnRef>
+          <a:fillRef idx="1">
+            <a:schemeClr val="accent1"/>
+          </a:fillRef>
+          <a:effectRef idx="0">
+            <a:schemeClr val="accent1"/>
+          </a:effectRef>
+          <a:fontRef idx="minor">
+            <a:schemeClr val="lt1"/>
+          </a:fontRef>
+        </p:style>
+        <p:txBody>
+          <a:bodyPr rtlCol="0" anchor="ctr"/>
+          <a:lstStyle/>
+          <a:p>
+            <a:pPr marL="342900" indent="-342900">
+              <a:buFont typeface="+mj-lt"/>
+              <a:buAutoNum type="arabicPeriod" startAt="7"/>
+            </a:pPr>
+            <a:r>
+              <a:rPr lang="en-US" dirty="0"/>
+              <a:t>Search for open appointments</a:t>
+            </a:r>
+          </a:p>
+        </p:txBody>
+      </p:sp>
+      <p:sp>
+        <p:nvSpPr>
+          <p:cNvPr id="11" name="Rounded Rectangle 10"/>
+          <p:cNvSpPr/>
+          <p:nvPr/>
+        </p:nvSpPr>
+        <p:spPr>
+          <a:xfrm>
+            <a:off x="6142409" y="3742133"/>
+            <a:ext cx="1965170" cy="1163412"/>
+          </a:xfrm>
+          <a:prstGeom prst="roundRect">
+            <a:avLst/>
+          </a:prstGeom>
+        </p:spPr>
+        <p:style>
+          <a:lnRef idx="2">
+            <a:schemeClr val="accent1">
+              <a:shade val="50000"/>
+            </a:schemeClr>
+          </a:lnRef>
+          <a:fillRef idx="1">
+            <a:schemeClr val="accent1"/>
+          </a:fillRef>
+          <a:effectRef idx="0">
+            <a:schemeClr val="accent1"/>
+          </a:effectRef>
+          <a:fontRef idx="minor">
+            <a:schemeClr val="lt1"/>
+          </a:fontRef>
+        </p:style>
+        <p:txBody>
+          <a:bodyPr rtlCol="0" anchor="ctr"/>
+          <a:lstStyle/>
+          <a:p>
+            <a:pPr marL="342900" indent="-342900">
+              <a:buFont typeface="+mj-lt"/>
+              <a:buAutoNum type="arabicPeriod" startAt="10"/>
+            </a:pPr>
+            <a:r>
+              <a:rPr lang="en-US" dirty="0" smtClean="0"/>
+              <a:t>Create and book </a:t>
+            </a:r>
+            <a:r>
+              <a:rPr lang="en-US" dirty="0"/>
+              <a:t>appointment</a:t>
+            </a:r>
+          </a:p>
+        </p:txBody>
+      </p:sp>
+      <p:cxnSp>
+        <p:nvCxnSpPr>
+          <p:cNvPr id="12" name="Straight Arrow Connector 11"/>
+          <p:cNvCxnSpPr>
+            <a:stCxn id="8" idx="0"/>
+            <a:endCxn id="9" idx="2"/>
+          </p:cNvCxnSpPr>
+          <p:nvPr/>
+        </p:nvCxnSpPr>
+        <p:spPr>
+          <a:xfrm flipV="1">
+            <a:off x="10416621" y="2992803"/>
+            <a:ext cx="0" cy="749330"/>
+          </a:xfrm>
+          <a:prstGeom prst="straightConnector1">
+            <a:avLst/>
+          </a:prstGeom>
+          <a:ln w="38100">
+            <a:solidFill>
+              <a:schemeClr val="tx1"/>
+            </a:solidFill>
+            <a:headEnd type="triangle"/>
+            <a:tailEnd type="none"/>
+          </a:ln>
+        </p:spPr>
+        <p:style>
+          <a:lnRef idx="1">
+            <a:schemeClr val="accent1"/>
+          </a:lnRef>
+          <a:fillRef idx="0">
+            <a:schemeClr val="accent1"/>
+          </a:fillRef>
+          <a:effectRef idx="0">
+            <a:schemeClr val="accent1"/>
+          </a:effectRef>
+          <a:fontRef idx="minor">
+            <a:schemeClr val="tx1"/>
+          </a:fontRef>
+        </p:style>
+      </p:cxnSp>
+      <p:cxnSp>
+        <p:nvCxnSpPr>
+          <p:cNvPr id="13" name="Straight Arrow Connector 12"/>
+          <p:cNvCxnSpPr>
+            <a:stCxn id="10" idx="3"/>
+            <a:endCxn id="9" idx="1"/>
+          </p:cNvCxnSpPr>
+          <p:nvPr/>
+        </p:nvCxnSpPr>
+        <p:spPr>
+          <a:xfrm>
+            <a:off x="8107580" y="2411097"/>
+            <a:ext cx="1326456" cy="0"/>
+          </a:xfrm>
+          <a:prstGeom prst="straightConnector1">
+            <a:avLst/>
+          </a:prstGeom>
+          <a:ln w="38100">
+            <a:solidFill>
+              <a:schemeClr val="tx1"/>
+            </a:solidFill>
+            <a:tailEnd type="triangle"/>
+          </a:ln>
+        </p:spPr>
+        <p:style>
+          <a:lnRef idx="1">
+            <a:schemeClr val="accent1"/>
+          </a:lnRef>
+          <a:fillRef idx="0">
+            <a:schemeClr val="accent1"/>
+          </a:fillRef>
+          <a:effectRef idx="0">
+            <a:schemeClr val="accent1"/>
+          </a:effectRef>
+          <a:fontRef idx="minor">
+            <a:schemeClr val="tx1"/>
+          </a:fontRef>
+        </p:style>
+      </p:cxnSp>
+      <p:cxnSp>
+        <p:nvCxnSpPr>
+          <p:cNvPr id="18" name="Straight Arrow Connector 17"/>
+          <p:cNvCxnSpPr>
+            <a:stCxn id="8" idx="1"/>
+            <a:endCxn id="11" idx="3"/>
+          </p:cNvCxnSpPr>
+          <p:nvPr/>
+        </p:nvCxnSpPr>
+        <p:spPr>
+          <a:xfrm flipH="1">
+            <a:off x="8107579" y="4323839"/>
+            <a:ext cx="1326457" cy="0"/>
+          </a:xfrm>
+          <a:prstGeom prst="straightConnector1">
+            <a:avLst/>
+          </a:prstGeom>
+          <a:ln w="38100">
+            <a:solidFill>
+              <a:schemeClr val="tx1"/>
+            </a:solidFill>
+            <a:tailEnd type="triangle"/>
+          </a:ln>
+        </p:spPr>
+        <p:style>
+          <a:lnRef idx="1">
+            <a:schemeClr val="accent1"/>
+          </a:lnRef>
+          <a:fillRef idx="0">
+            <a:schemeClr val="accent1"/>
+          </a:fillRef>
+          <a:effectRef idx="0">
+            <a:schemeClr val="accent1"/>
+          </a:effectRef>
+          <a:fontRef idx="minor">
+            <a:schemeClr val="tx1"/>
+          </a:fontRef>
+        </p:style>
+      </p:cxnSp>
+      <p:cxnSp>
+        <p:nvCxnSpPr>
+          <p:cNvPr id="25" name="Straight Arrow Connector 24"/>
+          <p:cNvCxnSpPr>
+            <a:endCxn id="3" idx="0"/>
+          </p:cNvCxnSpPr>
+          <p:nvPr/>
+        </p:nvCxnSpPr>
+        <p:spPr>
+          <a:xfrm>
+            <a:off x="3833368" y="635000"/>
+            <a:ext cx="0" cy="1194391"/>
+          </a:xfrm>
+          <a:prstGeom prst="straightConnector1">
+            <a:avLst/>
+          </a:prstGeom>
+          <a:ln w="38100">
+            <a:solidFill>
+              <a:schemeClr val="tx1"/>
+            </a:solidFill>
+            <a:tailEnd type="triangle"/>
+          </a:ln>
+        </p:spPr>
+        <p:style>
+          <a:lnRef idx="1">
+            <a:schemeClr val="accent1"/>
+          </a:lnRef>
+          <a:fillRef idx="0">
+            <a:schemeClr val="accent1"/>
+          </a:fillRef>
+          <a:effectRef idx="0">
+            <a:schemeClr val="accent1"/>
+          </a:effectRef>
+          <a:fontRef idx="minor">
+            <a:schemeClr val="tx1"/>
+          </a:fontRef>
+        </p:style>
+      </p:cxnSp>
+      <p:cxnSp>
+        <p:nvCxnSpPr>
+          <p:cNvPr id="26" name="Straight Arrow Connector 25"/>
+          <p:cNvCxnSpPr>
+            <a:stCxn id="11" idx="1"/>
+            <a:endCxn id="31" idx="3"/>
+          </p:cNvCxnSpPr>
+          <p:nvPr/>
+        </p:nvCxnSpPr>
+        <p:spPr>
+          <a:xfrm flipH="1">
+            <a:off x="4815953" y="4323839"/>
+            <a:ext cx="1326456" cy="0"/>
+          </a:xfrm>
+          <a:prstGeom prst="straightConnector1">
+            <a:avLst/>
+          </a:prstGeom>
+          <a:ln w="38100">
+            <a:solidFill>
+              <a:schemeClr val="tx1"/>
+            </a:solidFill>
+            <a:tailEnd type="triangle"/>
+          </a:ln>
+        </p:spPr>
+        <p:style>
+          <a:lnRef idx="1">
+            <a:schemeClr val="accent1"/>
+          </a:lnRef>
+          <a:fillRef idx="0">
+            <a:schemeClr val="accent1"/>
+          </a:fillRef>
+          <a:effectRef idx="0">
+            <a:schemeClr val="accent1"/>
+          </a:effectRef>
+          <a:fontRef idx="minor">
+            <a:schemeClr val="tx1"/>
+          </a:fontRef>
+        </p:style>
+      </p:cxnSp>
+      <p:sp>
+        <p:nvSpPr>
+          <p:cNvPr id="14" name="TextBox 13"/>
+          <p:cNvSpPr txBox="1"/>
+          <p:nvPr/>
+        </p:nvSpPr>
+        <p:spPr>
+          <a:xfrm>
+            <a:off x="771558" y="1312398"/>
+            <a:ext cx="1857375" cy="1200329"/>
+          </a:xfrm>
+          <a:prstGeom prst="rect">
+            <a:avLst/>
+          </a:prstGeom>
+          <a:noFill/>
+        </p:spPr>
+        <p:txBody>
+          <a:bodyPr wrap="square" rtlCol="0">
+            <a:spAutoFit/>
+          </a:bodyPr>
+          <a:lstStyle/>
+          <a:p>
+            <a:r>
+              <a:rPr lang="en-US" dirty="0"/>
+              <a:t>Scenario </a:t>
+            </a:r>
+            <a:r>
+              <a:rPr lang="en-US" dirty="0"/>
+              <a:t>3</a:t>
+            </a:r>
+            <a:r>
+              <a:rPr lang="en-US" dirty="0" smtClean="0"/>
+              <a:t>: </a:t>
+            </a:r>
+            <a:r>
+              <a:rPr lang="en-US" dirty="0" smtClean="0"/>
+              <a:t>Open Scheduling </a:t>
+            </a:r>
+            <a:r>
+              <a:rPr lang="en-US" dirty="0"/>
+              <a:t>for new or existing patient</a:t>
+            </a:r>
+          </a:p>
+        </p:txBody>
+      </p:sp>
+      <p:sp>
+        <p:nvSpPr>
+          <p:cNvPr id="31" name="Rounded Rectangle 30"/>
+          <p:cNvSpPr/>
+          <p:nvPr/>
+        </p:nvSpPr>
+        <p:spPr>
+          <a:xfrm>
+            <a:off x="2850783" y="3742133"/>
+            <a:ext cx="1965170" cy="1163412"/>
+          </a:xfrm>
+          <a:prstGeom prst="roundRect">
+            <a:avLst/>
+          </a:prstGeom>
+        </p:spPr>
+        <p:style>
+          <a:lnRef idx="2">
+            <a:schemeClr val="accent1">
+              <a:shade val="50000"/>
+            </a:schemeClr>
+          </a:lnRef>
+          <a:fillRef idx="1">
+            <a:schemeClr val="accent1"/>
+          </a:fillRef>
+          <a:effectRef idx="0">
+            <a:schemeClr val="accent1"/>
+          </a:effectRef>
+          <a:fontRef idx="minor">
+            <a:schemeClr val="lt1"/>
+          </a:fontRef>
+        </p:style>
+        <p:txBody>
+          <a:bodyPr rtlCol="0" anchor="ctr"/>
+          <a:lstStyle/>
+          <a:p>
+            <a:pPr marL="342900" indent="-342900">
+              <a:buFont typeface="+mj-lt"/>
+              <a:buAutoNum type="arabicPeriod" startAt="12"/>
+            </a:pPr>
+            <a:r>
+              <a:rPr lang="en-US" dirty="0" smtClean="0"/>
+              <a:t>Patient coverage (option C)</a:t>
+            </a:r>
+            <a:endParaRPr lang="en-US" dirty="0"/>
+          </a:p>
+        </p:txBody>
+      </p:sp>
+      <p:cxnSp>
+        <p:nvCxnSpPr>
+          <p:cNvPr id="32" name="Straight Arrow Connector 31"/>
+          <p:cNvCxnSpPr>
+            <a:stCxn id="31" idx="2"/>
+          </p:cNvCxnSpPr>
+          <p:nvPr/>
+        </p:nvCxnSpPr>
+        <p:spPr>
+          <a:xfrm>
+            <a:off x="3833368" y="4905545"/>
+            <a:ext cx="0" cy="1266655"/>
+          </a:xfrm>
+          <a:prstGeom prst="straightConnector1">
+            <a:avLst/>
+          </a:prstGeom>
+          <a:ln w="38100">
+            <a:solidFill>
+              <a:schemeClr val="tx1"/>
+            </a:solidFill>
+            <a:tailEnd type="triangle"/>
+          </a:ln>
+        </p:spPr>
+        <p:style>
+          <a:lnRef idx="1">
+            <a:schemeClr val="accent1"/>
+          </a:lnRef>
+          <a:fillRef idx="0">
+            <a:schemeClr val="accent1"/>
+          </a:fillRef>
+          <a:effectRef idx="0">
+            <a:schemeClr val="accent1"/>
+          </a:effectRef>
+          <a:fontRef idx="minor">
+            <a:schemeClr val="tx1"/>
+          </a:fontRef>
+        </p:style>
+      </p:cxnSp>
+    </p:spTree>
+    <p:extLst>
+      <p:ext uri="{BB962C8B-B14F-4D97-AF65-F5344CB8AC3E}">
+        <p14:creationId xmlns:p14="http://schemas.microsoft.com/office/powerpoint/2010/main" val="929008781"/>
+      </p:ext>
+    </p:extLst>
+  </p:cSld>
+  <p:clrMapOvr>
+    <a:masterClrMapping/>
+  </p:clrMapOvr>
+</p:sld>
+</file>
+
+<file path=ppt/slides/slide43.xml><?xml version="1.0" encoding="utf-8"?>
+<p:sld xmlns:a="http://schemas.openxmlformats.org/drawingml/2006/main" xmlns:r="http://schemas.openxmlformats.org/officeDocument/2006/relationships" xmlns:p="http://schemas.openxmlformats.org/presentationml/2006/main">
+  <p:cSld>
+    <p:spTree>
+      <p:nvGrpSpPr>
+        <p:cNvPr id="1" name=""/>
+        <p:cNvGrpSpPr/>
+        <p:nvPr/>
+      </p:nvGrpSpPr>
+      <p:grpSpPr>
+        <a:xfrm>
+          <a:off x="0" y="0"/>
+          <a:ext cx="0" cy="0"/>
+          <a:chOff x="0" y="0"/>
+          <a:chExt cx="0" cy="0"/>
+        </a:xfrm>
+      </p:grpSpPr>
+      <p:sp>
+        <p:nvSpPr>
+          <p:cNvPr id="11" name="Can 10"/>
+          <p:cNvSpPr/>
+          <p:nvPr/>
+        </p:nvSpPr>
+        <p:spPr>
+          <a:xfrm>
+            <a:off x="3883299" y="2390275"/>
+            <a:ext cx="2484820" cy="2258969"/>
+          </a:xfrm>
+          <a:prstGeom prst="can">
+            <a:avLst/>
+          </a:prstGeom>
+        </p:spPr>
+        <p:style>
+          <a:lnRef idx="2">
+            <a:schemeClr val="accent1">
+              <a:shade val="50000"/>
+            </a:schemeClr>
+          </a:lnRef>
+          <a:fillRef idx="1">
+            <a:schemeClr val="accent1"/>
+          </a:fillRef>
+          <a:effectRef idx="0">
+            <a:schemeClr val="accent1"/>
+          </a:effectRef>
+          <a:fontRef idx="minor">
+            <a:schemeClr val="lt1"/>
+          </a:fontRef>
+        </p:style>
+        <p:txBody>
+          <a:bodyPr rtlCol="0" anchor="ctr"/>
+          <a:lstStyle/>
+          <a:p>
+            <a:pPr algn="ctr"/>
+            <a:r>
+              <a:rPr lang="en-US" sz="2400" dirty="0" smtClean="0"/>
+              <a:t>Client</a:t>
+            </a:r>
+          </a:p>
+          <a:p>
+            <a:pPr algn="ctr"/>
+            <a:r>
+              <a:rPr lang="en-US" sz="2400" dirty="0" smtClean="0"/>
+              <a:t>(Scheduling Application)</a:t>
+            </a:r>
+            <a:endParaRPr lang="en-US" sz="2400" dirty="0"/>
+          </a:p>
+        </p:txBody>
+      </p:sp>
+      <p:cxnSp>
+        <p:nvCxnSpPr>
+          <p:cNvPr id="22" name="Straight Arrow Connector 21"/>
+          <p:cNvCxnSpPr/>
+          <p:nvPr/>
+        </p:nvCxnSpPr>
+        <p:spPr>
+          <a:xfrm>
+            <a:off x="6468321" y="3519760"/>
+            <a:ext cx="2829253" cy="0"/>
+          </a:xfrm>
+          <a:prstGeom prst="straightConnector1">
+            <a:avLst/>
+          </a:prstGeom>
+          <a:ln w="63500">
+            <a:tailEnd type="triangle"/>
+          </a:ln>
+        </p:spPr>
+        <p:style>
+          <a:lnRef idx="1">
+            <a:schemeClr val="accent1"/>
+          </a:lnRef>
+          <a:fillRef idx="0">
+            <a:schemeClr val="accent1"/>
+          </a:fillRef>
+          <a:effectRef idx="0">
+            <a:schemeClr val="accent1"/>
+          </a:effectRef>
+          <a:fontRef idx="minor">
+            <a:schemeClr val="tx1"/>
+          </a:fontRef>
+        </p:style>
+      </p:cxnSp>
+      <p:sp>
+        <p:nvSpPr>
+          <p:cNvPr id="4" name="TextBox 3"/>
+          <p:cNvSpPr txBox="1"/>
+          <p:nvPr/>
+        </p:nvSpPr>
+        <p:spPr>
+          <a:xfrm>
+            <a:off x="6710343" y="2539214"/>
+            <a:ext cx="2245007" cy="923330"/>
+          </a:xfrm>
+          <a:prstGeom prst="rect">
+            <a:avLst/>
+          </a:prstGeom>
+          <a:solidFill>
+            <a:schemeClr val="bg1"/>
+          </a:solidFill>
+          <a:effectLst/>
+        </p:spPr>
+        <p:txBody>
+          <a:bodyPr wrap="square" rtlCol="0">
+            <a:spAutoFit/>
+          </a:bodyPr>
+          <a:lstStyle/>
+          <a:p>
+            <a:pPr algn="ctr"/>
+            <a:r>
+              <a:rPr lang="en-US" dirty="0" smtClean="0"/>
+              <a:t>Subscrib</a:t>
+            </a:r>
+            <a:r>
+              <a:rPr lang="en-US" dirty="0" smtClean="0"/>
+              <a:t>e to receive notifications of </a:t>
+            </a:r>
+            <a:r>
+              <a:rPr lang="en-US" dirty="0"/>
+              <a:t>s</a:t>
+            </a:r>
+            <a:r>
+              <a:rPr lang="en-US" dirty="0" smtClean="0"/>
+              <a:t>chedule changes</a:t>
+            </a:r>
+            <a:endParaRPr lang="en-US" dirty="0"/>
+          </a:p>
+        </p:txBody>
+      </p:sp>
+      <p:cxnSp>
+        <p:nvCxnSpPr>
+          <p:cNvPr id="23" name="Straight Arrow Connector 22"/>
+          <p:cNvCxnSpPr/>
+          <p:nvPr/>
+        </p:nvCxnSpPr>
+        <p:spPr>
+          <a:xfrm>
+            <a:off x="6368119" y="3789392"/>
+            <a:ext cx="2829253" cy="0"/>
+          </a:xfrm>
+          <a:prstGeom prst="straightConnector1">
+            <a:avLst/>
+          </a:prstGeom>
+          <a:ln w="63500">
+            <a:headEnd type="triangle"/>
+            <a:tailEnd type="none"/>
+          </a:ln>
+        </p:spPr>
+        <p:style>
+          <a:lnRef idx="1">
+            <a:schemeClr val="accent1"/>
+          </a:lnRef>
+          <a:fillRef idx="0">
+            <a:schemeClr val="accent1"/>
+          </a:fillRef>
+          <a:effectRef idx="0">
+            <a:schemeClr val="accent1"/>
+          </a:effectRef>
+          <a:fontRef idx="minor">
+            <a:schemeClr val="tx1"/>
+          </a:fontRef>
+        </p:style>
+      </p:cxnSp>
+      <p:sp>
+        <p:nvSpPr>
+          <p:cNvPr id="8" name="Can 7"/>
+          <p:cNvSpPr/>
+          <p:nvPr/>
+        </p:nvSpPr>
+        <p:spPr>
+          <a:xfrm>
+            <a:off x="9297574" y="2359802"/>
+            <a:ext cx="2380957" cy="2258969"/>
+          </a:xfrm>
+          <a:prstGeom prst="can">
+            <a:avLst/>
+          </a:prstGeom>
+        </p:spPr>
+        <p:style>
+          <a:lnRef idx="2">
+            <a:schemeClr val="accent1">
+              <a:shade val="50000"/>
+            </a:schemeClr>
+          </a:lnRef>
+          <a:fillRef idx="1">
+            <a:schemeClr val="accent1"/>
+          </a:fillRef>
+          <a:effectRef idx="0">
+            <a:schemeClr val="accent1"/>
+          </a:effectRef>
+          <a:fontRef idx="minor">
+            <a:schemeClr val="lt1"/>
+          </a:fontRef>
+        </p:style>
+        <p:txBody>
+          <a:bodyPr rtlCol="0" anchor="ctr"/>
+          <a:lstStyle/>
+          <a:p>
+            <a:pPr algn="ctr"/>
+            <a:r>
+              <a:rPr lang="en-US" sz="2400" dirty="0" smtClean="0"/>
+              <a:t>FHIR Scheduler, (EHR)</a:t>
+            </a:r>
+            <a:endParaRPr lang="en-US" sz="2400" dirty="0"/>
+          </a:p>
+        </p:txBody>
+      </p:sp>
+      <p:pic>
+        <p:nvPicPr>
+          <p:cNvPr id="12" name="Picture 11"/>
+          <p:cNvPicPr>
+            <a:picLocks noChangeAspect="1"/>
+          </p:cNvPicPr>
+          <p:nvPr/>
+        </p:nvPicPr>
+        <p:blipFill>
+          <a:blip r:embed="rId3">
+            <a:extLst>
+              <a:ext uri="{28A0092B-C50C-407E-A947-70E740481C1C}">
+                <a14:useLocalDpi xmlns:a14="http://schemas.microsoft.com/office/drawing/2010/main" val="0"/>
+              </a:ext>
+            </a:extLst>
+          </a:blip>
+          <a:stretch>
+            <a:fillRect/>
+          </a:stretch>
+        </p:blipFill>
+        <p:spPr>
+          <a:xfrm>
+            <a:off x="744038" y="2116140"/>
+            <a:ext cx="1780491" cy="2698128"/>
+          </a:xfrm>
+          <a:prstGeom prst="rect">
+            <a:avLst/>
+          </a:prstGeom>
+        </p:spPr>
+      </p:pic>
+      <p:sp>
+        <p:nvSpPr>
+          <p:cNvPr id="10" name="TextBox 9"/>
+          <p:cNvSpPr txBox="1"/>
+          <p:nvPr/>
+        </p:nvSpPr>
+        <p:spPr>
+          <a:xfrm>
+            <a:off x="6551518" y="3972440"/>
+            <a:ext cx="2562655" cy="646331"/>
+          </a:xfrm>
+          <a:prstGeom prst="rect">
+            <a:avLst/>
+          </a:prstGeom>
+          <a:solidFill>
+            <a:schemeClr val="bg1"/>
+          </a:solidFill>
+          <a:effectLst/>
+        </p:spPr>
+        <p:txBody>
+          <a:bodyPr wrap="square" rtlCol="0">
+            <a:spAutoFit/>
+          </a:bodyPr>
+          <a:lstStyle/>
+          <a:p>
+            <a:pPr algn="ctr"/>
+            <a:r>
+              <a:rPr lang="en-US" dirty="0" smtClean="0"/>
+              <a:t>Confirm/reject </a:t>
+            </a:r>
+            <a:r>
+              <a:rPr lang="en-US" dirty="0" smtClean="0"/>
+              <a:t>subscription</a:t>
+            </a:r>
+            <a:endParaRPr lang="en-US" dirty="0"/>
+          </a:p>
+        </p:txBody>
+      </p:sp>
+    </p:spTree>
+    <p:extLst>
+      <p:ext uri="{BB962C8B-B14F-4D97-AF65-F5344CB8AC3E}">
+        <p14:creationId xmlns:p14="http://schemas.microsoft.com/office/powerpoint/2010/main" val="1410275479"/>
       </p:ext>
     </p:extLst>
   </p:cSld>

</xml_diff>

<commit_message>
completed examples ready for qa
</commit_message>
<xml_diff>
--- a/meeting-notes/diagrams.pptx
+++ b/meeting-notes/diagrams.pptx
@@ -253,7 +253,7 @@
             <a:fld id="{7BDA92F8-9482-1145-B1E4-CE31E168D77D}" type="datetimeFigureOut">
               <a:rPr lang="en-US" smtClean="0"/>
               <a:pPr/>
-              <a:t>3/14/18</a:t>
+              <a:t>3/21/18</a:t>
             </a:fld>
             <a:endParaRPr lang="en-US"/>
           </a:p>
@@ -1589,7 +1589,7 @@
             <a:fld id="{150AD5B7-C160-7A4E-8FA5-E71465AAF732}" type="datetimeFigureOut">
               <a:rPr lang="en-US" smtClean="0"/>
               <a:pPr/>
-              <a:t>3/14/18</a:t>
+              <a:t>3/21/18</a:t>
             </a:fld>
             <a:endParaRPr lang="en-US"/>
           </a:p>
@@ -1761,7 +1761,7 @@
             <a:fld id="{150AD5B7-C160-7A4E-8FA5-E71465AAF732}" type="datetimeFigureOut">
               <a:rPr lang="en-US" smtClean="0"/>
               <a:pPr/>
-              <a:t>3/14/18</a:t>
+              <a:t>3/21/18</a:t>
             </a:fld>
             <a:endParaRPr lang="en-US"/>
           </a:p>
@@ -1943,7 +1943,7 @@
             <a:fld id="{150AD5B7-C160-7A4E-8FA5-E71465AAF732}" type="datetimeFigureOut">
               <a:rPr lang="en-US" smtClean="0"/>
               <a:pPr/>
-              <a:t>3/14/18</a:t>
+              <a:t>3/21/18</a:t>
             </a:fld>
             <a:endParaRPr lang="en-US"/>
           </a:p>
@@ -2115,7 +2115,7 @@
             <a:fld id="{150AD5B7-C160-7A4E-8FA5-E71465AAF732}" type="datetimeFigureOut">
               <a:rPr lang="en-US" smtClean="0"/>
               <a:pPr/>
-              <a:t>3/14/18</a:t>
+              <a:t>3/21/18</a:t>
             </a:fld>
             <a:endParaRPr lang="en-US"/>
           </a:p>
@@ -2363,7 +2363,7 @@
             <a:fld id="{150AD5B7-C160-7A4E-8FA5-E71465AAF732}" type="datetimeFigureOut">
               <a:rPr lang="en-US" smtClean="0"/>
               <a:pPr/>
-              <a:t>3/14/18</a:t>
+              <a:t>3/21/18</a:t>
             </a:fld>
             <a:endParaRPr lang="en-US"/>
           </a:p>
@@ -2597,7 +2597,7 @@
             <a:fld id="{150AD5B7-C160-7A4E-8FA5-E71465AAF732}" type="datetimeFigureOut">
               <a:rPr lang="en-US" smtClean="0"/>
               <a:pPr/>
-              <a:t>3/14/18</a:t>
+              <a:t>3/21/18</a:t>
             </a:fld>
             <a:endParaRPr lang="en-US"/>
           </a:p>
@@ -2966,7 +2966,7 @@
             <a:fld id="{150AD5B7-C160-7A4E-8FA5-E71465AAF732}" type="datetimeFigureOut">
               <a:rPr lang="en-US" smtClean="0"/>
               <a:pPr/>
-              <a:t>3/14/18</a:t>
+              <a:t>3/21/18</a:t>
             </a:fld>
             <a:endParaRPr lang="en-US"/>
           </a:p>
@@ -3086,7 +3086,7 @@
             <a:fld id="{150AD5B7-C160-7A4E-8FA5-E71465AAF732}" type="datetimeFigureOut">
               <a:rPr lang="en-US" smtClean="0"/>
               <a:pPr/>
-              <a:t>3/14/18</a:t>
+              <a:t>3/21/18</a:t>
             </a:fld>
             <a:endParaRPr lang="en-US"/>
           </a:p>
@@ -3183,7 +3183,7 @@
             <a:fld id="{150AD5B7-C160-7A4E-8FA5-E71465AAF732}" type="datetimeFigureOut">
               <a:rPr lang="en-US" smtClean="0"/>
               <a:pPr/>
-              <a:t>3/14/18</a:t>
+              <a:t>3/21/18</a:t>
             </a:fld>
             <a:endParaRPr lang="en-US"/>
           </a:p>
@@ -3462,7 +3462,7 @@
             <a:fld id="{150AD5B7-C160-7A4E-8FA5-E71465AAF732}" type="datetimeFigureOut">
               <a:rPr lang="en-US" smtClean="0"/>
               <a:pPr/>
-              <a:t>3/14/18</a:t>
+              <a:t>3/21/18</a:t>
             </a:fld>
             <a:endParaRPr lang="en-US"/>
           </a:p>
@@ -3717,7 +3717,7 @@
             <a:fld id="{150AD5B7-C160-7A4E-8FA5-E71465AAF732}" type="datetimeFigureOut">
               <a:rPr lang="en-US" smtClean="0"/>
               <a:pPr/>
-              <a:t>3/14/18</a:t>
+              <a:t>3/21/18</a:t>
             </a:fld>
             <a:endParaRPr lang="en-US"/>
           </a:p>
@@ -3932,7 +3932,7 @@
             <a:fld id="{150AD5B7-C160-7A4E-8FA5-E71465AAF732}" type="datetimeFigureOut">
               <a:rPr lang="en-US" smtClean="0"/>
               <a:pPr/>
-              <a:t>3/14/18</a:t>
+              <a:t>3/21/18</a:t>
             </a:fld>
             <a:endParaRPr lang="en-US"/>
           </a:p>
@@ -5564,154 +5564,6 @@
       </p:sp>
       <p:sp>
         <p:nvSpPr>
-          <p:cNvPr id="5" name="TextBox 4"/>
-          <p:cNvSpPr txBox="1"/>
-          <p:nvPr/>
-        </p:nvSpPr>
-        <p:spPr>
-          <a:xfrm>
-            <a:off x="2661370" y="1760340"/>
-            <a:ext cx="333072" cy="369332"/>
-          </a:xfrm>
-          <a:prstGeom prst="rect">
-            <a:avLst/>
-          </a:prstGeom>
-          <a:noFill/>
-          <a:ln w="25400">
-            <a:solidFill>
-              <a:schemeClr val="accent1">
-                <a:shade val="50000"/>
-              </a:schemeClr>
-            </a:solidFill>
-          </a:ln>
-        </p:spPr>
-        <p:txBody>
-          <a:bodyPr wrap="square" rtlCol="0">
-            <a:spAutoFit/>
-          </a:bodyPr>
-          <a:lstStyle/>
-          <a:p>
-            <a:pPr algn="ctr"/>
-            <a:r>
-              <a:rPr lang="en-US" dirty="0"/>
-              <a:t>E</a:t>
-            </a:r>
-          </a:p>
-        </p:txBody>
-      </p:sp>
-      <p:sp>
-        <p:nvSpPr>
-          <p:cNvPr id="27" name="TextBox 26"/>
-          <p:cNvSpPr txBox="1"/>
-          <p:nvPr/>
-        </p:nvSpPr>
-        <p:spPr>
-          <a:xfrm>
-            <a:off x="3920590" y="3880973"/>
-            <a:ext cx="415619" cy="369332"/>
-          </a:xfrm>
-          <a:prstGeom prst="rect">
-            <a:avLst/>
-          </a:prstGeom>
-          <a:noFill/>
-          <a:ln w="25400">
-            <a:solidFill>
-              <a:schemeClr val="accent1">
-                <a:shade val="50000"/>
-              </a:schemeClr>
-            </a:solidFill>
-          </a:ln>
-        </p:spPr>
-        <p:txBody>
-          <a:bodyPr wrap="square" rtlCol="0">
-            <a:spAutoFit/>
-          </a:bodyPr>
-          <a:lstStyle/>
-          <a:p>
-            <a:pPr algn="ctr"/>
-            <a:r>
-              <a:rPr lang="en-US" dirty="0"/>
-              <a:t>H</a:t>
-            </a:r>
-          </a:p>
-        </p:txBody>
-      </p:sp>
-      <p:sp>
-        <p:nvSpPr>
-          <p:cNvPr id="28" name="TextBox 27"/>
-          <p:cNvSpPr txBox="1"/>
-          <p:nvPr/>
-        </p:nvSpPr>
-        <p:spPr>
-          <a:xfrm>
-            <a:off x="7410436" y="3526182"/>
-            <a:ext cx="423109" cy="369332"/>
-          </a:xfrm>
-          <a:prstGeom prst="rect">
-            <a:avLst/>
-          </a:prstGeom>
-          <a:noFill/>
-          <a:ln w="25400">
-            <a:solidFill>
-              <a:schemeClr val="accent1">
-                <a:shade val="50000"/>
-              </a:schemeClr>
-            </a:solidFill>
-          </a:ln>
-        </p:spPr>
-        <p:txBody>
-          <a:bodyPr wrap="square" rtlCol="0">
-            <a:spAutoFit/>
-          </a:bodyPr>
-          <a:lstStyle/>
-          <a:p>
-            <a:pPr algn="ctr"/>
-            <a:r>
-              <a:rPr lang="en-US" dirty="0"/>
-              <a:t>G</a:t>
-            </a:r>
-          </a:p>
-        </p:txBody>
-      </p:sp>
-      <p:sp>
-        <p:nvSpPr>
-          <p:cNvPr id="29" name="TextBox 28"/>
-          <p:cNvSpPr txBox="1"/>
-          <p:nvPr/>
-        </p:nvSpPr>
-        <p:spPr>
-          <a:xfrm>
-            <a:off x="7261131" y="2192222"/>
-            <a:ext cx="375381" cy="369332"/>
-          </a:xfrm>
-          <a:prstGeom prst="rect">
-            <a:avLst/>
-          </a:prstGeom>
-          <a:noFill/>
-          <a:ln w="25400">
-            <a:solidFill>
-              <a:schemeClr val="accent1">
-                <a:shade val="50000"/>
-              </a:schemeClr>
-            </a:solidFill>
-          </a:ln>
-        </p:spPr>
-        <p:txBody>
-          <a:bodyPr wrap="square" rtlCol="0">
-            <a:spAutoFit/>
-          </a:bodyPr>
-          <a:lstStyle/>
-          <a:p>
-            <a:pPr algn="ctr"/>
-            <a:r>
-              <a:rPr lang="en-US" dirty="0"/>
-              <a:t>F</a:t>
-            </a:r>
-          </a:p>
-        </p:txBody>
-      </p:sp>
-      <p:sp>
-        <p:nvSpPr>
           <p:cNvPr id="8" name="Can 7"/>
           <p:cNvSpPr/>
           <p:nvPr/>
@@ -6683,117 +6535,6 @@
       </p:sp>
       <p:sp>
         <p:nvSpPr>
-          <p:cNvPr id="27" name="TextBox 26"/>
-          <p:cNvSpPr txBox="1"/>
-          <p:nvPr/>
-        </p:nvSpPr>
-        <p:spPr>
-          <a:xfrm>
-            <a:off x="3828608" y="3812600"/>
-            <a:ext cx="415619" cy="369332"/>
-          </a:xfrm>
-          <a:prstGeom prst="rect">
-            <a:avLst/>
-          </a:prstGeom>
-          <a:noFill/>
-          <a:ln w="25400">
-            <a:solidFill>
-              <a:schemeClr val="accent1">
-                <a:shade val="50000"/>
-              </a:schemeClr>
-            </a:solidFill>
-          </a:ln>
-        </p:spPr>
-        <p:txBody>
-          <a:bodyPr wrap="square" rtlCol="0">
-            <a:spAutoFit/>
-          </a:bodyPr>
-          <a:lstStyle/>
-          <a:p>
-            <a:pPr algn="ctr"/>
-            <a:r>
-              <a:rPr lang="en-US" dirty="0"/>
-              <a:t>N</a:t>
-            </a:r>
-          </a:p>
-        </p:txBody>
-      </p:sp>
-      <p:sp>
-        <p:nvSpPr>
-          <p:cNvPr id="28" name="TextBox 27"/>
-          <p:cNvSpPr txBox="1"/>
-          <p:nvPr/>
-        </p:nvSpPr>
-        <p:spPr>
-          <a:xfrm>
-            <a:off x="7432765" y="3543987"/>
-            <a:ext cx="423109" cy="369332"/>
-          </a:xfrm>
-          <a:prstGeom prst="rect">
-            <a:avLst/>
-          </a:prstGeom>
-          <a:noFill/>
-          <a:ln w="25400">
-            <a:solidFill>
-              <a:schemeClr val="accent1">
-                <a:shade val="50000"/>
-              </a:schemeClr>
-            </a:solidFill>
-          </a:ln>
-        </p:spPr>
-        <p:txBody>
-          <a:bodyPr wrap="square" rtlCol="0">
-            <a:spAutoFit/>
-          </a:bodyPr>
-          <a:lstStyle/>
-          <a:p>
-            <a:pPr algn="ctr"/>
-            <a:r>
-              <a:rPr lang="en-US" dirty="0"/>
-              <a:t>M</a:t>
-            </a:r>
-          </a:p>
-        </p:txBody>
-      </p:sp>
-      <p:sp>
-        <p:nvSpPr>
-          <p:cNvPr id="29" name="TextBox 28"/>
-          <p:cNvSpPr txBox="1"/>
-          <p:nvPr/>
-        </p:nvSpPr>
-        <p:spPr>
-          <a:xfrm>
-            <a:off x="7261131" y="2192222"/>
-            <a:ext cx="375381" cy="369332"/>
-          </a:xfrm>
-          <a:prstGeom prst="rect">
-            <a:avLst/>
-          </a:prstGeom>
-          <a:noFill/>
-          <a:ln w="25400">
-            <a:solidFill>
-              <a:schemeClr val="accent1">
-                <a:shade val="50000"/>
-              </a:schemeClr>
-            </a:solidFill>
-          </a:ln>
-        </p:spPr>
-        <p:txBody>
-          <a:bodyPr wrap="square" rtlCol="0">
-            <a:spAutoFit/>
-          </a:bodyPr>
-          <a:lstStyle/>
-          <a:p>
-            <a:pPr algn="ctr"/>
-            <a:r>
-              <a:rPr lang="en-US" dirty="0"/>
-              <a:t>L</a:t>
-            </a:r>
-          </a:p>
-        </p:txBody>
-      </p:sp>
-      <p:sp>
-        <p:nvSpPr>
           <p:cNvPr id="8" name="Can 7"/>
           <p:cNvSpPr/>
           <p:nvPr/>
@@ -7176,15 +6917,7 @@
           <a:p>
             <a:r>
               <a:rPr lang="en-US" dirty="0" smtClean="0"/>
-              <a:t>* </a:t>
-            </a:r>
-            <a:r>
-              <a:rPr lang="en-US" dirty="0" smtClean="0"/>
-              <a:t>Includes </a:t>
-            </a:r>
-            <a:r>
-              <a:rPr lang="en-US" dirty="0" smtClean="0"/>
-              <a:t>Schedule, Practitioner, Location</a:t>
+              <a:t>* Includes Schedule, Practitioner, Location</a:t>
             </a:r>
             <a:endParaRPr lang="en-US" dirty="0"/>
           </a:p>
@@ -7805,44 +7538,6 @@
           </a:fontRef>
         </p:style>
       </p:cxnSp>
-      <p:sp>
-        <p:nvSpPr>
-          <p:cNvPr id="12" name="TextBox 11"/>
-          <p:cNvSpPr txBox="1"/>
-          <p:nvPr/>
-        </p:nvSpPr>
-        <p:spPr>
-          <a:xfrm>
-            <a:off x="6789556" y="1931513"/>
-            <a:ext cx="567685" cy="369332"/>
-          </a:xfrm>
-          <a:prstGeom prst="rect">
-            <a:avLst/>
-          </a:prstGeom>
-          <a:noFill/>
-          <a:ln w="25400">
-            <a:solidFill>
-              <a:schemeClr val="accent1">
-                <a:shade val="50000"/>
-              </a:schemeClr>
-            </a:solidFill>
-          </a:ln>
-        </p:spPr>
-        <p:txBody>
-          <a:bodyPr wrap="square" rtlCol="0">
-            <a:spAutoFit/>
-          </a:bodyPr>
-          <a:lstStyle/>
-          <a:p>
-            <a:pPr algn="ctr"/>
-            <a:r>
-              <a:rPr lang="en-US" smtClean="0"/>
-              <a:t>B3</a:t>
-            </a:r>
-            <a:endParaRPr lang="en-US" dirty="0"/>
-          </a:p>
-        </p:txBody>
-      </p:sp>
       <p:sp>
         <p:nvSpPr>
           <p:cNvPr id="13" name="TextBox 12"/>
@@ -8516,44 +8211,6 @@
       </p:cxnSp>
       <p:sp>
         <p:nvSpPr>
-          <p:cNvPr id="5" name="TextBox 4"/>
-          <p:cNvSpPr txBox="1"/>
-          <p:nvPr/>
-        </p:nvSpPr>
-        <p:spPr>
-          <a:xfrm>
-            <a:off x="2661370" y="1760340"/>
-            <a:ext cx="394496" cy="307777"/>
-          </a:xfrm>
-          <a:prstGeom prst="rect">
-            <a:avLst/>
-          </a:prstGeom>
-          <a:noFill/>
-          <a:ln w="25400">
-            <a:solidFill>
-              <a:schemeClr val="accent1">
-                <a:shade val="50000"/>
-              </a:schemeClr>
-            </a:solidFill>
-          </a:ln>
-        </p:spPr>
-        <p:txBody>
-          <a:bodyPr wrap="square" rtlCol="0">
-            <a:spAutoFit/>
-          </a:bodyPr>
-          <a:lstStyle/>
-          <a:p>
-            <a:pPr algn="ctr"/>
-            <a:r>
-              <a:rPr lang="en-US" sz="1400" dirty="0" smtClean="0"/>
-              <a:t>8d</a:t>
-            </a:r>
-            <a:endParaRPr lang="en-US" sz="1400" dirty="0"/>
-          </a:p>
-        </p:txBody>
-      </p:sp>
-      <p:sp>
-        <p:nvSpPr>
           <p:cNvPr id="8" name="Can 7"/>
           <p:cNvSpPr/>
           <p:nvPr/>
@@ -8651,82 +8308,6 @@
               <a:t> Application Server</a:t>
             </a:r>
             <a:endParaRPr lang="en-US" sz="2400" dirty="0"/>
-          </a:p>
-        </p:txBody>
-      </p:sp>
-      <p:sp>
-        <p:nvSpPr>
-          <p:cNvPr id="19" name="TextBox 18"/>
-          <p:cNvSpPr txBox="1"/>
-          <p:nvPr/>
-        </p:nvSpPr>
-        <p:spPr>
-          <a:xfrm>
-            <a:off x="8338099" y="2581339"/>
-            <a:ext cx="394496" cy="307777"/>
-          </a:xfrm>
-          <a:prstGeom prst="rect">
-            <a:avLst/>
-          </a:prstGeom>
-          <a:noFill/>
-          <a:ln w="25400">
-            <a:solidFill>
-              <a:schemeClr val="accent1">
-                <a:shade val="50000"/>
-              </a:schemeClr>
-            </a:solidFill>
-          </a:ln>
-        </p:spPr>
-        <p:txBody>
-          <a:bodyPr wrap="square" rtlCol="0">
-            <a:spAutoFit/>
-          </a:bodyPr>
-          <a:lstStyle/>
-          <a:p>
-            <a:pPr algn="ctr"/>
-            <a:r>
-              <a:rPr lang="en-US" sz="1400" dirty="0" smtClean="0"/>
-              <a:t>8e</a:t>
-            </a:r>
-            <a:endParaRPr lang="en-US" sz="1400" dirty="0"/>
-          </a:p>
-        </p:txBody>
-      </p:sp>
-      <p:sp>
-        <p:nvSpPr>
-          <p:cNvPr id="20" name="TextBox 19"/>
-          <p:cNvSpPr txBox="1"/>
-          <p:nvPr/>
-        </p:nvSpPr>
-        <p:spPr>
-          <a:xfrm>
-            <a:off x="7387150" y="3585314"/>
-            <a:ext cx="394496" cy="307777"/>
-          </a:xfrm>
-          <a:prstGeom prst="rect">
-            <a:avLst/>
-          </a:prstGeom>
-          <a:noFill/>
-          <a:ln w="25400">
-            <a:solidFill>
-              <a:schemeClr val="accent1">
-                <a:shade val="50000"/>
-              </a:schemeClr>
-            </a:solidFill>
-          </a:ln>
-        </p:spPr>
-        <p:txBody>
-          <a:bodyPr wrap="square" rtlCol="0">
-            <a:spAutoFit/>
-          </a:bodyPr>
-          <a:lstStyle/>
-          <a:p>
-            <a:pPr algn="ctr"/>
-            <a:r>
-              <a:rPr lang="en-US" sz="1400" dirty="0" smtClean="0"/>
-              <a:t>8f</a:t>
-            </a:r>
-            <a:endParaRPr lang="en-US" sz="1400" dirty="0"/>
           </a:p>
         </p:txBody>
       </p:sp>
@@ -9092,8 +8673,8 @@
           <a:lstStyle/>
           <a:p>
             <a:pPr marL="342900" indent="-342900">
-              <a:buFont typeface="+mj-lt"/>
-              <a:buAutoNum type="arabicPeriod"/>
+              <a:buFont typeface="Arial" charset="0"/>
+              <a:buChar char="•"/>
             </a:pPr>
             <a:r>
               <a:rPr lang="en-US" dirty="0"/>
@@ -9106,8 +8687,8 @@
           </a:p>
           <a:p>
             <a:pPr marL="342900" indent="-342900">
-              <a:buFont typeface="+mj-lt"/>
-              <a:buAutoNum type="arabicPeriod"/>
+              <a:buFont typeface="Arial" charset="0"/>
+              <a:buChar char="•"/>
             </a:pPr>
             <a:r>
               <a:rPr lang="en-US" dirty="0" smtClean="0"/>
@@ -9120,8 +8701,8 @@
           </a:p>
           <a:p>
             <a:pPr marL="342900" indent="-342900">
-              <a:buFont typeface="+mj-lt"/>
-              <a:buAutoNum type="arabicPeriod"/>
+              <a:buFont typeface="Arial" charset="0"/>
+              <a:buChar char="•"/>
             </a:pPr>
             <a:r>
               <a:rPr lang="en-US" dirty="0" smtClean="0"/>
@@ -9131,8 +8712,8 @@
           </a:p>
           <a:p>
             <a:pPr marL="342900" indent="-342900">
-              <a:buFont typeface="+mj-lt"/>
-              <a:buAutoNum type="arabicPeriod"/>
+              <a:buFont typeface="Arial" charset="0"/>
+              <a:buChar char="•"/>
             </a:pPr>
             <a:r>
               <a:rPr lang="en-US" dirty="0" smtClean="0"/>
@@ -9145,8 +8726,8 @@
           </a:p>
           <a:p>
             <a:pPr marL="342900" indent="-342900">
-              <a:buFont typeface="+mj-lt"/>
-              <a:buAutoNum type="arabicPeriod"/>
+              <a:buFont typeface="Arial" charset="0"/>
+              <a:buChar char="•"/>
             </a:pPr>
             <a:r>
               <a:rPr lang="en-US" dirty="0" smtClean="0"/>
@@ -13524,8 +13105,8 @@
         </p:nvSpPr>
         <p:spPr>
           <a:xfrm>
-            <a:off x="1307401" y="1345852"/>
-            <a:ext cx="1857375" cy="1477328"/>
+            <a:off x="1109701" y="1345852"/>
+            <a:ext cx="2277556" cy="1477328"/>
           </a:xfrm>
           <a:prstGeom prst="rect">
             <a:avLst/>
@@ -13539,8 +13120,12 @@
           <a:lstStyle/>
           <a:p>
             <a:r>
+              <a:rPr lang="en-US" smtClean="0"/>
+              <a:t>Patient Scheduling Scenario </a:t>
+            </a:r>
+            <a:r>
               <a:rPr lang="en-US" dirty="0"/>
-              <a:t>Scenario 1: Patient </a:t>
+              <a:t>1: Patient </a:t>
             </a:r>
             <a:r>
               <a:rPr lang="en-US" dirty="0" smtClean="0"/>
@@ -14062,8 +13647,8 @@
         </p:nvSpPr>
         <p:spPr>
           <a:xfrm>
-            <a:off x="771558" y="1312398"/>
-            <a:ext cx="1857375" cy="1200329"/>
+            <a:off x="541742" y="1312398"/>
+            <a:ext cx="2161701" cy="1200329"/>
           </a:xfrm>
           <a:prstGeom prst="rect">
             <a:avLst/>
@@ -14077,8 +13662,8 @@
           <a:lstStyle/>
           <a:p>
             <a:r>
-              <a:rPr lang="en-US" dirty="0"/>
-              <a:t>Scenario </a:t>
+              <a:rPr lang="en-US" smtClean="0"/>
+              <a:t>Patient Scheduling Scenario </a:t>
             </a:r>
             <a:r>
               <a:rPr lang="en-US" dirty="0" smtClean="0"/>
@@ -14746,7 +14331,7 @@
         <p:spPr>
           <a:xfrm>
             <a:off x="4956447" y="2232039"/>
-            <a:ext cx="2044849" cy="923330"/>
+            <a:ext cx="2044849" cy="646331"/>
           </a:xfrm>
           <a:prstGeom prst="rect">
             <a:avLst/>
@@ -14762,10 +14347,7 @@
           </a:bodyPr>
           <a:lstStyle/>
           <a:p>
-            <a:pPr marL="342900" indent="-342900">
-              <a:buFont typeface="+mj-lt"/>
-              <a:buAutoNum type="arabicPeriod" startAt="7"/>
-            </a:pPr>
+            <a:pPr algn="ctr"/>
             <a:r>
               <a:rPr lang="en-US" dirty="0" smtClean="0"/>
               <a:t>Search for available appointments</a:t>
@@ -14783,7 +14365,7 @@
         <p:spPr>
           <a:xfrm>
             <a:off x="4990514" y="3710738"/>
-            <a:ext cx="1911745" cy="923330"/>
+            <a:ext cx="1911745" cy="646331"/>
           </a:xfrm>
           <a:prstGeom prst="rect">
             <a:avLst/>
@@ -14799,10 +14381,7 @@
           </a:bodyPr>
           <a:lstStyle/>
           <a:p>
-            <a:pPr marL="342900" indent="-342900">
-              <a:buFont typeface="+mj-lt"/>
-              <a:buAutoNum type="arabicPeriod" startAt="8"/>
-            </a:pPr>
+            <a:pPr algn="ctr"/>
             <a:r>
               <a:rPr lang="en-US" dirty="0" smtClean="0"/>
               <a:t>Return available appointments </a:t>
@@ -14989,7 +14568,7 @@
         <p:spPr>
           <a:xfrm>
             <a:off x="1177147" y="922118"/>
-            <a:ext cx="3367525" cy="369332"/>
+            <a:ext cx="3021276" cy="369332"/>
           </a:xfrm>
           <a:prstGeom prst="rect">
             <a:avLst/>
@@ -15001,10 +14580,7 @@
           </a:bodyPr>
           <a:lstStyle/>
           <a:p>
-            <a:pPr marL="342900" indent="-342900">
-              <a:buFont typeface="+mj-lt"/>
-              <a:buAutoNum type="arabicPeriod" startAt="6"/>
-            </a:pPr>
+            <a:pPr algn="ctr"/>
             <a:r>
               <a:rPr lang="en-US" dirty="0"/>
               <a:t>End user </a:t>
@@ -15229,7 +14805,7 @@
         <p:spPr>
           <a:xfrm>
             <a:off x="620135" y="864255"/>
-            <a:ext cx="4883003" cy="369332"/>
+            <a:ext cx="4615046" cy="369332"/>
           </a:xfrm>
           <a:prstGeom prst="rect">
             <a:avLst/>
@@ -15241,10 +14817,7 @@
           </a:bodyPr>
           <a:lstStyle/>
           <a:p>
-            <a:pPr marL="342900" indent="-342900">
-              <a:buFont typeface="+mj-lt"/>
-              <a:buAutoNum type="arabicPeriod" startAt="9"/>
-            </a:pPr>
+            <a:pPr algn="ctr"/>
             <a:r>
               <a:rPr lang="en-US" dirty="0"/>
               <a:t>End user selects </a:t>
@@ -15269,7 +14842,7 @@
         <p:spPr>
           <a:xfrm>
             <a:off x="4823663" y="2616037"/>
-            <a:ext cx="2907451" cy="648449"/>
+            <a:ext cx="2907451" cy="369332"/>
           </a:xfrm>
           <a:prstGeom prst="rect">
             <a:avLst/>
@@ -15285,10 +14858,7 @@
           </a:bodyPr>
           <a:lstStyle/>
           <a:p>
-            <a:pPr marL="342900" indent="-342900">
-              <a:buFont typeface="+mj-lt"/>
-              <a:buAutoNum type="arabicPeriod" startAt="10"/>
-            </a:pPr>
+            <a:pPr algn="ctr"/>
             <a:r>
               <a:rPr lang="en-US" dirty="0" smtClean="0"/>
               <a:t>Hold appointment </a:t>
@@ -15326,10 +14896,7 @@
           </a:bodyPr>
           <a:lstStyle/>
           <a:p>
-            <a:pPr marL="342900" indent="-342900">
-              <a:buFont typeface="+mj-lt"/>
-              <a:buAutoNum type="arabicPeriod" startAt="11"/>
-            </a:pPr>
+            <a:pPr algn="ctr"/>
             <a:r>
               <a:rPr lang="en-US" dirty="0" smtClean="0"/>
               <a:t>Confirm/reject hold</a:t>
@@ -15466,7 +15033,7 @@
         </p:nvSpPr>
         <p:spPr>
           <a:xfrm>
-            <a:off x="709343" y="5707432"/>
+            <a:off x="377437" y="5696821"/>
             <a:ext cx="5100441" cy="369332"/>
           </a:xfrm>
           <a:prstGeom prst="rect">
@@ -15479,10 +15046,7 @@
           </a:bodyPr>
           <a:lstStyle/>
           <a:p>
-            <a:pPr marL="342900" indent="-342900">
-              <a:buFont typeface="+mj-lt"/>
-              <a:buAutoNum type="arabicPeriod" startAt="12"/>
-            </a:pPr>
+            <a:pPr algn="ctr"/>
             <a:r>
               <a:rPr lang="en-US" dirty="0" smtClean="0"/>
               <a:t>End </a:t>
@@ -15711,7 +15275,7 @@
         <p:spPr>
           <a:xfrm>
             <a:off x="620135" y="864255"/>
-            <a:ext cx="6736011" cy="369332"/>
+            <a:ext cx="6389763" cy="369332"/>
           </a:xfrm>
           <a:prstGeom prst="rect">
             <a:avLst/>
@@ -15723,10 +15287,7 @@
           </a:bodyPr>
           <a:lstStyle/>
           <a:p>
-            <a:pPr marL="342900" indent="-342900">
-              <a:buFont typeface="+mj-lt"/>
-              <a:buAutoNum type="arabicPeriod" startAt="9"/>
-            </a:pPr>
+            <a:pPr algn="ctr"/>
             <a:r>
               <a:rPr lang="en-US" dirty="0" smtClean="0"/>
               <a:t>End user selects from available appointments (if Hold step absent)</a:t>
@@ -15807,10 +15368,7 @@
             </a:bodyPr>
             <a:lstStyle/>
             <a:p>
-              <a:pPr marL="342900" indent="-342900">
-                <a:buFont typeface="+mj-lt"/>
-                <a:buAutoNum type="arabicPeriod" startAt="13"/>
-              </a:pPr>
+              <a:pPr algn="ctr"/>
               <a:r>
                 <a:rPr lang="en-US" dirty="0" smtClean="0"/>
                 <a:t>Book appointment</a:t>
@@ -15844,10 +15402,7 @@
             </a:bodyPr>
             <a:lstStyle/>
             <a:p>
-              <a:pPr marL="342900" indent="-342900">
-                <a:buFont typeface="+mj-lt"/>
-                <a:buAutoNum type="arabicPeriod" startAt="14"/>
-              </a:pPr>
+              <a:pPr algn="ctr"/>
               <a:r>
                 <a:rPr lang="en-US" dirty="0"/>
                 <a:t>Confirm/reject </a:t>
@@ -17001,8 +16556,8 @@
         </p:nvSpPr>
         <p:spPr>
           <a:xfrm>
-            <a:off x="1041401" y="1345852"/>
-            <a:ext cx="2123376" cy="923330"/>
+            <a:off x="667910" y="1345852"/>
+            <a:ext cx="2496867" cy="923330"/>
           </a:xfrm>
           <a:prstGeom prst="rect">
             <a:avLst/>
@@ -17017,26 +16572,34 @@
           <a:p>
             <a:r>
               <a:rPr lang="en-US" dirty="0"/>
-              <a:t>Scenario </a:t>
+              <a:t>Provider Scheduling Scenario </a:t>
             </a:r>
             <a:r>
               <a:rPr lang="en-US" dirty="0" smtClean="0"/>
-              <a:t>2: Provider Scheduling </a:t>
+              <a:t>2</a:t>
+            </a:r>
+            <a:r>
+              <a:rPr lang="en-US" smtClean="0"/>
+              <a:t>: </a:t>
+            </a:r>
+            <a:r>
+              <a:rPr lang="en-US" smtClean="0"/>
+              <a:t>Scheduling </a:t>
             </a:r>
             <a:r>
               <a:rPr lang="en-US"/>
-              <a:t>for E</a:t>
+              <a:t>for </a:t>
             </a:r>
             <a:r>
               <a:rPr lang="en-US" smtClean="0"/>
-              <a:t>xisting </a:t>
+              <a:t>an Existing </a:t>
             </a:r>
             <a:r>
               <a:rPr lang="en-US" dirty="0"/>
               <a:t>P</a:t>
             </a:r>
             <a:r>
-              <a:rPr lang="en-US" smtClean="0"/>
+              <a:rPr lang="en-US" dirty="0" smtClean="0"/>
               <a:t>atient</a:t>
             </a:r>
             <a:endParaRPr lang="en-US" dirty="0"/>
@@ -17636,8 +17199,8 @@
         </p:nvSpPr>
         <p:spPr>
           <a:xfrm>
-            <a:off x="822211" y="1181691"/>
-            <a:ext cx="2152235" cy="923330"/>
+            <a:off x="612251" y="1181691"/>
+            <a:ext cx="2362196" cy="923330"/>
           </a:xfrm>
           <a:prstGeom prst="rect">
             <a:avLst/>
@@ -17651,23 +17214,27 @@
           <a:lstStyle/>
           <a:p>
             <a:r>
+              <a:rPr lang="en-US" dirty="0" smtClean="0"/>
+              <a:t>Provider Scheduling Scenario </a:t>
+            </a:r>
+            <a:r>
               <a:rPr lang="en-US" dirty="0"/>
-              <a:t>Scenario 1</a:t>
-            </a:r>
-            <a:r>
-              <a:rPr lang="en-US" dirty="0" smtClean="0"/>
-              <a:t>: Provider </a:t>
+              <a:t>1</a:t>
             </a:r>
             <a:r>
               <a:rPr lang="en-US" smtClean="0"/>
-              <a:t>scheduling General </a:t>
+              <a:t>: </a:t>
+            </a:r>
+            <a:r>
+              <a:rPr lang="en-US" smtClean="0"/>
+              <a:t>General </a:t>
             </a:r>
             <a:r>
               <a:rPr lang="en-US" dirty="0"/>
               <a:t>C</a:t>
             </a:r>
             <a:r>
-              <a:rPr lang="en-US" smtClean="0"/>
+              <a:rPr lang="en-US" dirty="0" smtClean="0"/>
               <a:t>ase</a:t>
             </a:r>
             <a:endParaRPr lang="en-US" dirty="0"/>
@@ -18090,7 +17657,6 @@
               <a:rPr lang="en-US" dirty="0"/>
               <a:t>Initial Load of open slots</a:t>
             </a:r>
-            <a:endParaRPr lang="en-US" dirty="0"/>
           </a:p>
         </p:txBody>
       </p:sp>
@@ -18397,8 +17963,8 @@
         </p:nvSpPr>
         <p:spPr>
           <a:xfrm>
-            <a:off x="771558" y="740898"/>
-            <a:ext cx="1857375" cy="923330"/>
+            <a:off x="445274" y="740898"/>
+            <a:ext cx="2405510" cy="923330"/>
           </a:xfrm>
           <a:prstGeom prst="rect">
             <a:avLst/>
@@ -18412,8 +17978,12 @@
           <a:lstStyle/>
           <a:p>
             <a:r>
+              <a:rPr lang="en-US" dirty="0" smtClean="0"/>
+              <a:t>Patient Scheduling Scenario </a:t>
+            </a:r>
+            <a:r>
               <a:rPr lang="en-US" dirty="0"/>
-              <a:t>Scenario 3</a:t>
+              <a:t>3</a:t>
             </a:r>
             <a:r>
               <a:rPr lang="en-US" dirty="0" smtClean="0"/>
@@ -19794,7 +19364,7 @@
         </p:nvSpPr>
         <p:spPr>
           <a:xfrm>
-            <a:off x="3443893" y="968124"/>
+            <a:off x="4541173" y="944270"/>
             <a:ext cx="1991328" cy="1163412"/>
           </a:xfrm>
           <a:prstGeom prst="roundRect">
@@ -19841,7 +19411,7 @@
         </p:nvSpPr>
         <p:spPr>
           <a:xfrm>
-            <a:off x="3456972" y="2848076"/>
+            <a:off x="4554252" y="2824222"/>
             <a:ext cx="1991328" cy="1163412"/>
           </a:xfrm>
           <a:prstGeom prst="roundRect">
@@ -19889,7 +19459,7 @@
         </p:nvCxnSpPr>
         <p:spPr>
           <a:xfrm flipV="1">
-            <a:off x="4439557" y="2131536"/>
+            <a:off x="5536837" y="2107682"/>
             <a:ext cx="0" cy="716541"/>
           </a:xfrm>
           <a:prstGeom prst="straightConnector1">
@@ -19928,7 +19498,7 @@
         </p:nvCxnSpPr>
         <p:spPr>
           <a:xfrm flipH="1">
-            <a:off x="4439557" y="254000"/>
+            <a:off x="5536837" y="230146"/>
             <a:ext cx="13079" cy="714124"/>
           </a:xfrm>
           <a:prstGeom prst="straightConnector1">
@@ -19964,8 +19534,8 @@
         </p:nvSpPr>
         <p:spPr>
           <a:xfrm>
-            <a:off x="1041401" y="1345852"/>
-            <a:ext cx="2123376" cy="1200329"/>
+            <a:off x="580445" y="1345852"/>
+            <a:ext cx="2584332" cy="1200329"/>
           </a:xfrm>
           <a:prstGeom prst="rect">
             <a:avLst/>
@@ -19979,12 +19549,20 @@
           <a:lstStyle/>
           <a:p>
             <a:r>
+              <a:rPr lang="en-US" dirty="0" smtClean="0"/>
+              <a:t>Provider Scheduling Scenario </a:t>
+            </a:r>
+            <a:r>
               <a:rPr lang="en-US" dirty="0"/>
-              <a:t>Scenario 3</a:t>
+              <a:t>3</a:t>
             </a:r>
             <a:r>
               <a:rPr lang="en-US" dirty="0" smtClean="0"/>
-              <a:t>: Provider Scheduling </a:t>
+              <a:t>: </a:t>
+            </a:r>
+            <a:r>
+              <a:rPr lang="en-US" dirty="0" smtClean="0"/>
+              <a:t>Scheduling </a:t>
             </a:r>
             <a:r>
               <a:rPr lang="en-US" dirty="0"/>
@@ -19995,12 +19573,16 @@
               <a:t>xisting Patient </a:t>
             </a:r>
             <a:r>
+              <a:rPr lang="en-US" i="1" dirty="0"/>
+              <a:t>W</a:t>
+            </a:r>
+            <a:r>
               <a:rPr lang="en-US" i="1" dirty="0" smtClean="0"/>
-              <a:t>within</a:t>
+              <a:t>ithin</a:t>
             </a:r>
             <a:r>
               <a:rPr lang="en-US" dirty="0" smtClean="0"/>
-              <a:t> system</a:t>
+              <a:t> a System</a:t>
             </a:r>
             <a:endParaRPr lang="en-US" dirty="0"/>
           </a:p>
@@ -20017,7 +19599,7 @@
         </p:nvCxnSpPr>
         <p:spPr>
           <a:xfrm>
-            <a:off x="4452636" y="4011488"/>
+            <a:off x="5549916" y="3987634"/>
             <a:ext cx="0" cy="716540"/>
           </a:xfrm>
           <a:prstGeom prst="straightConnector1">
@@ -20053,7 +19635,7 @@
         </p:nvSpPr>
         <p:spPr>
           <a:xfrm>
-            <a:off x="3456972" y="4728028"/>
+            <a:off x="4554252" y="4704174"/>
             <a:ext cx="1991328" cy="1163412"/>
           </a:xfrm>
           <a:prstGeom prst="roundRect">
@@ -20099,7 +19681,7 @@
         </p:nvCxnSpPr>
         <p:spPr>
           <a:xfrm>
-            <a:off x="4439557" y="5891440"/>
+            <a:off x="5536837" y="5867586"/>
             <a:ext cx="0" cy="694402"/>
           </a:xfrm>
           <a:prstGeom prst="straightConnector1">
@@ -20691,11 +20273,7 @@
             </a:pPr>
             <a:r>
               <a:rPr lang="en-US" dirty="0" smtClean="0"/>
-              <a:t>Create and hold </a:t>
-            </a:r>
-            <a:r>
-              <a:rPr lang="en-US" dirty="0" smtClean="0"/>
-              <a:t>appointment (optional)</a:t>
+              <a:t>Create and hold appointment (optional)</a:t>
             </a:r>
             <a:endParaRPr lang="en-US" dirty="0"/>
           </a:p>
@@ -21000,8 +20578,8 @@
         </p:nvSpPr>
         <p:spPr>
           <a:xfrm>
-            <a:off x="771558" y="1312398"/>
-            <a:ext cx="1857375" cy="1200329"/>
+            <a:off x="461176" y="1312398"/>
+            <a:ext cx="2167757" cy="1200329"/>
           </a:xfrm>
           <a:prstGeom prst="rect">
             <a:avLst/>
@@ -21015,16 +20593,8 @@
           <a:lstStyle/>
           <a:p>
             <a:r>
-              <a:rPr lang="en-US" dirty="0"/>
-              <a:t>Scenario </a:t>
-            </a:r>
-            <a:r>
-              <a:rPr lang="en-US" dirty="0"/>
-              <a:t>3</a:t>
-            </a:r>
-            <a:r>
-              <a:rPr lang="en-US" dirty="0" smtClean="0"/>
-              <a:t>: </a:t>
+              <a:rPr lang="en-US"/>
+              <a:t>Patient Scheduling Scenario 3 : </a:t>
             </a:r>
             <a:r>
               <a:rPr lang="en-US" dirty="0" smtClean="0"/>
@@ -21264,11 +20834,7 @@
             <a:pPr algn="ctr"/>
             <a:r>
               <a:rPr lang="en-US" dirty="0" smtClean="0"/>
-              <a:t>Subscrib</a:t>
-            </a:r>
-            <a:r>
-              <a:rPr lang="en-US" dirty="0" smtClean="0"/>
-              <a:t>e to receive notifications of </a:t>
+              <a:t>Subscribe to receive notifications of </a:t>
             </a:r>
             <a:r>
               <a:rPr lang="en-US" dirty="0"/>
@@ -21418,11 +20984,7 @@
             <a:pPr algn="ctr"/>
             <a:r>
               <a:rPr lang="en-US" dirty="0" smtClean="0"/>
-              <a:t>Confirm/reject </a:t>
-            </a:r>
-            <a:r>
-              <a:rPr lang="en-US" dirty="0" smtClean="0"/>
-              <a:t>subscription</a:t>
+              <a:t>Confirm/reject subscription</a:t>
             </a:r>
             <a:endParaRPr lang="en-US" dirty="0"/>
           </a:p>
@@ -22238,19 +21800,7 @@
           <a:p>
             <a:r>
               <a:rPr lang="en-US" dirty="0" smtClean="0"/>
-              <a:t>Fetch </a:t>
-            </a:r>
-            <a:r>
-              <a:rPr lang="en-US" dirty="0" smtClean="0"/>
-              <a:t>open Slots </a:t>
-            </a:r>
-            <a:r>
-              <a:rPr lang="en-US" dirty="0" smtClean="0"/>
-              <a:t>for </a:t>
-            </a:r>
-            <a:r>
-              <a:rPr lang="en-US" dirty="0" smtClean="0"/>
-              <a:t>actor and time period defined in Notification payload</a:t>
+              <a:t>Fetch open Slots for actor and time period defined in Notification payload</a:t>
             </a:r>
             <a:endParaRPr lang="en-US" dirty="0"/>
           </a:p>
@@ -22577,10 +22127,7 @@
           </a:bodyPr>
           <a:lstStyle/>
           <a:p>
-            <a:pPr marL="342900" indent="-342900">
-              <a:buFont typeface="+mj-lt"/>
-              <a:buAutoNum type="arabicPeriod" startAt="2"/>
-            </a:pPr>
+            <a:pPr algn="ctr"/>
             <a:r>
               <a:rPr lang="en-US" dirty="0" smtClean="0"/>
               <a:t>login</a:t>
@@ -22614,10 +22161,7 @@
           </a:bodyPr>
           <a:lstStyle/>
           <a:p>
-            <a:pPr marL="342900" indent="-342900">
-              <a:buFont typeface="+mj-lt"/>
-              <a:buAutoNum type="arabicPeriod" startAt="3"/>
-            </a:pPr>
+            <a:pPr algn="ctr"/>
             <a:r>
               <a:rPr lang="en-US" dirty="0" smtClean="0"/>
               <a:t>Returns Patient Id</a:t>
@@ -22748,10 +22292,7 @@
             </a:bodyPr>
             <a:lstStyle/>
             <a:p>
-              <a:pPr marL="342900" indent="-342900">
-                <a:buFont typeface="+mj-lt"/>
-                <a:buAutoNum type="arabicPeriod" startAt="4"/>
-              </a:pPr>
+              <a:pPr algn="ctr"/>
               <a:r>
                 <a:rPr lang="en-US" dirty="0" smtClean="0"/>
                 <a:t>Update coverage </a:t>
@@ -22789,10 +22330,7 @@
             </a:bodyPr>
             <a:lstStyle/>
             <a:p>
-              <a:pPr marL="342900" indent="-342900">
-                <a:buFont typeface="+mj-lt"/>
-                <a:buAutoNum type="arabicPeriod" startAt="5"/>
-              </a:pPr>
+              <a:pPr algn="ctr"/>
               <a:r>
                 <a:rPr lang="en-US" dirty="0" smtClean="0"/>
                 <a:t>Returns coverage Id</a:t>
@@ -23022,7 +22560,7 @@
         <p:spPr>
           <a:xfrm>
             <a:off x="846031" y="896793"/>
-            <a:ext cx="4446089" cy="369332"/>
+            <a:ext cx="4127733" cy="369332"/>
           </a:xfrm>
           <a:prstGeom prst="rect">
             <a:avLst/>
@@ -23034,10 +22572,6 @@
           </a:bodyPr>
           <a:lstStyle/>
           <a:p>
-            <a:pPr marL="342900" indent="-342900">
-              <a:buFont typeface="+mj-lt"/>
-              <a:buAutoNum type="arabicPeriod"/>
-            </a:pPr>
             <a:r>
               <a:rPr lang="en-US" dirty="0"/>
               <a:t>End </a:t>
@@ -23873,44 +23407,6 @@
       </p:sp>
       <p:sp>
         <p:nvSpPr>
-          <p:cNvPr id="5" name="TextBox 4"/>
-          <p:cNvSpPr txBox="1"/>
-          <p:nvPr/>
-        </p:nvSpPr>
-        <p:spPr>
-          <a:xfrm>
-            <a:off x="2661370" y="1760340"/>
-            <a:ext cx="554738" cy="307777"/>
-          </a:xfrm>
-          <a:prstGeom prst="rect">
-            <a:avLst/>
-          </a:prstGeom>
-          <a:noFill/>
-          <a:ln w="25400">
-            <a:solidFill>
-              <a:schemeClr val="accent1">
-                <a:shade val="50000"/>
-              </a:schemeClr>
-            </a:solidFill>
-          </a:ln>
-        </p:spPr>
-        <p:txBody>
-          <a:bodyPr wrap="square" rtlCol="0">
-            <a:spAutoFit/>
-          </a:bodyPr>
-          <a:lstStyle/>
-          <a:p>
-            <a:pPr algn="ctr"/>
-            <a:r>
-              <a:rPr lang="en-US" sz="1400" dirty="0" smtClean="0"/>
-              <a:t>12c</a:t>
-            </a:r>
-            <a:endParaRPr lang="en-US" sz="1400" dirty="0"/>
-          </a:p>
-        </p:txBody>
-      </p:sp>
-      <p:sp>
-        <p:nvSpPr>
           <p:cNvPr id="8" name="Can 7"/>
           <p:cNvSpPr/>
           <p:nvPr/>
@@ -23957,120 +23453,6 @@
               <a:t> FHIR Server</a:t>
             </a:r>
             <a:endParaRPr lang="en-US" sz="2400" dirty="0"/>
-          </a:p>
-        </p:txBody>
-      </p:sp>
-      <p:sp>
-        <p:nvSpPr>
-          <p:cNvPr id="20" name="TextBox 19"/>
-          <p:cNvSpPr txBox="1"/>
-          <p:nvPr/>
-        </p:nvSpPr>
-        <p:spPr>
-          <a:xfrm>
-            <a:off x="7397350" y="3605389"/>
-            <a:ext cx="554738" cy="307777"/>
-          </a:xfrm>
-          <a:prstGeom prst="rect">
-            <a:avLst/>
-          </a:prstGeom>
-          <a:noFill/>
-          <a:ln w="25400">
-            <a:solidFill>
-              <a:schemeClr val="accent1">
-                <a:shade val="50000"/>
-              </a:schemeClr>
-            </a:solidFill>
-          </a:ln>
-        </p:spPr>
-        <p:txBody>
-          <a:bodyPr wrap="square" rtlCol="0">
-            <a:spAutoFit/>
-          </a:bodyPr>
-          <a:lstStyle/>
-          <a:p>
-            <a:pPr algn="ctr"/>
-            <a:r>
-              <a:rPr lang="en-US" sz="1400" dirty="0" smtClean="0"/>
-              <a:t>14c</a:t>
-            </a:r>
-            <a:endParaRPr lang="en-US" sz="1400" dirty="0"/>
-          </a:p>
-        </p:txBody>
-      </p:sp>
-      <p:sp>
-        <p:nvSpPr>
-          <p:cNvPr id="30" name="TextBox 29"/>
-          <p:cNvSpPr txBox="1"/>
-          <p:nvPr/>
-        </p:nvSpPr>
-        <p:spPr>
-          <a:xfrm>
-            <a:off x="8316284" y="2269115"/>
-            <a:ext cx="554738" cy="307777"/>
-          </a:xfrm>
-          <a:prstGeom prst="rect">
-            <a:avLst/>
-          </a:prstGeom>
-          <a:noFill/>
-          <a:ln w="25400">
-            <a:solidFill>
-              <a:schemeClr val="accent1">
-                <a:shade val="50000"/>
-              </a:schemeClr>
-            </a:solidFill>
-          </a:ln>
-        </p:spPr>
-        <p:txBody>
-          <a:bodyPr wrap="square" rtlCol="0">
-            <a:spAutoFit/>
-          </a:bodyPr>
-          <a:lstStyle/>
-          <a:p>
-            <a:pPr algn="ctr"/>
-            <a:r>
-              <a:rPr lang="en-US" sz="1400" dirty="0" smtClean="0"/>
-              <a:t>13c</a:t>
-            </a:r>
-            <a:endParaRPr lang="en-US" sz="1400" dirty="0"/>
-          </a:p>
-        </p:txBody>
-      </p:sp>
-      <p:sp>
-        <p:nvSpPr>
-          <p:cNvPr id="31" name="TextBox 30"/>
-          <p:cNvSpPr txBox="1"/>
-          <p:nvPr/>
-        </p:nvSpPr>
-        <p:spPr>
-          <a:xfrm>
-            <a:off x="3643978" y="3889033"/>
-            <a:ext cx="554738" cy="307777"/>
-          </a:xfrm>
-          <a:prstGeom prst="rect">
-            <a:avLst/>
-          </a:prstGeom>
-          <a:noFill/>
-          <a:ln w="25400">
-            <a:solidFill>
-              <a:schemeClr val="accent1">
-                <a:shade val="50000"/>
-              </a:schemeClr>
-            </a:solidFill>
-          </a:ln>
-        </p:spPr>
-        <p:txBody>
-          <a:bodyPr wrap="square" rtlCol="0">
-            <a:spAutoFit/>
-          </a:bodyPr>
-          <a:lstStyle/>
-          <a:p>
-            <a:pPr algn="ctr"/>
-            <a:r>
-              <a:rPr lang="en-US" sz="1400" dirty="0" smtClean="0"/>
-              <a:t>15c</a:t>
-            </a:r>
-            <a:endParaRPr lang="en-US" sz="1400" dirty="0"/>
           </a:p>
         </p:txBody>
       </p:sp>
@@ -24573,44 +23955,6 @@
             </a:fontRef>
           </p:style>
         </p:cxnSp>
-        <p:sp>
-          <p:nvSpPr>
-            <p:cNvPr id="29" name="TextBox 28"/>
-            <p:cNvSpPr txBox="1"/>
-            <p:nvPr/>
-          </p:nvSpPr>
-          <p:spPr>
-            <a:xfrm>
-              <a:off x="4015389" y="2205609"/>
-              <a:ext cx="759298" cy="369332"/>
-            </a:xfrm>
-            <a:prstGeom prst="rect">
-              <a:avLst/>
-            </a:prstGeom>
-            <a:noFill/>
-            <a:ln w="25400">
-              <a:solidFill>
-                <a:schemeClr val="accent1">
-                  <a:shade val="50000"/>
-                </a:schemeClr>
-              </a:solidFill>
-            </a:ln>
-          </p:spPr>
-          <p:txBody>
-            <a:bodyPr wrap="square" rtlCol="0">
-              <a:spAutoFit/>
-            </a:bodyPr>
-            <a:lstStyle/>
-            <a:p>
-              <a:pPr algn="ctr"/>
-              <a:r>
-                <a:rPr lang="en-US" smtClean="0"/>
-                <a:t>B1</a:t>
-              </a:r>
-              <a:endParaRPr lang="en-US" dirty="0"/>
-            </a:p>
-          </p:txBody>
-        </p:sp>
       </p:grpSp>
       <p:sp>
         <p:nvSpPr>

</xml_diff>